<commit_message>
mod:main.cpp read/write error check, add:ClientManage class
</commit_message>
<xml_diff>
--- a/explain.pptx
+++ b/explain.pptx
@@ -5,7 +5,7 @@
     <p:sldMasterId id="2147483648" r:id="rId1"/>
   </p:sldMasterIdLst>
   <p:notesMasterIdLst>
-    <p:notesMasterId r:id="rId13"/>
+    <p:notesMasterId r:id="rId14"/>
   </p:notesMasterIdLst>
   <p:sldIdLst>
     <p:sldId id="256" r:id="rId2"/>
@@ -18,7 +18,8 @@
     <p:sldId id="264" r:id="rId9"/>
     <p:sldId id="265" r:id="rId10"/>
     <p:sldId id="266" r:id="rId11"/>
-    <p:sldId id="268" r:id="rId12"/>
+    <p:sldId id="270" r:id="rId12"/>
+    <p:sldId id="271" r:id="rId13"/>
   </p:sldIdLst>
   <p:sldSz cx="12192000" cy="6858000"/>
   <p:notesSz cx="6858000" cy="9144000"/>
@@ -207,7 +208,7 @@
           <a:p>
             <a:fld id="{F4DF578F-11C9-5640-BBAB-2A48E6B37F23}" type="datetimeFigureOut">
               <a:rPr kumimoji="1" lang="ja-JP" altLang="en-US" smtClean="0"/>
-              <a:t>2022/1/3</a:t>
+              <a:t>2022/1/16</a:t>
             </a:fld>
             <a:endParaRPr kumimoji="1" lang="ja-JP" altLang="en-US"/>
           </a:p>
@@ -1084,7 +1085,91 @@
     </p:spTree>
     <p:extLst>
       <p:ext uri="{BB962C8B-B14F-4D97-AF65-F5344CB8AC3E}">
-        <p14:creationId xmlns:p14="http://schemas.microsoft.com/office/powerpoint/2010/main" val="1373897134"/>
+        <p14:creationId xmlns:p14="http://schemas.microsoft.com/office/powerpoint/2010/main" val="156070839"/>
+      </p:ext>
+    </p:extLst>
+  </p:cSld>
+  <p:clrMapOvr>
+    <a:masterClrMapping/>
+  </p:clrMapOvr>
+</p:notes>
+</file>
+
+<file path=ppt/notesSlides/notesSlide8.xml><?xml version="1.0" encoding="utf-8"?>
+<p:notes xmlns:a="http://schemas.openxmlformats.org/drawingml/2006/main" xmlns:r="http://schemas.openxmlformats.org/officeDocument/2006/relationships" xmlns:p="http://schemas.openxmlformats.org/presentationml/2006/main">
+  <p:cSld>
+    <p:spTree>
+      <p:nvGrpSpPr>
+        <p:cNvPr id="1" name=""/>
+        <p:cNvGrpSpPr/>
+        <p:nvPr/>
+      </p:nvGrpSpPr>
+      <p:grpSpPr>
+        <a:xfrm>
+          <a:off x="0" y="0"/>
+          <a:ext cx="0" cy="0"/>
+          <a:chOff x="0" y="0"/>
+          <a:chExt cx="0" cy="0"/>
+        </a:xfrm>
+      </p:grpSpPr>
+      <p:sp>
+        <p:nvSpPr>
+          <p:cNvPr id="2" name="スライド イメージ プレースホルダー 1"/>
+          <p:cNvSpPr>
+            <a:spLocks noGrp="1" noRot="1" noChangeAspect="1"/>
+          </p:cNvSpPr>
+          <p:nvPr>
+            <p:ph type="sldImg"/>
+          </p:nvPr>
+        </p:nvSpPr>
+        <p:spPr/>
+      </p:sp>
+      <p:sp>
+        <p:nvSpPr>
+          <p:cNvPr id="3" name="ノート プレースホルダー 2"/>
+          <p:cNvSpPr>
+            <a:spLocks noGrp="1"/>
+          </p:cNvSpPr>
+          <p:nvPr>
+            <p:ph type="body" idx="1"/>
+          </p:nvPr>
+        </p:nvSpPr>
+        <p:spPr/>
+        <p:txBody>
+          <a:bodyPr/>
+          <a:lstStyle/>
+          <a:p>
+            <a:endParaRPr kumimoji="1" lang="ja-JP" altLang="en-US"/>
+          </a:p>
+        </p:txBody>
+      </p:sp>
+      <p:sp>
+        <p:nvSpPr>
+          <p:cNvPr id="4" name="スライド番号プレースホルダー 3"/>
+          <p:cNvSpPr>
+            <a:spLocks noGrp="1"/>
+          </p:cNvSpPr>
+          <p:nvPr>
+            <p:ph type="sldNum" sz="quarter" idx="5"/>
+          </p:nvPr>
+        </p:nvSpPr>
+        <p:spPr/>
+        <p:txBody>
+          <a:bodyPr/>
+          <a:lstStyle/>
+          <a:p>
+            <a:fld id="{314F7BC4-FBA0-5448-8A0A-CE864DEBD966}" type="slidenum">
+              <a:rPr kumimoji="1" lang="ja-JP" altLang="en-US" smtClean="0"/>
+              <a:t>12</a:t>
+            </a:fld>
+            <a:endParaRPr kumimoji="1" lang="ja-JP" altLang="en-US"/>
+          </a:p>
+        </p:txBody>
+      </p:sp>
+    </p:spTree>
+    <p:extLst>
+      <p:ext uri="{BB962C8B-B14F-4D97-AF65-F5344CB8AC3E}">
+        <p14:creationId xmlns:p14="http://schemas.microsoft.com/office/powerpoint/2010/main" val="2468895740"/>
       </p:ext>
     </p:extLst>
   </p:cSld>
@@ -1241,7 +1326,7 @@
           <a:p>
             <a:fld id="{0A397778-B8DD-3749-B56A-DE0FA41D0D60}" type="datetimeFigureOut">
               <a:rPr kumimoji="1" lang="ja-JP" altLang="en-US" smtClean="0"/>
-              <a:t>2022/1/3</a:t>
+              <a:t>2022/1/16</a:t>
             </a:fld>
             <a:endParaRPr kumimoji="1" lang="ja-JP" altLang="en-US"/>
           </a:p>
@@ -1471,7 +1556,7 @@
           <a:p>
             <a:fld id="{0A397778-B8DD-3749-B56A-DE0FA41D0D60}" type="datetimeFigureOut">
               <a:rPr kumimoji="1" lang="ja-JP" altLang="en-US" smtClean="0"/>
-              <a:t>2022/1/3</a:t>
+              <a:t>2022/1/16</a:t>
             </a:fld>
             <a:endParaRPr kumimoji="1" lang="ja-JP" altLang="en-US"/>
           </a:p>
@@ -1711,7 +1796,7 @@
           <a:p>
             <a:fld id="{0A397778-B8DD-3749-B56A-DE0FA41D0D60}" type="datetimeFigureOut">
               <a:rPr kumimoji="1" lang="ja-JP" altLang="en-US" smtClean="0"/>
-              <a:t>2022/1/3</a:t>
+              <a:t>2022/1/16</a:t>
             </a:fld>
             <a:endParaRPr kumimoji="1" lang="ja-JP" altLang="en-US"/>
           </a:p>
@@ -1941,7 +2026,7 @@
           <a:p>
             <a:fld id="{0A397778-B8DD-3749-B56A-DE0FA41D0D60}" type="datetimeFigureOut">
               <a:rPr kumimoji="1" lang="ja-JP" altLang="en-US" smtClean="0"/>
-              <a:t>2022/1/3</a:t>
+              <a:t>2022/1/16</a:t>
             </a:fld>
             <a:endParaRPr kumimoji="1" lang="ja-JP" altLang="en-US"/>
           </a:p>
@@ -2216,7 +2301,7 @@
           <a:p>
             <a:fld id="{0A397778-B8DD-3749-B56A-DE0FA41D0D60}" type="datetimeFigureOut">
               <a:rPr kumimoji="1" lang="ja-JP" altLang="en-US" smtClean="0"/>
-              <a:t>2022/1/3</a:t>
+              <a:t>2022/1/16</a:t>
             </a:fld>
             <a:endParaRPr kumimoji="1" lang="ja-JP" altLang="en-US"/>
           </a:p>
@@ -2545,7 +2630,7 @@
           <a:p>
             <a:fld id="{0A397778-B8DD-3749-B56A-DE0FA41D0D60}" type="datetimeFigureOut">
               <a:rPr kumimoji="1" lang="ja-JP" altLang="en-US" smtClean="0"/>
-              <a:t>2022/1/3</a:t>
+              <a:t>2022/1/16</a:t>
             </a:fld>
             <a:endParaRPr kumimoji="1" lang="ja-JP" altLang="en-US"/>
           </a:p>
@@ -3021,7 +3106,7 @@
           <a:p>
             <a:fld id="{0A397778-B8DD-3749-B56A-DE0FA41D0D60}" type="datetimeFigureOut">
               <a:rPr kumimoji="1" lang="ja-JP" altLang="en-US" smtClean="0"/>
-              <a:t>2022/1/3</a:t>
+              <a:t>2022/1/16</a:t>
             </a:fld>
             <a:endParaRPr kumimoji="1" lang="ja-JP" altLang="en-US"/>
           </a:p>
@@ -3162,7 +3247,7 @@
           <a:p>
             <a:fld id="{0A397778-B8DD-3749-B56A-DE0FA41D0D60}" type="datetimeFigureOut">
               <a:rPr kumimoji="1" lang="ja-JP" altLang="en-US" smtClean="0"/>
-              <a:t>2022/1/3</a:t>
+              <a:t>2022/1/16</a:t>
             </a:fld>
             <a:endParaRPr kumimoji="1" lang="ja-JP" altLang="en-US"/>
           </a:p>
@@ -3275,7 +3360,7 @@
           <a:p>
             <a:fld id="{0A397778-B8DD-3749-B56A-DE0FA41D0D60}" type="datetimeFigureOut">
               <a:rPr kumimoji="1" lang="ja-JP" altLang="en-US" smtClean="0"/>
-              <a:t>2022/1/3</a:t>
+              <a:t>2022/1/16</a:t>
             </a:fld>
             <a:endParaRPr kumimoji="1" lang="ja-JP" altLang="en-US"/>
           </a:p>
@@ -3618,7 +3703,7 @@
           <a:p>
             <a:fld id="{0A397778-B8DD-3749-B56A-DE0FA41D0D60}" type="datetimeFigureOut">
               <a:rPr kumimoji="1" lang="ja-JP" altLang="en-US" smtClean="0"/>
-              <a:t>2022/1/3</a:t>
+              <a:t>2022/1/16</a:t>
             </a:fld>
             <a:endParaRPr kumimoji="1" lang="ja-JP" altLang="en-US"/>
           </a:p>
@@ -3906,7 +3991,7 @@
           <a:p>
             <a:fld id="{0A397778-B8DD-3749-B56A-DE0FA41D0D60}" type="datetimeFigureOut">
               <a:rPr kumimoji="1" lang="ja-JP" altLang="en-US" smtClean="0"/>
-              <a:t>2022/1/3</a:t>
+              <a:t>2022/1/16</a:t>
             </a:fld>
             <a:endParaRPr kumimoji="1" lang="ja-JP" altLang="en-US"/>
           </a:p>
@@ -4179,7 +4264,7 @@
           <a:p>
             <a:fld id="{0A397778-B8DD-3749-B56A-DE0FA41D0D60}" type="datetimeFigureOut">
               <a:rPr kumimoji="1" lang="ja-JP" altLang="en-US" smtClean="0"/>
-              <a:t>2022/1/3</a:t>
+              <a:t>2022/1/16</a:t>
             </a:fld>
             <a:endParaRPr kumimoji="1" lang="ja-JP" altLang="en-US"/>
           </a:p>
@@ -4777,7 +4862,7 @@
         </p:nvSpPr>
         <p:spPr>
           <a:xfrm>
-            <a:off x="8611764" y="4517718"/>
+            <a:off x="8939824" y="4517718"/>
             <a:ext cx="1773142" cy="307777"/>
           </a:xfrm>
           <a:prstGeom prst="rect">
@@ -4834,7 +4919,7 @@
         </p:nvSpPr>
         <p:spPr>
           <a:xfrm>
-            <a:off x="8611764" y="6062870"/>
+            <a:off x="8939824" y="6062870"/>
             <a:ext cx="1773142" cy="307777"/>
           </a:xfrm>
           <a:prstGeom prst="rect">
@@ -4868,7 +4953,7 @@
                 <a:latin typeface="Meiryo UI" panose="020B0604030504040204" pitchFamily="34" charset="-128"/>
                 <a:ea typeface="Meiryo UI" panose="020B0604030504040204" pitchFamily="34" charset="-128"/>
               </a:rPr>
-              <a:t>ead()</a:t>
+              <a:t>ead()/write()</a:t>
             </a:r>
             <a:endParaRPr kumimoji="1" lang="ja-JP" altLang="en-US" sz="1400">
               <a:latin typeface="Meiryo UI" panose="020B0604030504040204" pitchFamily="34" charset="-128"/>
@@ -5061,10 +5146,10 @@
       </p:sp>
       <p:sp>
         <p:nvSpPr>
-          <p:cNvPr id="39" name="テキスト ボックス 38">
-            <a:extLst>
-              <a:ext uri="{FF2B5EF4-FFF2-40B4-BE49-F238E27FC236}">
-                <a16:creationId xmlns:a16="http://schemas.microsoft.com/office/drawing/2014/main" id="{168664D1-8131-2541-9AE6-BCD19A02A2C7}"/>
+          <p:cNvPr id="15" name="テキスト ボックス 14">
+            <a:extLst>
+              <a:ext uri="{FF2B5EF4-FFF2-40B4-BE49-F238E27FC236}">
+                <a16:creationId xmlns:a16="http://schemas.microsoft.com/office/drawing/2014/main" id="{C446E075-3F2C-3E48-8F03-96740E7ACF4B}"/>
               </a:ext>
             </a:extLst>
           </p:cNvPr>
@@ -5073,16 +5158,13 @@
         </p:nvSpPr>
         <p:spPr>
           <a:xfrm>
-            <a:off x="8736066" y="6477828"/>
-            <a:ext cx="1524538" cy="307777"/>
+            <a:off x="389613" y="238540"/>
+            <a:ext cx="5524489" cy="400110"/>
           </a:xfrm>
           <a:prstGeom prst="rect">
             <a:avLst/>
           </a:prstGeom>
           <a:noFill/>
-          <a:ln>
-            <a:noFill/>
-          </a:ln>
         </p:spPr>
         <p:txBody>
           <a:bodyPr wrap="square" rtlCol="0">
@@ -5090,27 +5172,78 @@
           </a:bodyPr>
           <a:lstStyle/>
           <a:p>
+            <a:r>
+              <a:rPr lang="en-US" altLang="ja-JP" sz="2000" dirty="0">
+                <a:latin typeface="Meiryo UI" panose="020B0604030504040204" pitchFamily="34" charset="-128"/>
+                <a:ea typeface="Meiryo UI" panose="020B0604030504040204" pitchFamily="34" charset="-128"/>
+              </a:rPr>
+              <a:t>I/O </a:t>
+            </a:r>
+            <a:r>
+              <a:rPr lang="en-US" altLang="ja-JP" sz="2000" dirty="0" err="1">
+                <a:latin typeface="Meiryo UI" panose="020B0604030504040204" pitchFamily="34" charset="-128"/>
+                <a:ea typeface="Meiryo UI" panose="020B0604030504040204" pitchFamily="34" charset="-128"/>
+              </a:rPr>
+              <a:t>MultiPlexing</a:t>
+            </a:r>
+            <a:endParaRPr kumimoji="1" lang="ja-JP" altLang="en-US" sz="2000">
+              <a:latin typeface="Meiryo UI" panose="020B0604030504040204" pitchFamily="34" charset="-128"/>
+              <a:ea typeface="Meiryo UI" panose="020B0604030504040204" pitchFamily="34" charset="-128"/>
+            </a:endParaRPr>
+          </a:p>
+        </p:txBody>
+      </p:sp>
+      <p:sp>
+        <p:nvSpPr>
+          <p:cNvPr id="20" name="テキスト ボックス 19">
+            <a:extLst>
+              <a:ext uri="{FF2B5EF4-FFF2-40B4-BE49-F238E27FC236}">
+                <a16:creationId xmlns:a16="http://schemas.microsoft.com/office/drawing/2014/main" id="{6C4CBD7C-86C7-9146-AA4A-52BADD8261A3}"/>
+              </a:ext>
+            </a:extLst>
+          </p:cNvPr>
+          <p:cNvSpPr txBox="1"/>
+          <p:nvPr/>
+        </p:nvSpPr>
+        <p:spPr>
+          <a:xfrm>
+            <a:off x="7801045" y="1647198"/>
+            <a:ext cx="2592626" cy="307777"/>
+          </a:xfrm>
+          <a:prstGeom prst="rect">
+            <a:avLst/>
+          </a:prstGeom>
+          <a:solidFill>
+            <a:schemeClr val="bg1"/>
+          </a:solidFill>
+          <a:ln>
+            <a:solidFill>
+              <a:schemeClr val="bg1">
+                <a:lumMod val="50000"/>
+              </a:schemeClr>
+            </a:solidFill>
+          </a:ln>
+        </p:spPr>
+        <p:txBody>
+          <a:bodyPr wrap="square" rtlCol="0">
+            <a:spAutoFit/>
+          </a:bodyPr>
+          <a:lstStyle/>
+          <a:p>
             <a:pPr algn="ctr"/>
             <a:r>
-              <a:rPr kumimoji="1" lang="en-US" altLang="ja-JP" sz="1400" dirty="0">
-                <a:latin typeface="Meiryo UI" panose="020B0604030504040204" pitchFamily="34" charset="-128"/>
-                <a:ea typeface="Meiryo UI" panose="020B0604030504040204" pitchFamily="34" charset="-128"/>
-              </a:rPr>
-              <a:t>※write</a:t>
-            </a:r>
-            <a:r>
               <a:rPr lang="en-US" altLang="ja-JP" sz="1400" dirty="0">
                 <a:latin typeface="Meiryo UI" panose="020B0604030504040204" pitchFamily="34" charset="-128"/>
                 <a:ea typeface="Meiryo UI" panose="020B0604030504040204" pitchFamily="34" charset="-128"/>
               </a:rPr>
-              <a:t>()</a:t>
+              <a:t>FD</a:t>
             </a:r>
             <a:r>
               <a:rPr lang="ja-JP" altLang="en-US" sz="1400">
                 <a:latin typeface="Meiryo UI" panose="020B0604030504040204" pitchFamily="34" charset="-128"/>
                 <a:ea typeface="Meiryo UI" panose="020B0604030504040204" pitchFamily="34" charset="-128"/>
               </a:rPr>
-              <a:t>も同様</a:t>
+              <a:t>の監視対象をリセット</a:t>
             </a:r>
             <a:endParaRPr kumimoji="1" lang="ja-JP" altLang="en-US" sz="1400">
               <a:latin typeface="Meiryo UI" panose="020B0604030504040204" pitchFamily="34" charset="-128"/>
@@ -5121,10 +5254,166 @@
       </p:sp>
       <p:sp>
         <p:nvSpPr>
-          <p:cNvPr id="15" name="テキスト ボックス 14">
-            <a:extLst>
-              <a:ext uri="{FF2B5EF4-FFF2-40B4-BE49-F238E27FC236}">
-                <a16:creationId xmlns:a16="http://schemas.microsoft.com/office/drawing/2014/main" id="{C446E075-3F2C-3E48-8F03-96740E7ACF4B}"/>
+          <p:cNvPr id="2" name="正方形/長方形 1">
+            <a:extLst>
+              <a:ext uri="{FF2B5EF4-FFF2-40B4-BE49-F238E27FC236}">
+                <a16:creationId xmlns:a16="http://schemas.microsoft.com/office/drawing/2014/main" id="{4C8872BB-4077-B241-A714-5B037A90A3E0}"/>
+              </a:ext>
+            </a:extLst>
+          </p:cNvPr>
+          <p:cNvSpPr/>
+          <p:nvPr/>
+        </p:nvSpPr>
+        <p:spPr>
+          <a:xfrm>
+            <a:off x="5486402" y="2126579"/>
+            <a:ext cx="2881992" cy="1039076"/>
+          </a:xfrm>
+          <a:prstGeom prst="rect">
+            <a:avLst/>
+          </a:prstGeom>
+          <a:solidFill>
+            <a:schemeClr val="bg1"/>
+          </a:solidFill>
+          <a:ln>
+            <a:noFill/>
+          </a:ln>
+        </p:spPr>
+        <p:style>
+          <a:lnRef idx="2">
+            <a:schemeClr val="accent1">
+              <a:shade val="50000"/>
+            </a:schemeClr>
+          </a:lnRef>
+          <a:fillRef idx="1">
+            <a:schemeClr val="accent1"/>
+          </a:fillRef>
+          <a:effectRef idx="0">
+            <a:schemeClr val="accent1"/>
+          </a:effectRef>
+          <a:fontRef idx="minor">
+            <a:schemeClr val="lt1"/>
+          </a:fontRef>
+        </p:style>
+        <p:txBody>
+          <a:bodyPr rtlCol="0" anchor="ctr"/>
+          <a:lstStyle/>
+          <a:p>
+            <a:pPr algn="ctr"/>
+            <a:endParaRPr kumimoji="1" lang="ja-JP" altLang="en-US"/>
+          </a:p>
+        </p:txBody>
+      </p:sp>
+      <p:sp>
+        <p:nvSpPr>
+          <p:cNvPr id="21" name="正方形/長方形 20">
+            <a:extLst>
+              <a:ext uri="{FF2B5EF4-FFF2-40B4-BE49-F238E27FC236}">
+                <a16:creationId xmlns:a16="http://schemas.microsoft.com/office/drawing/2014/main" id="{9B6ECCD1-4E35-8D43-BE63-734E0A0C8442}"/>
+              </a:ext>
+            </a:extLst>
+          </p:cNvPr>
+          <p:cNvSpPr/>
+          <p:nvPr/>
+        </p:nvSpPr>
+        <p:spPr>
+          <a:xfrm>
+            <a:off x="5486402" y="3526611"/>
+            <a:ext cx="2881992" cy="1039076"/>
+          </a:xfrm>
+          <a:prstGeom prst="rect">
+            <a:avLst/>
+          </a:prstGeom>
+          <a:solidFill>
+            <a:schemeClr val="bg1"/>
+          </a:solidFill>
+          <a:ln>
+            <a:noFill/>
+          </a:ln>
+        </p:spPr>
+        <p:style>
+          <a:lnRef idx="2">
+            <a:schemeClr val="accent1">
+              <a:shade val="50000"/>
+            </a:schemeClr>
+          </a:lnRef>
+          <a:fillRef idx="1">
+            <a:schemeClr val="accent1"/>
+          </a:fillRef>
+          <a:effectRef idx="0">
+            <a:schemeClr val="accent1"/>
+          </a:effectRef>
+          <a:fontRef idx="minor">
+            <a:schemeClr val="lt1"/>
+          </a:fontRef>
+        </p:style>
+        <p:txBody>
+          <a:bodyPr rtlCol="0" anchor="ctr"/>
+          <a:lstStyle/>
+          <a:p>
+            <a:pPr algn="ctr"/>
+            <a:endParaRPr kumimoji="1" lang="ja-JP" altLang="en-US"/>
+          </a:p>
+        </p:txBody>
+      </p:sp>
+      <p:sp>
+        <p:nvSpPr>
+          <p:cNvPr id="23" name="正方形/長方形 22">
+            <a:extLst>
+              <a:ext uri="{FF2B5EF4-FFF2-40B4-BE49-F238E27FC236}">
+                <a16:creationId xmlns:a16="http://schemas.microsoft.com/office/drawing/2014/main" id="{25DF1A84-54B7-CB45-BC3F-EE46401F9E71}"/>
+              </a:ext>
+            </a:extLst>
+          </p:cNvPr>
+          <p:cNvSpPr/>
+          <p:nvPr/>
+        </p:nvSpPr>
+        <p:spPr>
+          <a:xfrm>
+            <a:off x="5422792" y="5126503"/>
+            <a:ext cx="3252071" cy="1039076"/>
+          </a:xfrm>
+          <a:prstGeom prst="rect">
+            <a:avLst/>
+          </a:prstGeom>
+          <a:solidFill>
+            <a:schemeClr val="bg1"/>
+          </a:solidFill>
+          <a:ln>
+            <a:noFill/>
+          </a:ln>
+        </p:spPr>
+        <p:style>
+          <a:lnRef idx="2">
+            <a:schemeClr val="accent1">
+              <a:shade val="50000"/>
+            </a:schemeClr>
+          </a:lnRef>
+          <a:fillRef idx="1">
+            <a:schemeClr val="accent1"/>
+          </a:fillRef>
+          <a:effectRef idx="0">
+            <a:schemeClr val="accent1"/>
+          </a:effectRef>
+          <a:fontRef idx="minor">
+            <a:schemeClr val="lt1"/>
+          </a:fontRef>
+        </p:style>
+        <p:txBody>
+          <a:bodyPr rtlCol="0" anchor="ctr"/>
+          <a:lstStyle/>
+          <a:p>
+            <a:pPr algn="ctr"/>
+            <a:endParaRPr kumimoji="1" lang="ja-JP" altLang="en-US"/>
+          </a:p>
+        </p:txBody>
+      </p:sp>
+      <p:sp>
+        <p:nvSpPr>
+          <p:cNvPr id="24" name="テキスト ボックス 23">
+            <a:extLst>
+              <a:ext uri="{FF2B5EF4-FFF2-40B4-BE49-F238E27FC236}">
+                <a16:creationId xmlns:a16="http://schemas.microsoft.com/office/drawing/2014/main" id="{A7282FDF-2098-FA47-B9AF-80BB5B470EE1}"/>
               </a:ext>
             </a:extLst>
           </p:cNvPr>
@@ -5133,13 +5422,18 @@
         </p:nvSpPr>
         <p:spPr>
           <a:xfrm>
-            <a:off x="389613" y="238540"/>
-            <a:ext cx="5524489" cy="400110"/>
+            <a:off x="5613779" y="2290446"/>
+            <a:ext cx="2592626" cy="307777"/>
           </a:xfrm>
           <a:prstGeom prst="rect">
             <a:avLst/>
           </a:prstGeom>
-          <a:noFill/>
+          <a:solidFill>
+            <a:schemeClr val="bg1"/>
+          </a:solidFill>
+          <a:ln>
+            <a:noFill/>
+          </a:ln>
         </p:spPr>
         <p:txBody>
           <a:bodyPr wrap="square" rtlCol="0">
@@ -5147,24 +5441,270 @@
           </a:bodyPr>
           <a:lstStyle/>
           <a:p>
-            <a:r>
-              <a:rPr lang="en-US" altLang="ja-JP" sz="2000" dirty="0">
-                <a:latin typeface="Meiryo UI" panose="020B0604030504040204" pitchFamily="34" charset="-128"/>
-                <a:ea typeface="Meiryo UI" panose="020B0604030504040204" pitchFamily="34" charset="-128"/>
-              </a:rPr>
-              <a:t>I/O </a:t>
-            </a:r>
-            <a:r>
-              <a:rPr lang="en-US" altLang="ja-JP" sz="2000" dirty="0" err="1">
-                <a:latin typeface="Meiryo UI" panose="020B0604030504040204" pitchFamily="34" charset="-128"/>
-                <a:ea typeface="Meiryo UI" panose="020B0604030504040204" pitchFamily="34" charset="-128"/>
-              </a:rPr>
-              <a:t>MultiPlexing</a:t>
-            </a:r>
-            <a:endParaRPr kumimoji="1" lang="ja-JP" altLang="en-US" sz="2000">
+            <a:pPr algn="ctr"/>
+            <a:r>
+              <a:rPr lang="en-US" altLang="ja-JP" sz="1400" dirty="0">
+                <a:latin typeface="Meiryo UI" panose="020B0604030504040204" pitchFamily="34" charset="-128"/>
+                <a:ea typeface="Meiryo UI" panose="020B0604030504040204" pitchFamily="34" charset="-128"/>
+              </a:rPr>
+              <a:t>FD</a:t>
+            </a:r>
+            <a:r>
+              <a:rPr lang="ja-JP" altLang="en-US" sz="1400">
+                <a:latin typeface="Meiryo UI" panose="020B0604030504040204" pitchFamily="34" charset="-128"/>
+                <a:ea typeface="Meiryo UI" panose="020B0604030504040204" pitchFamily="34" charset="-128"/>
+              </a:rPr>
+              <a:t>の監視対象をリセット</a:t>
+            </a:r>
+            <a:endParaRPr kumimoji="1" lang="ja-JP" altLang="en-US" sz="1400">
               <a:latin typeface="Meiryo UI" panose="020B0604030504040204" pitchFamily="34" charset="-128"/>
               <a:ea typeface="Meiryo UI" panose="020B0604030504040204" pitchFamily="34" charset="-128"/>
             </a:endParaRPr>
+          </a:p>
+        </p:txBody>
+      </p:sp>
+      <p:sp>
+        <p:nvSpPr>
+          <p:cNvPr id="25" name="テキスト ボックス 24">
+            <a:extLst>
+              <a:ext uri="{FF2B5EF4-FFF2-40B4-BE49-F238E27FC236}">
+                <a16:creationId xmlns:a16="http://schemas.microsoft.com/office/drawing/2014/main" id="{CCE0B52E-B869-D946-89D6-2157A078E0F6}"/>
+              </a:ext>
+            </a:extLst>
+          </p:cNvPr>
+          <p:cNvSpPr txBox="1"/>
+          <p:nvPr/>
+        </p:nvSpPr>
+        <p:spPr>
+          <a:xfrm>
+            <a:off x="5613779" y="3808327"/>
+            <a:ext cx="2592626" cy="307777"/>
+          </a:xfrm>
+          <a:prstGeom prst="rect">
+            <a:avLst/>
+          </a:prstGeom>
+          <a:solidFill>
+            <a:schemeClr val="bg1"/>
+          </a:solidFill>
+          <a:ln>
+            <a:noFill/>
+          </a:ln>
+        </p:spPr>
+        <p:txBody>
+          <a:bodyPr wrap="square" rtlCol="0">
+            <a:spAutoFit/>
+          </a:bodyPr>
+          <a:lstStyle/>
+          <a:p>
+            <a:pPr algn="ctr"/>
+            <a:r>
+              <a:rPr lang="ja-JP" altLang="en-US" sz="1400">
+                <a:latin typeface="Meiryo UI" panose="020B0604030504040204" pitchFamily="34" charset="-128"/>
+                <a:ea typeface="Meiryo UI" panose="020B0604030504040204" pitchFamily="34" charset="-128"/>
+              </a:rPr>
+              <a:t>監視対象の</a:t>
+            </a:r>
+            <a:r>
+              <a:rPr lang="en-US" altLang="ja-JP" sz="1400" dirty="0">
+                <a:latin typeface="Meiryo UI" panose="020B0604030504040204" pitchFamily="34" charset="-128"/>
+                <a:ea typeface="Meiryo UI" panose="020B0604030504040204" pitchFamily="34" charset="-128"/>
+              </a:rPr>
+              <a:t>FD</a:t>
+            </a:r>
+            <a:r>
+              <a:rPr lang="ja-JP" altLang="en-US" sz="1400">
+                <a:latin typeface="Meiryo UI" panose="020B0604030504040204" pitchFamily="34" charset="-128"/>
+                <a:ea typeface="Meiryo UI" panose="020B0604030504040204" pitchFamily="34" charset="-128"/>
+              </a:rPr>
+              <a:t>をセット</a:t>
+            </a:r>
+            <a:endParaRPr kumimoji="1" lang="ja-JP" altLang="en-US" sz="1400">
+              <a:latin typeface="Meiryo UI" panose="020B0604030504040204" pitchFamily="34" charset="-128"/>
+              <a:ea typeface="Meiryo UI" panose="020B0604030504040204" pitchFamily="34" charset="-128"/>
+            </a:endParaRPr>
+          </a:p>
+        </p:txBody>
+      </p:sp>
+      <p:sp>
+        <p:nvSpPr>
+          <p:cNvPr id="26" name="テキスト ボックス 25">
+            <a:extLst>
+              <a:ext uri="{FF2B5EF4-FFF2-40B4-BE49-F238E27FC236}">
+                <a16:creationId xmlns:a16="http://schemas.microsoft.com/office/drawing/2014/main" id="{21F757D7-94C9-9E4D-A7F0-D779A6BA0EEB}"/>
+              </a:ext>
+            </a:extLst>
+          </p:cNvPr>
+          <p:cNvSpPr txBox="1"/>
+          <p:nvPr/>
+        </p:nvSpPr>
+        <p:spPr>
+          <a:xfrm>
+            <a:off x="5558373" y="5435119"/>
+            <a:ext cx="2567860" cy="523220"/>
+          </a:xfrm>
+          <a:prstGeom prst="rect">
+            <a:avLst/>
+          </a:prstGeom>
+          <a:solidFill>
+            <a:schemeClr val="bg1"/>
+          </a:solidFill>
+          <a:ln>
+            <a:noFill/>
+          </a:ln>
+        </p:spPr>
+        <p:txBody>
+          <a:bodyPr wrap="square" rtlCol="0">
+            <a:spAutoFit/>
+          </a:bodyPr>
+          <a:lstStyle/>
+          <a:p>
+            <a:pPr algn="ctr"/>
+            <a:r>
+              <a:rPr lang="ja-JP" altLang="en-US" sz="1400">
+                <a:latin typeface="Meiryo UI" panose="020B0604030504040204" pitchFamily="34" charset="-128"/>
+                <a:ea typeface="Meiryo UI" panose="020B0604030504040204" pitchFamily="34" charset="-128"/>
+              </a:rPr>
+              <a:t>アクションがあった</a:t>
+            </a:r>
+            <a:r>
+              <a:rPr lang="en-US" altLang="ja-JP" sz="1400" dirty="0">
+                <a:latin typeface="Meiryo UI" panose="020B0604030504040204" pitchFamily="34" charset="-128"/>
+                <a:ea typeface="Meiryo UI" panose="020B0604030504040204" pitchFamily="34" charset="-128"/>
+              </a:rPr>
+              <a:t>FD</a:t>
+            </a:r>
+            <a:r>
+              <a:rPr lang="ja-JP" altLang="en-US" sz="1400">
+                <a:latin typeface="Meiryo UI" panose="020B0604030504040204" pitchFamily="34" charset="-128"/>
+                <a:ea typeface="Meiryo UI" panose="020B0604030504040204" pitchFamily="34" charset="-128"/>
+              </a:rPr>
+              <a:t>を判定し、</a:t>
+            </a:r>
+            <a:br>
+              <a:rPr lang="en-US" altLang="ja-JP" sz="1400" dirty="0">
+                <a:latin typeface="Meiryo UI" panose="020B0604030504040204" pitchFamily="34" charset="-128"/>
+                <a:ea typeface="Meiryo UI" panose="020B0604030504040204" pitchFamily="34" charset="-128"/>
+              </a:rPr>
+            </a:br>
+            <a:r>
+              <a:rPr lang="ja-JP" altLang="en-US" sz="1400">
+                <a:latin typeface="Meiryo UI" panose="020B0604030504040204" pitchFamily="34" charset="-128"/>
+                <a:ea typeface="Meiryo UI" panose="020B0604030504040204" pitchFamily="34" charset="-128"/>
+              </a:rPr>
+              <a:t>その</a:t>
+            </a:r>
+            <a:r>
+              <a:rPr lang="en-US" altLang="ja-JP" sz="1400" dirty="0">
+                <a:latin typeface="Meiryo UI" panose="020B0604030504040204" pitchFamily="34" charset="-128"/>
+                <a:ea typeface="Meiryo UI" panose="020B0604030504040204" pitchFamily="34" charset="-128"/>
+              </a:rPr>
+              <a:t>FD</a:t>
+            </a:r>
+            <a:r>
+              <a:rPr lang="ja-JP" altLang="en-US" sz="1400">
+                <a:latin typeface="Meiryo UI" panose="020B0604030504040204" pitchFamily="34" charset="-128"/>
+                <a:ea typeface="Meiryo UI" panose="020B0604030504040204" pitchFamily="34" charset="-128"/>
+              </a:rPr>
+              <a:t>に対して</a:t>
+            </a:r>
+            <a:r>
+              <a:rPr lang="en-US" altLang="ja-JP" sz="1400" dirty="0">
+                <a:latin typeface="Meiryo UI" panose="020B0604030504040204" pitchFamily="34" charset="-128"/>
+                <a:ea typeface="Meiryo UI" panose="020B0604030504040204" pitchFamily="34" charset="-128"/>
+              </a:rPr>
+              <a:t>read()/write()</a:t>
+            </a:r>
+          </a:p>
+        </p:txBody>
+      </p:sp>
+      <p:sp>
+        <p:nvSpPr>
+          <p:cNvPr id="28" name="テキスト ボックス 27">
+            <a:extLst>
+              <a:ext uri="{FF2B5EF4-FFF2-40B4-BE49-F238E27FC236}">
+                <a16:creationId xmlns:a16="http://schemas.microsoft.com/office/drawing/2014/main" id="{35D799FF-3516-F642-A386-391D4FC3D7A8}"/>
+              </a:ext>
+            </a:extLst>
+          </p:cNvPr>
+          <p:cNvSpPr txBox="1"/>
+          <p:nvPr/>
+        </p:nvSpPr>
+        <p:spPr>
+          <a:xfrm>
+            <a:off x="8585089" y="4848502"/>
+            <a:ext cx="3557173" cy="523220"/>
+          </a:xfrm>
+          <a:prstGeom prst="rect">
+            <a:avLst/>
+          </a:prstGeom>
+          <a:solidFill>
+            <a:schemeClr val="bg1"/>
+          </a:solidFill>
+          <a:ln>
+            <a:noFill/>
+          </a:ln>
+        </p:spPr>
+        <p:txBody>
+          <a:bodyPr wrap="square" rtlCol="0">
+            <a:spAutoFit/>
+          </a:bodyPr>
+          <a:lstStyle/>
+          <a:p>
+            <a:r>
+              <a:rPr kumimoji="1" lang="ja-JP" altLang="en-US" sz="1400">
+                <a:latin typeface="Meiryo UI" panose="020B0604030504040204" pitchFamily="34" charset="-128"/>
+                <a:ea typeface="Meiryo UI" panose="020B0604030504040204" pitchFamily="34" charset="-128"/>
+              </a:rPr>
+              <a:t>監視対象の</a:t>
+            </a:r>
+            <a:r>
+              <a:rPr kumimoji="1" lang="en-US" altLang="ja-JP" sz="1400" dirty="0">
+                <a:latin typeface="Meiryo UI" panose="020B0604030504040204" pitchFamily="34" charset="-128"/>
+                <a:ea typeface="Meiryo UI" panose="020B0604030504040204" pitchFamily="34" charset="-128"/>
+              </a:rPr>
+              <a:t>FD</a:t>
+            </a:r>
+            <a:r>
+              <a:rPr lang="ja-JP" altLang="en-US" sz="1400">
+                <a:latin typeface="Meiryo UI" panose="020B0604030504040204" pitchFamily="34" charset="-128"/>
+                <a:ea typeface="Meiryo UI" panose="020B0604030504040204" pitchFamily="34" charset="-128"/>
+              </a:rPr>
+              <a:t>が読み込み</a:t>
+            </a:r>
+            <a:r>
+              <a:rPr lang="en-US" altLang="ja-JP" sz="1400" dirty="0">
+                <a:latin typeface="Meiryo UI" panose="020B0604030504040204" pitchFamily="34" charset="-128"/>
+                <a:ea typeface="Meiryo UI" panose="020B0604030504040204" pitchFamily="34" charset="-128"/>
+              </a:rPr>
+              <a:t>/</a:t>
+            </a:r>
+            <a:r>
+              <a:rPr lang="ja-JP" altLang="en-US" sz="1400">
+                <a:latin typeface="Meiryo UI" panose="020B0604030504040204" pitchFamily="34" charset="-128"/>
+                <a:ea typeface="Meiryo UI" panose="020B0604030504040204" pitchFamily="34" charset="-128"/>
+              </a:rPr>
+              <a:t>書き込み</a:t>
+            </a:r>
+            <a:br>
+              <a:rPr lang="en-US" altLang="ja-JP" sz="1400" dirty="0">
+                <a:latin typeface="Meiryo UI" panose="020B0604030504040204" pitchFamily="34" charset="-128"/>
+                <a:ea typeface="Meiryo UI" panose="020B0604030504040204" pitchFamily="34" charset="-128"/>
+              </a:rPr>
+            </a:br>
+            <a:r>
+              <a:rPr lang="ja-JP" altLang="en-US" sz="1400">
+                <a:latin typeface="Meiryo UI" panose="020B0604030504040204" pitchFamily="34" charset="-128"/>
+                <a:ea typeface="Meiryo UI" panose="020B0604030504040204" pitchFamily="34" charset="-128"/>
+              </a:rPr>
+              <a:t>可能になる</a:t>
+            </a:r>
+            <a:r>
+              <a:rPr kumimoji="1" lang="ja-JP" altLang="en-US" sz="1400">
+                <a:latin typeface="Meiryo UI" panose="020B0604030504040204" pitchFamily="34" charset="-128"/>
+                <a:ea typeface="Meiryo UI" panose="020B0604030504040204" pitchFamily="34" charset="-128"/>
+              </a:rPr>
+              <a:t>まで待機</a:t>
+            </a:r>
           </a:p>
         </p:txBody>
       </p:sp>
@@ -5198,6 +5738,52 @@
           <a:chExt cx="0" cy="0"/>
         </a:xfrm>
       </p:grpSpPr>
+      <p:sp>
+        <p:nvSpPr>
+          <p:cNvPr id="80" name="テキスト ボックス 79">
+            <a:extLst>
+              <a:ext uri="{FF2B5EF4-FFF2-40B4-BE49-F238E27FC236}">
+                <a16:creationId xmlns:a16="http://schemas.microsoft.com/office/drawing/2014/main" id="{9DCB1AFB-75FA-0847-AF9E-33351907DD17}"/>
+              </a:ext>
+            </a:extLst>
+          </p:cNvPr>
+          <p:cNvSpPr txBox="1"/>
+          <p:nvPr/>
+        </p:nvSpPr>
+        <p:spPr>
+          <a:xfrm>
+            <a:off x="4006432" y="5074247"/>
+            <a:ext cx="737014" cy="276999"/>
+          </a:xfrm>
+          <a:prstGeom prst="rect">
+            <a:avLst/>
+          </a:prstGeom>
+          <a:noFill/>
+          <a:ln>
+            <a:noFill/>
+          </a:ln>
+        </p:spPr>
+        <p:txBody>
+          <a:bodyPr wrap="square" rtlCol="0">
+            <a:spAutoFit/>
+          </a:bodyPr>
+          <a:lstStyle/>
+          <a:p>
+            <a:pPr algn="ctr"/>
+            <a:r>
+              <a:rPr lang="en-US" altLang="ja-JP" sz="1200" dirty="0">
+                <a:latin typeface="Meiryo UI" panose="020B0604030504040204" pitchFamily="34" charset="-128"/>
+                <a:ea typeface="Meiryo UI" panose="020B0604030504040204" pitchFamily="34" charset="-128"/>
+              </a:rPr>
+              <a:t>No</a:t>
+            </a:r>
+            <a:endParaRPr kumimoji="1" lang="ja-JP" altLang="en-US" sz="1200">
+              <a:latin typeface="Meiryo UI" panose="020B0604030504040204" pitchFamily="34" charset="-128"/>
+              <a:ea typeface="Meiryo UI" panose="020B0604030504040204" pitchFamily="34" charset="-128"/>
+            </a:endParaRPr>
+          </a:p>
+        </p:txBody>
+      </p:sp>
       <p:sp>
         <p:nvSpPr>
           <p:cNvPr id="4" name="テキスト ボックス 3">
@@ -5999,12 +6585,1066 @@
           </a:p>
         </p:txBody>
       </p:sp>
+      <p:sp>
+        <p:nvSpPr>
+          <p:cNvPr id="29" name="テキスト ボックス 28">
+            <a:extLst>
+              <a:ext uri="{FF2B5EF4-FFF2-40B4-BE49-F238E27FC236}">
+                <a16:creationId xmlns:a16="http://schemas.microsoft.com/office/drawing/2014/main" id="{D9FC186B-BA6F-BE40-82D8-DFD56B3E07EF}"/>
+              </a:ext>
+            </a:extLst>
+          </p:cNvPr>
+          <p:cNvSpPr txBox="1"/>
+          <p:nvPr/>
+        </p:nvSpPr>
+        <p:spPr>
+          <a:xfrm>
+            <a:off x="1534746" y="5551215"/>
+            <a:ext cx="5104593" cy="307777"/>
+          </a:xfrm>
+          <a:prstGeom prst="rect">
+            <a:avLst/>
+          </a:prstGeom>
+          <a:noFill/>
+          <a:ln>
+            <a:solidFill>
+              <a:schemeClr val="bg1">
+                <a:lumMod val="50000"/>
+              </a:schemeClr>
+            </a:solidFill>
+          </a:ln>
+        </p:spPr>
+        <p:txBody>
+          <a:bodyPr wrap="square" rtlCol="0">
+            <a:spAutoFit/>
+          </a:bodyPr>
+          <a:lstStyle/>
+          <a:p>
+            <a:pPr algn="ctr"/>
+            <a:r>
+              <a:rPr lang="ja-JP" altLang="en-US" sz="1400">
+                <a:latin typeface="Meiryo UI" panose="020B0604030504040204" pitchFamily="34" charset="-128"/>
+                <a:ea typeface="Meiryo UI" panose="020B0604030504040204" pitchFamily="34" charset="-128"/>
+              </a:rPr>
+              <a:t>次のページへ</a:t>
+            </a:r>
+            <a:endParaRPr kumimoji="1" lang="ja-JP" altLang="en-US" sz="1400">
+              <a:latin typeface="Meiryo UI" panose="020B0604030504040204" pitchFamily="34" charset="-128"/>
+              <a:ea typeface="Meiryo UI" panose="020B0604030504040204" pitchFamily="34" charset="-128"/>
+            </a:endParaRPr>
+          </a:p>
+        </p:txBody>
+      </p:sp>
+      <p:cxnSp>
+        <p:nvCxnSpPr>
+          <p:cNvPr id="9" name="直線矢印コネクタ 8">
+            <a:extLst>
+              <a:ext uri="{FF2B5EF4-FFF2-40B4-BE49-F238E27FC236}">
+                <a16:creationId xmlns:a16="http://schemas.microsoft.com/office/drawing/2014/main" id="{7F16D483-64C6-F64E-84A0-86C050E7612C}"/>
+              </a:ext>
+            </a:extLst>
+          </p:cNvPr>
+          <p:cNvCxnSpPr>
+            <a:cxnSpLocks/>
+          </p:cNvCxnSpPr>
+          <p:nvPr/>
+        </p:nvCxnSpPr>
+        <p:spPr>
+          <a:xfrm>
+            <a:off x="4087042" y="1478998"/>
+            <a:ext cx="0" cy="164191"/>
+          </a:xfrm>
+          <a:prstGeom prst="straightConnector1">
+            <a:avLst/>
+          </a:prstGeom>
+          <a:ln>
+            <a:solidFill>
+              <a:schemeClr val="bg1">
+                <a:lumMod val="50000"/>
+              </a:schemeClr>
+            </a:solidFill>
+            <a:tailEnd type="triangle"/>
+          </a:ln>
+        </p:spPr>
+        <p:style>
+          <a:lnRef idx="1">
+            <a:schemeClr val="accent1"/>
+          </a:lnRef>
+          <a:fillRef idx="0">
+            <a:schemeClr val="accent1"/>
+          </a:fillRef>
+          <a:effectRef idx="0">
+            <a:schemeClr val="accent1"/>
+          </a:effectRef>
+          <a:fontRef idx="minor">
+            <a:schemeClr val="tx1"/>
+          </a:fontRef>
+        </p:style>
+      </p:cxnSp>
+      <p:cxnSp>
+        <p:nvCxnSpPr>
+          <p:cNvPr id="30" name="直線矢印コネクタ 29">
+            <a:extLst>
+              <a:ext uri="{FF2B5EF4-FFF2-40B4-BE49-F238E27FC236}">
+                <a16:creationId xmlns:a16="http://schemas.microsoft.com/office/drawing/2014/main" id="{4C40420E-FF29-1D45-A4D2-F98DFF74C3A5}"/>
+              </a:ext>
+            </a:extLst>
+          </p:cNvPr>
+          <p:cNvCxnSpPr>
+            <a:cxnSpLocks/>
+          </p:cNvCxnSpPr>
+          <p:nvPr/>
+        </p:nvCxnSpPr>
+        <p:spPr>
+          <a:xfrm>
+            <a:off x="4079162" y="1990721"/>
+            <a:ext cx="0" cy="208027"/>
+          </a:xfrm>
+          <a:prstGeom prst="straightConnector1">
+            <a:avLst/>
+          </a:prstGeom>
+          <a:ln>
+            <a:solidFill>
+              <a:schemeClr val="bg1">
+                <a:lumMod val="50000"/>
+              </a:schemeClr>
+            </a:solidFill>
+            <a:tailEnd type="triangle"/>
+          </a:ln>
+        </p:spPr>
+        <p:style>
+          <a:lnRef idx="1">
+            <a:schemeClr val="accent1"/>
+          </a:lnRef>
+          <a:fillRef idx="0">
+            <a:schemeClr val="accent1"/>
+          </a:fillRef>
+          <a:effectRef idx="0">
+            <a:schemeClr val="accent1"/>
+          </a:effectRef>
+          <a:fontRef idx="minor">
+            <a:schemeClr val="tx1"/>
+          </a:fontRef>
+        </p:style>
+      </p:cxnSp>
+      <p:cxnSp>
+        <p:nvCxnSpPr>
+          <p:cNvPr id="34" name="直線矢印コネクタ 33">
+            <a:extLst>
+              <a:ext uri="{FF2B5EF4-FFF2-40B4-BE49-F238E27FC236}">
+                <a16:creationId xmlns:a16="http://schemas.microsoft.com/office/drawing/2014/main" id="{55888517-6B5A-794E-880F-3D2132B4BDDE}"/>
+              </a:ext>
+            </a:extLst>
+          </p:cNvPr>
+          <p:cNvCxnSpPr>
+            <a:cxnSpLocks/>
+          </p:cNvCxnSpPr>
+          <p:nvPr/>
+        </p:nvCxnSpPr>
+        <p:spPr>
+          <a:xfrm>
+            <a:off x="4079162" y="2549698"/>
+            <a:ext cx="0" cy="208027"/>
+          </a:xfrm>
+          <a:prstGeom prst="straightConnector1">
+            <a:avLst/>
+          </a:prstGeom>
+          <a:ln>
+            <a:solidFill>
+              <a:schemeClr val="bg1">
+                <a:lumMod val="50000"/>
+              </a:schemeClr>
+            </a:solidFill>
+            <a:tailEnd type="triangle"/>
+          </a:ln>
+        </p:spPr>
+        <p:style>
+          <a:lnRef idx="1">
+            <a:schemeClr val="accent1"/>
+          </a:lnRef>
+          <a:fillRef idx="0">
+            <a:schemeClr val="accent1"/>
+          </a:fillRef>
+          <a:effectRef idx="0">
+            <a:schemeClr val="accent1"/>
+          </a:effectRef>
+          <a:fontRef idx="minor">
+            <a:schemeClr val="tx1"/>
+          </a:fontRef>
+        </p:style>
+      </p:cxnSp>
+      <p:cxnSp>
+        <p:nvCxnSpPr>
+          <p:cNvPr id="35" name="直線矢印コネクタ 34">
+            <a:extLst>
+              <a:ext uri="{FF2B5EF4-FFF2-40B4-BE49-F238E27FC236}">
+                <a16:creationId xmlns:a16="http://schemas.microsoft.com/office/drawing/2014/main" id="{EAA77157-9C79-F547-BD4F-8F948E485C06}"/>
+              </a:ext>
+            </a:extLst>
+          </p:cNvPr>
+          <p:cNvCxnSpPr>
+            <a:cxnSpLocks/>
+            <a:stCxn id="2" idx="2"/>
+          </p:cNvCxnSpPr>
+          <p:nvPr/>
+        </p:nvCxnSpPr>
+        <p:spPr>
+          <a:xfrm>
+            <a:off x="4087042" y="3510863"/>
+            <a:ext cx="0" cy="255250"/>
+          </a:xfrm>
+          <a:prstGeom prst="straightConnector1">
+            <a:avLst/>
+          </a:prstGeom>
+          <a:ln>
+            <a:solidFill>
+              <a:schemeClr val="bg1">
+                <a:lumMod val="50000"/>
+              </a:schemeClr>
+            </a:solidFill>
+            <a:tailEnd type="triangle"/>
+          </a:ln>
+        </p:spPr>
+        <p:style>
+          <a:lnRef idx="1">
+            <a:schemeClr val="accent1"/>
+          </a:lnRef>
+          <a:fillRef idx="0">
+            <a:schemeClr val="accent1"/>
+          </a:fillRef>
+          <a:effectRef idx="0">
+            <a:schemeClr val="accent1"/>
+          </a:effectRef>
+          <a:fontRef idx="minor">
+            <a:schemeClr val="tx1"/>
+          </a:fontRef>
+        </p:style>
+      </p:cxnSp>
+      <p:cxnSp>
+        <p:nvCxnSpPr>
+          <p:cNvPr id="36" name="直線矢印コネクタ 35">
+            <a:extLst>
+              <a:ext uri="{FF2B5EF4-FFF2-40B4-BE49-F238E27FC236}">
+                <a16:creationId xmlns:a16="http://schemas.microsoft.com/office/drawing/2014/main" id="{941C2C71-BFAB-AD48-9999-DAB341F6AF31}"/>
+              </a:ext>
+            </a:extLst>
+          </p:cNvPr>
+          <p:cNvCxnSpPr>
+            <a:cxnSpLocks/>
+          </p:cNvCxnSpPr>
+          <p:nvPr/>
+        </p:nvCxnSpPr>
+        <p:spPr>
+          <a:xfrm>
+            <a:off x="4079162" y="4073890"/>
+            <a:ext cx="0" cy="208027"/>
+          </a:xfrm>
+          <a:prstGeom prst="straightConnector1">
+            <a:avLst/>
+          </a:prstGeom>
+          <a:ln>
+            <a:solidFill>
+              <a:schemeClr val="bg1">
+                <a:lumMod val="50000"/>
+              </a:schemeClr>
+            </a:solidFill>
+            <a:tailEnd type="triangle"/>
+          </a:ln>
+        </p:spPr>
+        <p:style>
+          <a:lnRef idx="1">
+            <a:schemeClr val="accent1"/>
+          </a:lnRef>
+          <a:fillRef idx="0">
+            <a:schemeClr val="accent1"/>
+          </a:fillRef>
+          <a:effectRef idx="0">
+            <a:schemeClr val="accent1"/>
+          </a:effectRef>
+          <a:fontRef idx="minor">
+            <a:schemeClr val="tx1"/>
+          </a:fontRef>
+        </p:style>
+      </p:cxnSp>
+      <p:cxnSp>
+        <p:nvCxnSpPr>
+          <p:cNvPr id="37" name="直線矢印コネクタ 36">
+            <a:extLst>
+              <a:ext uri="{FF2B5EF4-FFF2-40B4-BE49-F238E27FC236}">
+                <a16:creationId xmlns:a16="http://schemas.microsoft.com/office/drawing/2014/main" id="{EB80361E-1ACB-3C4C-886C-86C477AE7E98}"/>
+              </a:ext>
+            </a:extLst>
+          </p:cNvPr>
+          <p:cNvCxnSpPr>
+            <a:cxnSpLocks/>
+            <a:endCxn id="29" idx="0"/>
+          </p:cNvCxnSpPr>
+          <p:nvPr/>
+        </p:nvCxnSpPr>
+        <p:spPr>
+          <a:xfrm>
+            <a:off x="4087042" y="5103942"/>
+            <a:ext cx="1" cy="447273"/>
+          </a:xfrm>
+          <a:prstGeom prst="straightConnector1">
+            <a:avLst/>
+          </a:prstGeom>
+          <a:ln>
+            <a:solidFill>
+              <a:schemeClr val="bg1">
+                <a:lumMod val="50000"/>
+              </a:schemeClr>
+            </a:solidFill>
+            <a:tailEnd type="triangle"/>
+          </a:ln>
+        </p:spPr>
+        <p:style>
+          <a:lnRef idx="1">
+            <a:schemeClr val="accent1"/>
+          </a:lnRef>
+          <a:fillRef idx="0">
+            <a:schemeClr val="accent1"/>
+          </a:fillRef>
+          <a:effectRef idx="0">
+            <a:schemeClr val="accent1"/>
+          </a:effectRef>
+          <a:fontRef idx="minor">
+            <a:schemeClr val="tx1"/>
+          </a:fontRef>
+        </p:style>
+      </p:cxnSp>
+      <p:cxnSp>
+        <p:nvCxnSpPr>
+          <p:cNvPr id="44" name="直線矢印コネクタ 43">
+            <a:extLst>
+              <a:ext uri="{FF2B5EF4-FFF2-40B4-BE49-F238E27FC236}">
+                <a16:creationId xmlns:a16="http://schemas.microsoft.com/office/drawing/2014/main" id="{BCDF8C7D-AC26-D246-9D0E-4812BE6223D5}"/>
+              </a:ext>
+            </a:extLst>
+          </p:cNvPr>
+          <p:cNvCxnSpPr>
+            <a:cxnSpLocks/>
+            <a:stCxn id="2" idx="3"/>
+            <a:endCxn id="14" idx="1"/>
+          </p:cNvCxnSpPr>
+          <p:nvPr/>
+        </p:nvCxnSpPr>
+        <p:spPr>
+          <a:xfrm>
+            <a:off x="5766683" y="3126343"/>
+            <a:ext cx="1550974" cy="2176"/>
+          </a:xfrm>
+          <a:prstGeom prst="straightConnector1">
+            <a:avLst/>
+          </a:prstGeom>
+          <a:ln>
+            <a:solidFill>
+              <a:schemeClr val="bg1">
+                <a:lumMod val="50000"/>
+              </a:schemeClr>
+            </a:solidFill>
+            <a:tailEnd type="triangle"/>
+          </a:ln>
+        </p:spPr>
+        <p:style>
+          <a:lnRef idx="1">
+            <a:schemeClr val="accent1"/>
+          </a:lnRef>
+          <a:fillRef idx="0">
+            <a:schemeClr val="accent1"/>
+          </a:fillRef>
+          <a:effectRef idx="0">
+            <a:schemeClr val="accent1"/>
+          </a:effectRef>
+          <a:fontRef idx="minor">
+            <a:schemeClr val="tx1"/>
+          </a:fontRef>
+        </p:style>
+      </p:cxnSp>
+      <p:cxnSp>
+        <p:nvCxnSpPr>
+          <p:cNvPr id="47" name="直線矢印コネクタ 46">
+            <a:extLst>
+              <a:ext uri="{FF2B5EF4-FFF2-40B4-BE49-F238E27FC236}">
+                <a16:creationId xmlns:a16="http://schemas.microsoft.com/office/drawing/2014/main" id="{4E968D4B-730D-E045-9243-199B311E8033}"/>
+              </a:ext>
+            </a:extLst>
+          </p:cNvPr>
+          <p:cNvCxnSpPr>
+            <a:cxnSpLocks/>
+            <a:endCxn id="25" idx="1"/>
+          </p:cNvCxnSpPr>
+          <p:nvPr/>
+        </p:nvCxnSpPr>
+        <p:spPr>
+          <a:xfrm flipV="1">
+            <a:off x="5766683" y="4715170"/>
+            <a:ext cx="1550973" cy="592"/>
+          </a:xfrm>
+          <a:prstGeom prst="straightConnector1">
+            <a:avLst/>
+          </a:prstGeom>
+          <a:ln>
+            <a:solidFill>
+              <a:schemeClr val="bg1">
+                <a:lumMod val="50000"/>
+              </a:schemeClr>
+            </a:solidFill>
+            <a:tailEnd type="triangle"/>
+          </a:ln>
+        </p:spPr>
+        <p:style>
+          <a:lnRef idx="1">
+            <a:schemeClr val="accent1"/>
+          </a:lnRef>
+          <a:fillRef idx="0">
+            <a:schemeClr val="accent1"/>
+          </a:fillRef>
+          <a:effectRef idx="0">
+            <a:schemeClr val="accent1"/>
+          </a:effectRef>
+          <a:fontRef idx="minor">
+            <a:schemeClr val="tx1"/>
+          </a:fontRef>
+        </p:style>
+      </p:cxnSp>
+      <p:cxnSp>
+        <p:nvCxnSpPr>
+          <p:cNvPr id="66" name="直線矢印コネクタ 65">
+            <a:extLst>
+              <a:ext uri="{FF2B5EF4-FFF2-40B4-BE49-F238E27FC236}">
+                <a16:creationId xmlns:a16="http://schemas.microsoft.com/office/drawing/2014/main" id="{E5965EF2-B5B6-0C47-8466-8CC0ECF5C42D}"/>
+              </a:ext>
+            </a:extLst>
+          </p:cNvPr>
+          <p:cNvCxnSpPr>
+            <a:cxnSpLocks/>
+          </p:cNvCxnSpPr>
+          <p:nvPr/>
+        </p:nvCxnSpPr>
+        <p:spPr>
+          <a:xfrm flipV="1">
+            <a:off x="11759979" y="1797078"/>
+            <a:ext cx="0" cy="3754137"/>
+          </a:xfrm>
+          <a:prstGeom prst="straightConnector1">
+            <a:avLst/>
+          </a:prstGeom>
+          <a:ln>
+            <a:solidFill>
+              <a:schemeClr val="bg1">
+                <a:lumMod val="50000"/>
+              </a:schemeClr>
+            </a:solidFill>
+            <a:tailEnd type="none"/>
+          </a:ln>
+        </p:spPr>
+        <p:style>
+          <a:lnRef idx="1">
+            <a:schemeClr val="accent1"/>
+          </a:lnRef>
+          <a:fillRef idx="0">
+            <a:schemeClr val="accent1"/>
+          </a:fillRef>
+          <a:effectRef idx="0">
+            <a:schemeClr val="accent1"/>
+          </a:effectRef>
+          <a:fontRef idx="minor">
+            <a:schemeClr val="tx1"/>
+          </a:fontRef>
+        </p:style>
+      </p:cxnSp>
+      <p:cxnSp>
+        <p:nvCxnSpPr>
+          <p:cNvPr id="69" name="直線矢印コネクタ 68">
+            <a:extLst>
+              <a:ext uri="{FF2B5EF4-FFF2-40B4-BE49-F238E27FC236}">
+                <a16:creationId xmlns:a16="http://schemas.microsoft.com/office/drawing/2014/main" id="{2B2E1FF0-A625-1A41-A8AC-E4635677981D}"/>
+              </a:ext>
+            </a:extLst>
+          </p:cNvPr>
+          <p:cNvCxnSpPr>
+            <a:cxnSpLocks/>
+            <a:stCxn id="10" idx="3"/>
+          </p:cNvCxnSpPr>
+          <p:nvPr/>
+        </p:nvCxnSpPr>
+        <p:spPr>
+          <a:xfrm>
+            <a:off x="6639338" y="1797078"/>
+            <a:ext cx="5120641" cy="717"/>
+          </a:xfrm>
+          <a:prstGeom prst="straightConnector1">
+            <a:avLst/>
+          </a:prstGeom>
+          <a:ln>
+            <a:solidFill>
+              <a:schemeClr val="bg1">
+                <a:lumMod val="50000"/>
+              </a:schemeClr>
+            </a:solidFill>
+            <a:headEnd type="triangle"/>
+            <a:tailEnd type="none"/>
+          </a:ln>
+        </p:spPr>
+        <p:style>
+          <a:lnRef idx="1">
+            <a:schemeClr val="accent1"/>
+          </a:lnRef>
+          <a:fillRef idx="0">
+            <a:schemeClr val="accent1"/>
+          </a:fillRef>
+          <a:effectRef idx="0">
+            <a:schemeClr val="accent1"/>
+          </a:effectRef>
+          <a:fontRef idx="minor">
+            <a:schemeClr val="tx1"/>
+          </a:fontRef>
+        </p:style>
+      </p:cxnSp>
+      <p:cxnSp>
+        <p:nvCxnSpPr>
+          <p:cNvPr id="75" name="直線矢印コネクタ 74">
+            <a:extLst>
+              <a:ext uri="{FF2B5EF4-FFF2-40B4-BE49-F238E27FC236}">
+                <a16:creationId xmlns:a16="http://schemas.microsoft.com/office/drawing/2014/main" id="{5E4E0E61-D94A-0848-8108-40B41354B59A}"/>
+              </a:ext>
+            </a:extLst>
+          </p:cNvPr>
+          <p:cNvCxnSpPr>
+            <a:cxnSpLocks/>
+          </p:cNvCxnSpPr>
+          <p:nvPr/>
+        </p:nvCxnSpPr>
+        <p:spPr>
+          <a:xfrm>
+            <a:off x="11194304" y="4718825"/>
+            <a:ext cx="565675" cy="0"/>
+          </a:xfrm>
+          <a:prstGeom prst="straightConnector1">
+            <a:avLst/>
+          </a:prstGeom>
+          <a:ln>
+            <a:solidFill>
+              <a:schemeClr val="bg1">
+                <a:lumMod val="50000"/>
+              </a:schemeClr>
+            </a:solidFill>
+            <a:headEnd type="none"/>
+            <a:tailEnd type="triangle"/>
+          </a:ln>
+        </p:spPr>
+        <p:style>
+          <a:lnRef idx="1">
+            <a:schemeClr val="accent1"/>
+          </a:lnRef>
+          <a:fillRef idx="0">
+            <a:schemeClr val="accent1"/>
+          </a:fillRef>
+          <a:effectRef idx="0">
+            <a:schemeClr val="accent1"/>
+          </a:effectRef>
+          <a:fontRef idx="minor">
+            <a:schemeClr val="tx1"/>
+          </a:fontRef>
+        </p:style>
+      </p:cxnSp>
+      <p:sp>
+        <p:nvSpPr>
+          <p:cNvPr id="77" name="テキスト ボックス 76">
+            <a:extLst>
+              <a:ext uri="{FF2B5EF4-FFF2-40B4-BE49-F238E27FC236}">
+                <a16:creationId xmlns:a16="http://schemas.microsoft.com/office/drawing/2014/main" id="{57212AFB-732C-B34B-B318-70B33AE4E248}"/>
+              </a:ext>
+            </a:extLst>
+          </p:cNvPr>
+          <p:cNvSpPr txBox="1"/>
+          <p:nvPr/>
+        </p:nvSpPr>
+        <p:spPr>
+          <a:xfrm>
+            <a:off x="6193041" y="2824189"/>
+            <a:ext cx="737014" cy="276999"/>
+          </a:xfrm>
+          <a:prstGeom prst="rect">
+            <a:avLst/>
+          </a:prstGeom>
+          <a:noFill/>
+          <a:ln>
+            <a:noFill/>
+          </a:ln>
+        </p:spPr>
+        <p:txBody>
+          <a:bodyPr wrap="square" rtlCol="0">
+            <a:spAutoFit/>
+          </a:bodyPr>
+          <a:lstStyle/>
+          <a:p>
+            <a:pPr algn="ctr"/>
+            <a:r>
+              <a:rPr lang="en-US" altLang="ja-JP" sz="1200" dirty="0">
+                <a:latin typeface="Meiryo UI" panose="020B0604030504040204" pitchFamily="34" charset="-128"/>
+                <a:ea typeface="Meiryo UI" panose="020B0604030504040204" pitchFamily="34" charset="-128"/>
+              </a:rPr>
+              <a:t>Yes</a:t>
+            </a:r>
+            <a:endParaRPr kumimoji="1" lang="ja-JP" altLang="en-US" sz="1200">
+              <a:latin typeface="Meiryo UI" panose="020B0604030504040204" pitchFamily="34" charset="-128"/>
+              <a:ea typeface="Meiryo UI" panose="020B0604030504040204" pitchFamily="34" charset="-128"/>
+            </a:endParaRPr>
+          </a:p>
+        </p:txBody>
+      </p:sp>
+      <p:sp>
+        <p:nvSpPr>
+          <p:cNvPr id="78" name="テキスト ボックス 77">
+            <a:extLst>
+              <a:ext uri="{FF2B5EF4-FFF2-40B4-BE49-F238E27FC236}">
+                <a16:creationId xmlns:a16="http://schemas.microsoft.com/office/drawing/2014/main" id="{80E81EE4-66FC-FE40-85B4-3297808E0670}"/>
+              </a:ext>
+            </a:extLst>
+          </p:cNvPr>
+          <p:cNvSpPr txBox="1"/>
+          <p:nvPr/>
+        </p:nvSpPr>
+        <p:spPr>
+          <a:xfrm>
+            <a:off x="4006432" y="3460320"/>
+            <a:ext cx="737014" cy="276999"/>
+          </a:xfrm>
+          <a:prstGeom prst="rect">
+            <a:avLst/>
+          </a:prstGeom>
+          <a:noFill/>
+          <a:ln>
+            <a:noFill/>
+          </a:ln>
+        </p:spPr>
+        <p:txBody>
+          <a:bodyPr wrap="square" rtlCol="0">
+            <a:spAutoFit/>
+          </a:bodyPr>
+          <a:lstStyle/>
+          <a:p>
+            <a:pPr algn="ctr"/>
+            <a:r>
+              <a:rPr lang="en-US" altLang="ja-JP" sz="1200" dirty="0">
+                <a:latin typeface="Meiryo UI" panose="020B0604030504040204" pitchFamily="34" charset="-128"/>
+                <a:ea typeface="Meiryo UI" panose="020B0604030504040204" pitchFamily="34" charset="-128"/>
+              </a:rPr>
+              <a:t>No</a:t>
+            </a:r>
+            <a:endParaRPr kumimoji="1" lang="ja-JP" altLang="en-US" sz="1200">
+              <a:latin typeface="Meiryo UI" panose="020B0604030504040204" pitchFamily="34" charset="-128"/>
+              <a:ea typeface="Meiryo UI" panose="020B0604030504040204" pitchFamily="34" charset="-128"/>
+            </a:endParaRPr>
+          </a:p>
+        </p:txBody>
+      </p:sp>
+      <p:sp>
+        <p:nvSpPr>
+          <p:cNvPr id="79" name="テキスト ボックス 78">
+            <a:extLst>
+              <a:ext uri="{FF2B5EF4-FFF2-40B4-BE49-F238E27FC236}">
+                <a16:creationId xmlns:a16="http://schemas.microsoft.com/office/drawing/2014/main" id="{B70F14C5-AC84-4A4A-88C3-AC1F7B7CD3D4}"/>
+              </a:ext>
+            </a:extLst>
+          </p:cNvPr>
+          <p:cNvSpPr txBox="1"/>
+          <p:nvPr/>
+        </p:nvSpPr>
+        <p:spPr>
+          <a:xfrm>
+            <a:off x="6193041" y="4398928"/>
+            <a:ext cx="737014" cy="276999"/>
+          </a:xfrm>
+          <a:prstGeom prst="rect">
+            <a:avLst/>
+          </a:prstGeom>
+          <a:noFill/>
+          <a:ln>
+            <a:noFill/>
+          </a:ln>
+        </p:spPr>
+        <p:txBody>
+          <a:bodyPr wrap="square" rtlCol="0">
+            <a:spAutoFit/>
+          </a:bodyPr>
+          <a:lstStyle/>
+          <a:p>
+            <a:pPr algn="ctr"/>
+            <a:r>
+              <a:rPr lang="en-US" altLang="ja-JP" sz="1200" dirty="0">
+                <a:latin typeface="Meiryo UI" panose="020B0604030504040204" pitchFamily="34" charset="-128"/>
+                <a:ea typeface="Meiryo UI" panose="020B0604030504040204" pitchFamily="34" charset="-128"/>
+              </a:rPr>
+              <a:t>Yes</a:t>
+            </a:r>
+            <a:endParaRPr kumimoji="1" lang="ja-JP" altLang="en-US" sz="1200">
+              <a:latin typeface="Meiryo UI" panose="020B0604030504040204" pitchFamily="34" charset="-128"/>
+              <a:ea typeface="Meiryo UI" panose="020B0604030504040204" pitchFamily="34" charset="-128"/>
+            </a:endParaRPr>
+          </a:p>
+        </p:txBody>
+      </p:sp>
+      <p:cxnSp>
+        <p:nvCxnSpPr>
+          <p:cNvPr id="83" name="直線矢印コネクタ 82">
+            <a:extLst>
+              <a:ext uri="{FF2B5EF4-FFF2-40B4-BE49-F238E27FC236}">
+                <a16:creationId xmlns:a16="http://schemas.microsoft.com/office/drawing/2014/main" id="{A44D610D-B1CB-D343-AD00-FF72A0F09B61}"/>
+              </a:ext>
+            </a:extLst>
+          </p:cNvPr>
+          <p:cNvCxnSpPr>
+            <a:cxnSpLocks/>
+            <a:stCxn id="16" idx="3"/>
+          </p:cNvCxnSpPr>
+          <p:nvPr/>
+        </p:nvCxnSpPr>
+        <p:spPr>
+          <a:xfrm>
+            <a:off x="6639338" y="3920002"/>
+            <a:ext cx="2616641" cy="10510"/>
+          </a:xfrm>
+          <a:prstGeom prst="straightConnector1">
+            <a:avLst/>
+          </a:prstGeom>
+          <a:ln>
+            <a:solidFill>
+              <a:schemeClr val="bg1">
+                <a:lumMod val="50000"/>
+              </a:schemeClr>
+            </a:solidFill>
+            <a:headEnd type="triangle"/>
+            <a:tailEnd type="none"/>
+          </a:ln>
+        </p:spPr>
+        <p:style>
+          <a:lnRef idx="1">
+            <a:schemeClr val="accent1"/>
+          </a:lnRef>
+          <a:fillRef idx="0">
+            <a:schemeClr val="accent1"/>
+          </a:fillRef>
+          <a:effectRef idx="0">
+            <a:schemeClr val="accent1"/>
+          </a:effectRef>
+          <a:fontRef idx="minor">
+            <a:schemeClr val="tx1"/>
+          </a:fontRef>
+        </p:style>
+      </p:cxnSp>
+      <p:cxnSp>
+        <p:nvCxnSpPr>
+          <p:cNvPr id="86" name="直線矢印コネクタ 85">
+            <a:extLst>
+              <a:ext uri="{FF2B5EF4-FFF2-40B4-BE49-F238E27FC236}">
+                <a16:creationId xmlns:a16="http://schemas.microsoft.com/office/drawing/2014/main" id="{86773B5A-0DC1-0643-96BD-D5B9DE984680}"/>
+              </a:ext>
+            </a:extLst>
+          </p:cNvPr>
+          <p:cNvCxnSpPr>
+            <a:cxnSpLocks/>
+            <a:endCxn id="14" idx="2"/>
+          </p:cNvCxnSpPr>
+          <p:nvPr/>
+        </p:nvCxnSpPr>
+        <p:spPr>
+          <a:xfrm flipV="1">
+            <a:off x="9255979" y="3282407"/>
+            <a:ext cx="2" cy="648105"/>
+          </a:xfrm>
+          <a:prstGeom prst="straightConnector1">
+            <a:avLst/>
+          </a:prstGeom>
+          <a:ln>
+            <a:solidFill>
+              <a:schemeClr val="bg1">
+                <a:lumMod val="50000"/>
+              </a:schemeClr>
+            </a:solidFill>
+            <a:headEnd type="none"/>
+            <a:tailEnd type="none"/>
+          </a:ln>
+        </p:spPr>
+        <p:style>
+          <a:lnRef idx="1">
+            <a:schemeClr val="accent1"/>
+          </a:lnRef>
+          <a:fillRef idx="0">
+            <a:schemeClr val="accent1"/>
+          </a:fillRef>
+          <a:effectRef idx="0">
+            <a:schemeClr val="accent1"/>
+          </a:effectRef>
+          <a:fontRef idx="minor">
+            <a:schemeClr val="tx1"/>
+          </a:fontRef>
+        </p:style>
+      </p:cxnSp>
+      <p:sp>
+        <p:nvSpPr>
+          <p:cNvPr id="48" name="テキスト ボックス 47">
+            <a:extLst>
+              <a:ext uri="{FF2B5EF4-FFF2-40B4-BE49-F238E27FC236}">
+                <a16:creationId xmlns:a16="http://schemas.microsoft.com/office/drawing/2014/main" id="{D7163A69-0C77-3641-A629-1A6317FC08C4}"/>
+              </a:ext>
+            </a:extLst>
+          </p:cNvPr>
+          <p:cNvSpPr txBox="1"/>
+          <p:nvPr/>
+        </p:nvSpPr>
+        <p:spPr>
+          <a:xfrm flipH="1">
+            <a:off x="10793330" y="5551215"/>
+            <a:ext cx="1367621" cy="307777"/>
+          </a:xfrm>
+          <a:prstGeom prst="rect">
+            <a:avLst/>
+          </a:prstGeom>
+          <a:noFill/>
+          <a:ln>
+            <a:solidFill>
+              <a:schemeClr val="bg1">
+                <a:lumMod val="50000"/>
+              </a:schemeClr>
+            </a:solidFill>
+          </a:ln>
+        </p:spPr>
+        <p:txBody>
+          <a:bodyPr wrap="square" rtlCol="0">
+            <a:spAutoFit/>
+          </a:bodyPr>
+          <a:lstStyle/>
+          <a:p>
+            <a:pPr algn="ctr"/>
+            <a:r>
+              <a:rPr lang="ja-JP" altLang="en-US" sz="1400">
+                <a:latin typeface="Meiryo UI" panose="020B0604030504040204" pitchFamily="34" charset="-128"/>
+                <a:ea typeface="Meiryo UI" panose="020B0604030504040204" pitchFamily="34" charset="-128"/>
+              </a:rPr>
+              <a:t>次のページから</a:t>
+            </a:r>
+            <a:endParaRPr kumimoji="1" lang="ja-JP" altLang="en-US" sz="1400">
+              <a:latin typeface="Meiryo UI" panose="020B0604030504040204" pitchFamily="34" charset="-128"/>
+              <a:ea typeface="Meiryo UI" panose="020B0604030504040204" pitchFamily="34" charset="-128"/>
+            </a:endParaRPr>
+          </a:p>
+        </p:txBody>
+      </p:sp>
+    </p:spTree>
+    <p:extLst>
+      <p:ext uri="{BB962C8B-B14F-4D97-AF65-F5344CB8AC3E}">
+        <p14:creationId xmlns:p14="http://schemas.microsoft.com/office/powerpoint/2010/main" val="2330217076"/>
+      </p:ext>
+    </p:extLst>
+  </p:cSld>
+  <p:clrMapOvr>
+    <a:masterClrMapping/>
+  </p:clrMapOvr>
+</p:sld>
+</file>
+
+<file path=ppt/slides/slide12.xml><?xml version="1.0" encoding="utf-8"?>
+<p:sld xmlns:a="http://schemas.openxmlformats.org/drawingml/2006/main" xmlns:r="http://schemas.openxmlformats.org/officeDocument/2006/relationships" xmlns:p="http://schemas.openxmlformats.org/presentationml/2006/main">
+  <p:cSld>
+    <p:spTree>
+      <p:nvGrpSpPr>
+        <p:cNvPr id="1" name=""/>
+        <p:cNvGrpSpPr/>
+        <p:nvPr/>
+      </p:nvGrpSpPr>
+      <p:grpSpPr>
+        <a:xfrm>
+          <a:off x="0" y="0"/>
+          <a:ext cx="0" cy="0"/>
+          <a:chOff x="0" y="0"/>
+          <a:chExt cx="0" cy="0"/>
+        </a:xfrm>
+      </p:grpSpPr>
+      <p:sp>
+        <p:nvSpPr>
+          <p:cNvPr id="4" name="テキスト ボックス 3">
+            <a:extLst>
+              <a:ext uri="{FF2B5EF4-FFF2-40B4-BE49-F238E27FC236}">
+                <a16:creationId xmlns:a16="http://schemas.microsoft.com/office/drawing/2014/main" id="{C6F28238-545B-FE4D-82DF-4A52F66D8557}"/>
+              </a:ext>
+            </a:extLst>
+          </p:cNvPr>
+          <p:cNvSpPr txBox="1"/>
+          <p:nvPr/>
+        </p:nvSpPr>
+        <p:spPr>
+          <a:xfrm>
+            <a:off x="389613" y="238540"/>
+            <a:ext cx="5524489" cy="400110"/>
+          </a:xfrm>
+          <a:prstGeom prst="rect">
+            <a:avLst/>
+          </a:prstGeom>
+          <a:noFill/>
+        </p:spPr>
+        <p:txBody>
+          <a:bodyPr wrap="square" rtlCol="0">
+            <a:spAutoFit/>
+          </a:bodyPr>
+          <a:lstStyle/>
+          <a:p>
+            <a:r>
+              <a:rPr lang="ja-JP" altLang="en-US" sz="2000">
+                <a:latin typeface="Meiryo UI" panose="020B0604030504040204" pitchFamily="34" charset="-128"/>
+                <a:ea typeface="Meiryo UI" panose="020B0604030504040204" pitchFamily="34" charset="-128"/>
+              </a:rPr>
+              <a:t>サーバーの</a:t>
+            </a:r>
+            <a:r>
+              <a:rPr lang="en-US" altLang="ja-JP" sz="2000" dirty="0">
+                <a:latin typeface="Meiryo UI" panose="020B0604030504040204" pitchFamily="34" charset="-128"/>
+                <a:ea typeface="Meiryo UI" panose="020B0604030504040204" pitchFamily="34" charset="-128"/>
+              </a:rPr>
+              <a:t>accept</a:t>
+            </a:r>
+            <a:r>
+              <a:rPr lang="ja-JP" altLang="en-US" sz="2000">
+                <a:latin typeface="Meiryo UI" panose="020B0604030504040204" pitchFamily="34" charset="-128"/>
+                <a:ea typeface="Meiryo UI" panose="020B0604030504040204" pitchFamily="34" charset="-128"/>
+              </a:rPr>
+              <a:t>、</a:t>
+            </a:r>
+            <a:r>
+              <a:rPr lang="en-US" altLang="ja-JP" sz="2000" dirty="0">
+                <a:latin typeface="Meiryo UI" panose="020B0604030504040204" pitchFamily="34" charset="-128"/>
+                <a:ea typeface="Meiryo UI" panose="020B0604030504040204" pitchFamily="34" charset="-128"/>
+              </a:rPr>
+              <a:t>read/write</a:t>
+            </a:r>
+            <a:r>
+              <a:rPr lang="ja-JP" altLang="en-US" sz="2000">
+                <a:latin typeface="Meiryo UI" panose="020B0604030504040204" pitchFamily="34" charset="-128"/>
+                <a:ea typeface="Meiryo UI" panose="020B0604030504040204" pitchFamily="34" charset="-128"/>
+              </a:rPr>
+              <a:t>の管理</a:t>
+            </a:r>
+            <a:endParaRPr kumimoji="1" lang="ja-JP" altLang="en-US" sz="2000">
+              <a:latin typeface="Meiryo UI" panose="020B0604030504040204" pitchFamily="34" charset="-128"/>
+              <a:ea typeface="Meiryo UI" panose="020B0604030504040204" pitchFamily="34" charset="-128"/>
+            </a:endParaRPr>
+          </a:p>
+        </p:txBody>
+      </p:sp>
+      <p:sp>
+        <p:nvSpPr>
+          <p:cNvPr id="5" name="テキスト ボックス 4">
+            <a:extLst>
+              <a:ext uri="{FF2B5EF4-FFF2-40B4-BE49-F238E27FC236}">
+                <a16:creationId xmlns:a16="http://schemas.microsoft.com/office/drawing/2014/main" id="{9A39A8E0-12D8-A244-9477-FC8446CD31BF}"/>
+              </a:ext>
+            </a:extLst>
+          </p:cNvPr>
+          <p:cNvSpPr txBox="1"/>
+          <p:nvPr/>
+        </p:nvSpPr>
+        <p:spPr>
+          <a:xfrm>
+            <a:off x="1025185" y="652710"/>
+            <a:ext cx="4667417" cy="400110"/>
+          </a:xfrm>
+          <a:prstGeom prst="rect">
+            <a:avLst/>
+          </a:prstGeom>
+          <a:noFill/>
+        </p:spPr>
+        <p:txBody>
+          <a:bodyPr wrap="square" rtlCol="0">
+            <a:spAutoFit/>
+          </a:bodyPr>
+          <a:lstStyle/>
+          <a:p>
+            <a:r>
+              <a:rPr lang="ja-JP" altLang="en-US" sz="2000">
+                <a:latin typeface="Meiryo UI" panose="020B0604030504040204" pitchFamily="34" charset="-128"/>
+                <a:ea typeface="Meiryo UI" panose="020B0604030504040204" pitchFamily="34" charset="-128"/>
+              </a:rPr>
+              <a:t>実装した</a:t>
+            </a:r>
+            <a:r>
+              <a:rPr lang="en-US" altLang="ja-JP" sz="2000" dirty="0" err="1">
+                <a:latin typeface="Meiryo UI" panose="020B0604030504040204" pitchFamily="34" charset="-128"/>
+                <a:ea typeface="Meiryo UI" panose="020B0604030504040204" pitchFamily="34" charset="-128"/>
+              </a:rPr>
+              <a:t>Webserv</a:t>
+            </a:r>
+            <a:r>
+              <a:rPr lang="ja-JP" altLang="en-US" sz="2000">
+                <a:latin typeface="Meiryo UI" panose="020B0604030504040204" pitchFamily="34" charset="-128"/>
+                <a:ea typeface="Meiryo UI" panose="020B0604030504040204" pitchFamily="34" charset="-128"/>
+              </a:rPr>
+              <a:t>のサーバー処理フロー</a:t>
+            </a:r>
+            <a:endParaRPr lang="en-US" altLang="ja-JP" sz="2000" dirty="0">
+              <a:latin typeface="Meiryo UI" panose="020B0604030504040204" pitchFamily="34" charset="-128"/>
+              <a:ea typeface="Meiryo UI" panose="020B0604030504040204" pitchFamily="34" charset="-128"/>
+            </a:endParaRPr>
+          </a:p>
+        </p:txBody>
+      </p:sp>
+      <p:sp>
+        <p:nvSpPr>
+          <p:cNvPr id="13" name="テキスト ボックス 12">
+            <a:extLst>
+              <a:ext uri="{FF2B5EF4-FFF2-40B4-BE49-F238E27FC236}">
+                <a16:creationId xmlns:a16="http://schemas.microsoft.com/office/drawing/2014/main" id="{3155AE9A-1B7B-F64E-98DE-EBF9FBD38A08}"/>
+              </a:ext>
+            </a:extLst>
+          </p:cNvPr>
+          <p:cNvSpPr txBox="1"/>
+          <p:nvPr/>
+        </p:nvSpPr>
+        <p:spPr>
+          <a:xfrm>
+            <a:off x="1534746" y="1171221"/>
+            <a:ext cx="5104592" cy="307777"/>
+          </a:xfrm>
+          <a:prstGeom prst="rect">
+            <a:avLst/>
+          </a:prstGeom>
+          <a:noFill/>
+          <a:ln>
+            <a:solidFill>
+              <a:schemeClr val="bg1">
+                <a:lumMod val="50000"/>
+              </a:schemeClr>
+            </a:solidFill>
+          </a:ln>
+        </p:spPr>
+        <p:txBody>
+          <a:bodyPr wrap="square" rtlCol="0">
+            <a:spAutoFit/>
+          </a:bodyPr>
+          <a:lstStyle/>
+          <a:p>
+            <a:pPr algn="ctr"/>
+            <a:r>
+              <a:rPr lang="ja-JP" altLang="en-US" sz="1400">
+                <a:latin typeface="Meiryo UI" panose="020B0604030504040204" pitchFamily="34" charset="-128"/>
+                <a:ea typeface="Meiryo UI" panose="020B0604030504040204" pitchFamily="34" charset="-128"/>
+              </a:rPr>
+              <a:t>前のページから</a:t>
+            </a:r>
+            <a:endParaRPr kumimoji="1" lang="ja-JP" altLang="en-US" sz="1400">
+              <a:latin typeface="Meiryo UI" panose="020B0604030504040204" pitchFamily="34" charset="-128"/>
+              <a:ea typeface="Meiryo UI" panose="020B0604030504040204" pitchFamily="34" charset="-128"/>
+            </a:endParaRPr>
+          </a:p>
+        </p:txBody>
+      </p:sp>
       <p:grpSp>
         <p:nvGrpSpPr>
-          <p:cNvPr id="7" name="グループ化 6">
-            <a:extLst>
-              <a:ext uri="{FF2B5EF4-FFF2-40B4-BE49-F238E27FC236}">
-                <a16:creationId xmlns:a16="http://schemas.microsoft.com/office/drawing/2014/main" id="{A5DBB60C-E2DF-404E-8493-A34F9010A295}"/>
+          <p:cNvPr id="6" name="グループ化 5">
+            <a:extLst>
+              <a:ext uri="{FF2B5EF4-FFF2-40B4-BE49-F238E27FC236}">
+                <a16:creationId xmlns:a16="http://schemas.microsoft.com/office/drawing/2014/main" id="{548BB63B-BF77-8A4E-821A-42AB87C305FC}"/>
               </a:ext>
             </a:extLst>
           </p:cNvPr>
@@ -6013,18 +7653,18 @@
         </p:nvGrpSpPr>
         <p:grpSpPr>
           <a:xfrm>
-            <a:off x="2407401" y="5340233"/>
+            <a:off x="2407401" y="1660412"/>
             <a:ext cx="3359282" cy="769040"/>
-            <a:chOff x="1767513" y="5347023"/>
+            <a:chOff x="1777261" y="2692955"/>
             <a:chExt cx="3359282" cy="769040"/>
           </a:xfrm>
         </p:grpSpPr>
         <p:sp>
           <p:nvSpPr>
-            <p:cNvPr id="27" name="テキスト ボックス 26">
+            <p:cNvPr id="12" name="テキスト ボックス 11">
               <a:extLst>
                 <a:ext uri="{FF2B5EF4-FFF2-40B4-BE49-F238E27FC236}">
-                  <a16:creationId xmlns:a16="http://schemas.microsoft.com/office/drawing/2014/main" id="{6CB108AF-7D42-F844-84F5-B44628DF5FDE}"/>
+                  <a16:creationId xmlns:a16="http://schemas.microsoft.com/office/drawing/2014/main" id="{08E3C1AB-0CBB-7F48-970A-C2251D47BB60}"/>
                 </a:ext>
               </a:extLst>
             </p:cNvPr>
@@ -6033,8 +7673,8 @@
           </p:nvSpPr>
           <p:spPr>
             <a:xfrm>
-              <a:off x="2082608" y="5577655"/>
-              <a:ext cx="2729093" cy="307777"/>
+              <a:off x="2572126" y="2841197"/>
+              <a:ext cx="1769552" cy="523220"/>
             </a:xfrm>
             <a:prstGeom prst="rect">
               <a:avLst/>
@@ -6052,14 +7692,14 @@
             <a:p>
               <a:pPr algn="ctr"/>
               <a:r>
-                <a:rPr kumimoji="1" lang="ja-JP" altLang="en-US" sz="1400">
+                <a:rPr lang="ja-JP" altLang="en-US" sz="1400">
                   <a:latin typeface="Meiryo UI" panose="020B0604030504040204" pitchFamily="34" charset="-128"/>
                   <a:ea typeface="Meiryo UI" panose="020B0604030504040204" pitchFamily="34" charset="-128"/>
                 </a:rPr>
-                <a:t>接続用の</a:t>
+                <a:t>接続用</a:t>
               </a:r>
               <a:r>
-                <a:rPr kumimoji="1" lang="en-US" altLang="ja-JP" sz="1400" dirty="0">
+                <a:rPr lang="en-US" altLang="ja-JP" sz="1400" dirty="0">
                   <a:latin typeface="Meiryo UI" panose="020B0604030504040204" pitchFamily="34" charset="-128"/>
                   <a:ea typeface="Meiryo UI" panose="020B0604030504040204" pitchFamily="34" charset="-128"/>
                 </a:rPr>
@@ -6070,14 +7710,14 @@
                   <a:latin typeface="Meiryo UI" panose="020B0604030504040204" pitchFamily="34" charset="-128"/>
                   <a:ea typeface="Meiryo UI" panose="020B0604030504040204" pitchFamily="34" charset="-128"/>
                 </a:rPr>
-                <a:t>は読み書き</a:t>
+                <a:t>の読み込みは可能</a:t>
               </a:r>
               <a:r>
                 <a:rPr lang="en-US" altLang="ja-JP" sz="1400" dirty="0">
                   <a:latin typeface="Meiryo UI" panose="020B0604030504040204" pitchFamily="34" charset="-128"/>
                   <a:ea typeface="Meiryo UI" panose="020B0604030504040204" pitchFamily="34" charset="-128"/>
                 </a:rPr>
-                <a:t>OK?</a:t>
+                <a:t>?</a:t>
               </a:r>
               <a:endParaRPr kumimoji="1" lang="ja-JP" altLang="en-US" sz="1400">
                 <a:latin typeface="Meiryo UI" panose="020B0604030504040204" pitchFamily="34" charset="-128"/>
@@ -6088,10 +7728,10 @@
         </p:sp>
         <p:sp>
           <p:nvSpPr>
-            <p:cNvPr id="28" name="ひし形 27">
+            <p:cNvPr id="2" name="ひし形 1">
               <a:extLst>
                 <a:ext uri="{FF2B5EF4-FFF2-40B4-BE49-F238E27FC236}">
-                  <a16:creationId xmlns:a16="http://schemas.microsoft.com/office/drawing/2014/main" id="{66CA31AF-02A5-9C43-BEBB-87DD27C5F373}"/>
+                  <a16:creationId xmlns:a16="http://schemas.microsoft.com/office/drawing/2014/main" id="{84F843A2-4A34-F241-B92C-9EFEA7DB8023}"/>
                 </a:ext>
               </a:extLst>
             </p:cNvPr>
@@ -6100,7 +7740,7 @@
           </p:nvSpPr>
           <p:spPr>
             <a:xfrm>
-              <a:off x="1767513" y="5347023"/>
+              <a:off x="1777261" y="2692955"/>
               <a:ext cx="3359282" cy="769040"/>
             </a:xfrm>
             <a:prstGeom prst="diamond">
@@ -6141,91 +7781,6 @@
           </p:txBody>
         </p:sp>
       </p:grpSp>
-      <p:sp>
-        <p:nvSpPr>
-          <p:cNvPr id="29" name="テキスト ボックス 28">
-            <a:extLst>
-              <a:ext uri="{FF2B5EF4-FFF2-40B4-BE49-F238E27FC236}">
-                <a16:creationId xmlns:a16="http://schemas.microsoft.com/office/drawing/2014/main" id="{D9FC186B-BA6F-BE40-82D8-DFD56B3E07EF}"/>
-              </a:ext>
-            </a:extLst>
-          </p:cNvPr>
-          <p:cNvSpPr txBox="1"/>
-          <p:nvPr/>
-        </p:nvSpPr>
-        <p:spPr>
-          <a:xfrm>
-            <a:off x="1534746" y="6327674"/>
-            <a:ext cx="5104593" cy="307777"/>
-          </a:xfrm>
-          <a:prstGeom prst="rect">
-            <a:avLst/>
-          </a:prstGeom>
-          <a:noFill/>
-          <a:ln>
-            <a:solidFill>
-              <a:schemeClr val="bg1">
-                <a:lumMod val="50000"/>
-              </a:schemeClr>
-            </a:solidFill>
-          </a:ln>
-        </p:spPr>
-        <p:txBody>
-          <a:bodyPr wrap="square" rtlCol="0">
-            <a:spAutoFit/>
-          </a:bodyPr>
-          <a:lstStyle/>
-          <a:p>
-            <a:pPr algn="ctr"/>
-            <a:r>
-              <a:rPr lang="en-US" altLang="ja-JP" sz="1400" dirty="0">
-                <a:latin typeface="Meiryo UI" panose="020B0604030504040204" pitchFamily="34" charset="-128"/>
-                <a:ea typeface="Meiryo UI" panose="020B0604030504040204" pitchFamily="34" charset="-128"/>
-              </a:rPr>
-              <a:t>read/write:</a:t>
-            </a:r>
-            <a:r>
-              <a:rPr lang="ja-JP" altLang="en-US" sz="1400">
-                <a:latin typeface="Meiryo UI" panose="020B0604030504040204" pitchFamily="34" charset="-128"/>
-                <a:ea typeface="Meiryo UI" panose="020B0604030504040204" pitchFamily="34" charset="-128"/>
-              </a:rPr>
-              <a:t>接続用の</a:t>
-            </a:r>
-            <a:r>
-              <a:rPr lang="en-US" altLang="ja-JP" sz="1400" dirty="0">
-                <a:latin typeface="Meiryo UI" panose="020B0604030504040204" pitchFamily="34" charset="-128"/>
-                <a:ea typeface="Meiryo UI" panose="020B0604030504040204" pitchFamily="34" charset="-128"/>
-              </a:rPr>
-              <a:t>FD</a:t>
-            </a:r>
-            <a:r>
-              <a:rPr lang="ja-JP" altLang="en-US" sz="1400">
-                <a:latin typeface="Meiryo UI" panose="020B0604030504040204" pitchFamily="34" charset="-128"/>
-                <a:ea typeface="Meiryo UI" panose="020B0604030504040204" pitchFamily="34" charset="-128"/>
-              </a:rPr>
-              <a:t>にリクエスト読み取り</a:t>
-            </a:r>
-            <a:r>
-              <a:rPr lang="en-US" altLang="ja-JP" sz="1400" dirty="0">
-                <a:latin typeface="Meiryo UI" panose="020B0604030504040204" pitchFamily="34" charset="-128"/>
-                <a:ea typeface="Meiryo UI" panose="020B0604030504040204" pitchFamily="34" charset="-128"/>
-              </a:rPr>
-              <a:t>/</a:t>
-            </a:r>
-            <a:r>
-              <a:rPr lang="ja-JP" altLang="en-US" sz="1400">
-                <a:latin typeface="Meiryo UI" panose="020B0604030504040204" pitchFamily="34" charset="-128"/>
-                <a:ea typeface="Meiryo UI" panose="020B0604030504040204" pitchFamily="34" charset="-128"/>
-              </a:rPr>
-              <a:t>レスポンス書き込み</a:t>
-            </a:r>
-            <a:endParaRPr kumimoji="1" lang="ja-JP" altLang="en-US" sz="1400">
-              <a:latin typeface="Meiryo UI" panose="020B0604030504040204" pitchFamily="34" charset="-128"/>
-              <a:ea typeface="Meiryo UI" panose="020B0604030504040204" pitchFamily="34" charset="-128"/>
-            </a:endParaRPr>
-          </a:p>
-        </p:txBody>
-      </p:sp>
       <p:cxnSp>
         <p:nvCxnSpPr>
           <p:cNvPr id="9" name="直線矢印コネクタ 8">
@@ -6244,98 +7799,6 @@
           <a:xfrm>
             <a:off x="4087042" y="1478998"/>
             <a:ext cx="0" cy="164191"/>
-          </a:xfrm>
-          <a:prstGeom prst="straightConnector1">
-            <a:avLst/>
-          </a:prstGeom>
-          <a:ln>
-            <a:solidFill>
-              <a:schemeClr val="bg1">
-                <a:lumMod val="50000"/>
-              </a:schemeClr>
-            </a:solidFill>
-            <a:tailEnd type="triangle"/>
-          </a:ln>
-        </p:spPr>
-        <p:style>
-          <a:lnRef idx="1">
-            <a:schemeClr val="accent1"/>
-          </a:lnRef>
-          <a:fillRef idx="0">
-            <a:schemeClr val="accent1"/>
-          </a:fillRef>
-          <a:effectRef idx="0">
-            <a:schemeClr val="accent1"/>
-          </a:effectRef>
-          <a:fontRef idx="minor">
-            <a:schemeClr val="tx1"/>
-          </a:fontRef>
-        </p:style>
-      </p:cxnSp>
-      <p:cxnSp>
-        <p:nvCxnSpPr>
-          <p:cNvPr id="30" name="直線矢印コネクタ 29">
-            <a:extLst>
-              <a:ext uri="{FF2B5EF4-FFF2-40B4-BE49-F238E27FC236}">
-                <a16:creationId xmlns:a16="http://schemas.microsoft.com/office/drawing/2014/main" id="{4C40420E-FF29-1D45-A4D2-F98DFF74C3A5}"/>
-              </a:ext>
-            </a:extLst>
-          </p:cNvPr>
-          <p:cNvCxnSpPr>
-            <a:cxnSpLocks/>
-          </p:cNvCxnSpPr>
-          <p:nvPr/>
-        </p:nvCxnSpPr>
-        <p:spPr>
-          <a:xfrm>
-            <a:off x="4079162" y="1990721"/>
-            <a:ext cx="0" cy="208027"/>
-          </a:xfrm>
-          <a:prstGeom prst="straightConnector1">
-            <a:avLst/>
-          </a:prstGeom>
-          <a:ln>
-            <a:solidFill>
-              <a:schemeClr val="bg1">
-                <a:lumMod val="50000"/>
-              </a:schemeClr>
-            </a:solidFill>
-            <a:tailEnd type="triangle"/>
-          </a:ln>
-        </p:spPr>
-        <p:style>
-          <a:lnRef idx="1">
-            <a:schemeClr val="accent1"/>
-          </a:lnRef>
-          <a:fillRef idx="0">
-            <a:schemeClr val="accent1"/>
-          </a:fillRef>
-          <a:effectRef idx="0">
-            <a:schemeClr val="accent1"/>
-          </a:effectRef>
-          <a:fontRef idx="minor">
-            <a:schemeClr val="tx1"/>
-          </a:fontRef>
-        </p:style>
-      </p:cxnSp>
-      <p:cxnSp>
-        <p:nvCxnSpPr>
-          <p:cNvPr id="34" name="直線矢印コネクタ 33">
-            <a:extLst>
-              <a:ext uri="{FF2B5EF4-FFF2-40B4-BE49-F238E27FC236}">
-                <a16:creationId xmlns:a16="http://schemas.microsoft.com/office/drawing/2014/main" id="{55888517-6B5A-794E-880F-3D2132B4BDDE}"/>
-              </a:ext>
-            </a:extLst>
-          </p:cNvPr>
-          <p:cNvCxnSpPr>
-            <a:cxnSpLocks/>
-          </p:cNvCxnSpPr>
-          <p:nvPr/>
-        </p:nvCxnSpPr>
-        <p:spPr>
-          <a:xfrm>
-            <a:off x="4079162" y="2549698"/>
-            <a:ext cx="0" cy="208027"/>
           </a:xfrm>
           <a:prstGeom prst="straightConnector1">
             <a:avLst/>
@@ -6376,151 +7839,14 @@
           <p:cNvCxnSpPr>
             <a:cxnSpLocks/>
             <a:stCxn id="2" idx="2"/>
+            <a:endCxn id="54" idx="0"/>
           </p:cNvCxnSpPr>
           <p:nvPr/>
         </p:nvCxnSpPr>
         <p:spPr>
           <a:xfrm>
-            <a:off x="4087042" y="3510863"/>
-            <a:ext cx="0" cy="255250"/>
-          </a:xfrm>
-          <a:prstGeom prst="straightConnector1">
-            <a:avLst/>
-          </a:prstGeom>
-          <a:ln>
-            <a:solidFill>
-              <a:schemeClr val="bg1">
-                <a:lumMod val="50000"/>
-              </a:schemeClr>
-            </a:solidFill>
-            <a:tailEnd type="triangle"/>
-          </a:ln>
-        </p:spPr>
-        <p:style>
-          <a:lnRef idx="1">
-            <a:schemeClr val="accent1"/>
-          </a:lnRef>
-          <a:fillRef idx="0">
-            <a:schemeClr val="accent1"/>
-          </a:fillRef>
-          <a:effectRef idx="0">
-            <a:schemeClr val="accent1"/>
-          </a:effectRef>
-          <a:fontRef idx="minor">
-            <a:schemeClr val="tx1"/>
-          </a:fontRef>
-        </p:style>
-      </p:cxnSp>
-      <p:cxnSp>
-        <p:nvCxnSpPr>
-          <p:cNvPr id="36" name="直線矢印コネクタ 35">
-            <a:extLst>
-              <a:ext uri="{FF2B5EF4-FFF2-40B4-BE49-F238E27FC236}">
-                <a16:creationId xmlns:a16="http://schemas.microsoft.com/office/drawing/2014/main" id="{941C2C71-BFAB-AD48-9999-DAB341F6AF31}"/>
-              </a:ext>
-            </a:extLst>
-          </p:cNvPr>
-          <p:cNvCxnSpPr>
-            <a:cxnSpLocks/>
-          </p:cNvCxnSpPr>
-          <p:nvPr/>
-        </p:nvCxnSpPr>
-        <p:spPr>
-          <a:xfrm>
-            <a:off x="4079162" y="4073890"/>
-            <a:ext cx="0" cy="208027"/>
-          </a:xfrm>
-          <a:prstGeom prst="straightConnector1">
-            <a:avLst/>
-          </a:prstGeom>
-          <a:ln>
-            <a:solidFill>
-              <a:schemeClr val="bg1">
-                <a:lumMod val="50000"/>
-              </a:schemeClr>
-            </a:solidFill>
-            <a:tailEnd type="triangle"/>
-          </a:ln>
-        </p:spPr>
-        <p:style>
-          <a:lnRef idx="1">
-            <a:schemeClr val="accent1"/>
-          </a:lnRef>
-          <a:fillRef idx="0">
-            <a:schemeClr val="accent1"/>
-          </a:fillRef>
-          <a:effectRef idx="0">
-            <a:schemeClr val="accent1"/>
-          </a:effectRef>
-          <a:fontRef idx="minor">
-            <a:schemeClr val="tx1"/>
-          </a:fontRef>
-        </p:style>
-      </p:cxnSp>
-      <p:cxnSp>
-        <p:nvCxnSpPr>
-          <p:cNvPr id="37" name="直線矢印コネクタ 36">
-            <a:extLst>
-              <a:ext uri="{FF2B5EF4-FFF2-40B4-BE49-F238E27FC236}">
-                <a16:creationId xmlns:a16="http://schemas.microsoft.com/office/drawing/2014/main" id="{EB80361E-1ACB-3C4C-886C-86C477AE7E98}"/>
-              </a:ext>
-            </a:extLst>
-          </p:cNvPr>
-          <p:cNvCxnSpPr>
-            <a:cxnSpLocks/>
-          </p:cNvCxnSpPr>
-          <p:nvPr/>
-        </p:nvCxnSpPr>
-        <p:spPr>
-          <a:xfrm>
-            <a:off x="4087042" y="5103942"/>
-            <a:ext cx="0" cy="220389"/>
-          </a:xfrm>
-          <a:prstGeom prst="straightConnector1">
-            <a:avLst/>
-          </a:prstGeom>
-          <a:ln>
-            <a:solidFill>
-              <a:schemeClr val="bg1">
-                <a:lumMod val="50000"/>
-              </a:schemeClr>
-            </a:solidFill>
-            <a:tailEnd type="triangle"/>
-          </a:ln>
-        </p:spPr>
-        <p:style>
-          <a:lnRef idx="1">
-            <a:schemeClr val="accent1"/>
-          </a:lnRef>
-          <a:fillRef idx="0">
-            <a:schemeClr val="accent1"/>
-          </a:fillRef>
-          <a:effectRef idx="0">
-            <a:schemeClr val="accent1"/>
-          </a:effectRef>
-          <a:fontRef idx="minor">
-            <a:schemeClr val="tx1"/>
-          </a:fontRef>
-        </p:style>
-      </p:cxnSp>
-      <p:cxnSp>
-        <p:nvCxnSpPr>
-          <p:cNvPr id="38" name="直線矢印コネクタ 37">
-            <a:extLst>
-              <a:ext uri="{FF2B5EF4-FFF2-40B4-BE49-F238E27FC236}">
-                <a16:creationId xmlns:a16="http://schemas.microsoft.com/office/drawing/2014/main" id="{25DE1841-0C19-DE4E-9D91-DC8DD7C6E0BC}"/>
-              </a:ext>
-            </a:extLst>
-          </p:cNvPr>
-          <p:cNvCxnSpPr>
-            <a:cxnSpLocks/>
-          </p:cNvCxnSpPr>
-          <p:nvPr/>
-        </p:nvCxnSpPr>
-        <p:spPr>
-          <a:xfrm>
-            <a:off x="4087042" y="6109273"/>
-            <a:ext cx="0" cy="208027"/>
+            <a:off x="4087042" y="2429452"/>
+            <a:ext cx="0" cy="1103236"/>
           </a:xfrm>
           <a:prstGeom prst="straightConnector1">
             <a:avLst/>
@@ -6561,272 +7887,13 @@
           <p:cNvCxnSpPr>
             <a:cxnSpLocks/>
             <a:stCxn id="2" idx="3"/>
-            <a:endCxn id="14" idx="1"/>
           </p:cNvCxnSpPr>
           <p:nvPr/>
         </p:nvCxnSpPr>
         <p:spPr>
           <a:xfrm>
-            <a:off x="5766683" y="3126343"/>
-            <a:ext cx="1550974" cy="2176"/>
-          </a:xfrm>
-          <a:prstGeom prst="straightConnector1">
-            <a:avLst/>
-          </a:prstGeom>
-          <a:ln>
-            <a:solidFill>
-              <a:schemeClr val="bg1">
-                <a:lumMod val="50000"/>
-              </a:schemeClr>
-            </a:solidFill>
-            <a:tailEnd type="triangle"/>
-          </a:ln>
-        </p:spPr>
-        <p:style>
-          <a:lnRef idx="1">
-            <a:schemeClr val="accent1"/>
-          </a:lnRef>
-          <a:fillRef idx="0">
-            <a:schemeClr val="accent1"/>
-          </a:fillRef>
-          <a:effectRef idx="0">
-            <a:schemeClr val="accent1"/>
-          </a:effectRef>
-          <a:fontRef idx="minor">
-            <a:schemeClr val="tx1"/>
-          </a:fontRef>
-        </p:style>
-      </p:cxnSp>
-      <p:cxnSp>
-        <p:nvCxnSpPr>
-          <p:cNvPr id="47" name="直線矢印コネクタ 46">
-            <a:extLst>
-              <a:ext uri="{FF2B5EF4-FFF2-40B4-BE49-F238E27FC236}">
-                <a16:creationId xmlns:a16="http://schemas.microsoft.com/office/drawing/2014/main" id="{4E968D4B-730D-E045-9243-199B311E8033}"/>
-              </a:ext>
-            </a:extLst>
-          </p:cNvPr>
-          <p:cNvCxnSpPr>
-            <a:cxnSpLocks/>
-            <a:endCxn id="25" idx="1"/>
-          </p:cNvCxnSpPr>
-          <p:nvPr/>
-        </p:nvCxnSpPr>
-        <p:spPr>
-          <a:xfrm flipV="1">
-            <a:off x="5766683" y="4715170"/>
-            <a:ext cx="1550973" cy="592"/>
-          </a:xfrm>
-          <a:prstGeom prst="straightConnector1">
-            <a:avLst/>
-          </a:prstGeom>
-          <a:ln>
-            <a:solidFill>
-              <a:schemeClr val="bg1">
-                <a:lumMod val="50000"/>
-              </a:schemeClr>
-            </a:solidFill>
-            <a:tailEnd type="triangle"/>
-          </a:ln>
-        </p:spPr>
-        <p:style>
-          <a:lnRef idx="1">
-            <a:schemeClr val="accent1"/>
-          </a:lnRef>
-          <a:fillRef idx="0">
-            <a:schemeClr val="accent1"/>
-          </a:fillRef>
-          <a:effectRef idx="0">
-            <a:schemeClr val="accent1"/>
-          </a:effectRef>
-          <a:fontRef idx="minor">
-            <a:schemeClr val="tx1"/>
-          </a:fontRef>
-        </p:style>
-      </p:cxnSp>
-      <p:sp>
-        <p:nvSpPr>
-          <p:cNvPr id="56" name="テキスト ボックス 55">
-            <a:extLst>
-              <a:ext uri="{FF2B5EF4-FFF2-40B4-BE49-F238E27FC236}">
-                <a16:creationId xmlns:a16="http://schemas.microsoft.com/office/drawing/2014/main" id="{2960831D-C1C0-A84E-8B30-F3203D821026}"/>
-              </a:ext>
-            </a:extLst>
-          </p:cNvPr>
-          <p:cNvSpPr txBox="1"/>
-          <p:nvPr/>
-        </p:nvSpPr>
-        <p:spPr>
-          <a:xfrm>
-            <a:off x="7317656" y="6309349"/>
-            <a:ext cx="3876647" cy="307777"/>
-          </a:xfrm>
-          <a:prstGeom prst="rect">
-            <a:avLst/>
-          </a:prstGeom>
-          <a:noFill/>
-          <a:ln>
-            <a:solidFill>
-              <a:schemeClr val="bg1">
-                <a:lumMod val="50000"/>
-              </a:schemeClr>
-            </a:solidFill>
-          </a:ln>
-        </p:spPr>
-        <p:txBody>
-          <a:bodyPr wrap="square" rtlCol="0">
-            <a:spAutoFit/>
-          </a:bodyPr>
-          <a:lstStyle/>
-          <a:p>
-            <a:pPr algn="ctr"/>
-            <a:r>
-              <a:rPr lang="en-US" altLang="ja-JP" sz="1400" dirty="0">
-                <a:latin typeface="Meiryo UI" panose="020B0604030504040204" pitchFamily="34" charset="-128"/>
-                <a:ea typeface="Meiryo UI" panose="020B0604030504040204" pitchFamily="34" charset="-128"/>
-              </a:rPr>
-              <a:t>close:</a:t>
-            </a:r>
-            <a:r>
-              <a:rPr lang="ja-JP" altLang="en-US" sz="1400">
-                <a:latin typeface="Meiryo UI" panose="020B0604030504040204" pitchFamily="34" charset="-128"/>
-                <a:ea typeface="Meiryo UI" panose="020B0604030504040204" pitchFamily="34" charset="-128"/>
-              </a:rPr>
-              <a:t>接続用の</a:t>
-            </a:r>
-            <a:r>
-              <a:rPr lang="en-US" altLang="ja-JP" sz="1400" dirty="0">
-                <a:latin typeface="Meiryo UI" panose="020B0604030504040204" pitchFamily="34" charset="-128"/>
-                <a:ea typeface="Meiryo UI" panose="020B0604030504040204" pitchFamily="34" charset="-128"/>
-              </a:rPr>
-              <a:t>FD</a:t>
-            </a:r>
-            <a:r>
-              <a:rPr lang="ja-JP" altLang="en-US" sz="1400">
-                <a:latin typeface="Meiryo UI" panose="020B0604030504040204" pitchFamily="34" charset="-128"/>
-                <a:ea typeface="Meiryo UI" panose="020B0604030504040204" pitchFamily="34" charset="-128"/>
-              </a:rPr>
-              <a:t>を終了処理</a:t>
-            </a:r>
-            <a:endParaRPr kumimoji="1" lang="ja-JP" altLang="en-US" sz="1400">
-              <a:latin typeface="Meiryo UI" panose="020B0604030504040204" pitchFamily="34" charset="-128"/>
-              <a:ea typeface="Meiryo UI" panose="020B0604030504040204" pitchFamily="34" charset="-128"/>
-            </a:endParaRPr>
-          </a:p>
-        </p:txBody>
-      </p:sp>
-      <p:cxnSp>
-        <p:nvCxnSpPr>
-          <p:cNvPr id="57" name="直線矢印コネクタ 56">
-            <a:extLst>
-              <a:ext uri="{FF2B5EF4-FFF2-40B4-BE49-F238E27FC236}">
-                <a16:creationId xmlns:a16="http://schemas.microsoft.com/office/drawing/2014/main" id="{08B08583-203B-DD42-B0BE-3AA9FE3923A2}"/>
-              </a:ext>
-            </a:extLst>
-          </p:cNvPr>
-          <p:cNvCxnSpPr>
-            <a:cxnSpLocks/>
-          </p:cNvCxnSpPr>
-          <p:nvPr/>
-        </p:nvCxnSpPr>
-        <p:spPr>
-          <a:xfrm>
-            <a:off x="5766683" y="5717439"/>
-            <a:ext cx="5993296" cy="7314"/>
-          </a:xfrm>
-          <a:prstGeom prst="straightConnector1">
-            <a:avLst/>
-          </a:prstGeom>
-          <a:ln>
-            <a:solidFill>
-              <a:schemeClr val="bg1">
-                <a:lumMod val="50000"/>
-              </a:schemeClr>
-            </a:solidFill>
-            <a:tailEnd type="triangle"/>
-          </a:ln>
-        </p:spPr>
-        <p:style>
-          <a:lnRef idx="1">
-            <a:schemeClr val="accent1"/>
-          </a:lnRef>
-          <a:fillRef idx="0">
-            <a:schemeClr val="accent1"/>
-          </a:fillRef>
-          <a:effectRef idx="0">
-            <a:schemeClr val="accent1"/>
-          </a:effectRef>
-          <a:fontRef idx="minor">
-            <a:schemeClr val="tx1"/>
-          </a:fontRef>
-        </p:style>
-      </p:cxnSp>
-      <p:cxnSp>
-        <p:nvCxnSpPr>
-          <p:cNvPr id="60" name="直線矢印コネクタ 59">
-            <a:extLst>
-              <a:ext uri="{FF2B5EF4-FFF2-40B4-BE49-F238E27FC236}">
-                <a16:creationId xmlns:a16="http://schemas.microsoft.com/office/drawing/2014/main" id="{6A986C66-E8EC-7749-8A68-CA1246B03C22}"/>
-              </a:ext>
-            </a:extLst>
-          </p:cNvPr>
-          <p:cNvCxnSpPr>
-            <a:cxnSpLocks/>
-            <a:endCxn id="56" idx="1"/>
-          </p:cNvCxnSpPr>
-          <p:nvPr/>
-        </p:nvCxnSpPr>
-        <p:spPr>
-          <a:xfrm flipV="1">
-            <a:off x="6639338" y="6463238"/>
-            <a:ext cx="678318" cy="18324"/>
-          </a:xfrm>
-          <a:prstGeom prst="straightConnector1">
-            <a:avLst/>
-          </a:prstGeom>
-          <a:ln>
-            <a:solidFill>
-              <a:schemeClr val="bg1">
-                <a:lumMod val="50000"/>
-              </a:schemeClr>
-            </a:solidFill>
-            <a:tailEnd type="triangle"/>
-          </a:ln>
-        </p:spPr>
-        <p:style>
-          <a:lnRef idx="1">
-            <a:schemeClr val="accent1"/>
-          </a:lnRef>
-          <a:fillRef idx="0">
-            <a:schemeClr val="accent1"/>
-          </a:fillRef>
-          <a:effectRef idx="0">
-            <a:schemeClr val="accent1"/>
-          </a:effectRef>
-          <a:fontRef idx="minor">
-            <a:schemeClr val="tx1"/>
-          </a:fontRef>
-        </p:style>
-      </p:cxnSp>
-      <p:cxnSp>
-        <p:nvCxnSpPr>
-          <p:cNvPr id="63" name="直線矢印コネクタ 62">
-            <a:extLst>
-              <a:ext uri="{FF2B5EF4-FFF2-40B4-BE49-F238E27FC236}">
-                <a16:creationId xmlns:a16="http://schemas.microsoft.com/office/drawing/2014/main" id="{89CD81F6-73A3-FE45-BB17-A2E69F5BEC6B}"/>
-              </a:ext>
-            </a:extLst>
-          </p:cNvPr>
-          <p:cNvCxnSpPr>
-            <a:cxnSpLocks/>
-            <a:stCxn id="56" idx="3"/>
-          </p:cNvCxnSpPr>
-          <p:nvPr/>
-        </p:nvCxnSpPr>
-        <p:spPr>
-          <a:xfrm>
-            <a:off x="11194303" y="6463238"/>
-            <a:ext cx="565676" cy="0"/>
+            <a:off x="5766683" y="2044932"/>
+            <a:ext cx="658636" cy="0"/>
           </a:xfrm>
           <a:prstGeom prst="straightConnector1">
             <a:avLst/>
@@ -6871,8 +7938,8 @@
         </p:nvCxnSpPr>
         <p:spPr>
           <a:xfrm flipV="1">
-            <a:off x="11759979" y="1797077"/>
-            <a:ext cx="0" cy="4658632"/>
+            <a:off x="11759979" y="1478999"/>
+            <a:ext cx="0" cy="4201819"/>
           </a:xfrm>
           <a:prstGeom prst="straightConnector1">
             <a:avLst/>
@@ -6883,7 +7950,657 @@
                 <a:lumMod val="50000"/>
               </a:schemeClr>
             </a:solidFill>
-            <a:tailEnd type="none"/>
+            <a:tailEnd type="triangle"/>
+          </a:ln>
+        </p:spPr>
+        <p:style>
+          <a:lnRef idx="1">
+            <a:schemeClr val="accent1"/>
+          </a:lnRef>
+          <a:fillRef idx="0">
+            <a:schemeClr val="accent1"/>
+          </a:fillRef>
+          <a:effectRef idx="0">
+            <a:schemeClr val="accent1"/>
+          </a:effectRef>
+          <a:fontRef idx="minor">
+            <a:schemeClr val="tx1"/>
+          </a:fontRef>
+        </p:style>
+      </p:cxnSp>
+      <p:sp>
+        <p:nvSpPr>
+          <p:cNvPr id="77" name="テキスト ボックス 76">
+            <a:extLst>
+              <a:ext uri="{FF2B5EF4-FFF2-40B4-BE49-F238E27FC236}">
+                <a16:creationId xmlns:a16="http://schemas.microsoft.com/office/drawing/2014/main" id="{57212AFB-732C-B34B-B318-70B33AE4E248}"/>
+              </a:ext>
+            </a:extLst>
+          </p:cNvPr>
+          <p:cNvSpPr txBox="1"/>
+          <p:nvPr/>
+        </p:nvSpPr>
+        <p:spPr>
+          <a:xfrm>
+            <a:off x="5701204" y="1734379"/>
+            <a:ext cx="737014" cy="276999"/>
+          </a:xfrm>
+          <a:prstGeom prst="rect">
+            <a:avLst/>
+          </a:prstGeom>
+          <a:noFill/>
+          <a:ln>
+            <a:noFill/>
+          </a:ln>
+        </p:spPr>
+        <p:txBody>
+          <a:bodyPr wrap="square" rtlCol="0">
+            <a:spAutoFit/>
+          </a:bodyPr>
+          <a:lstStyle/>
+          <a:p>
+            <a:pPr algn="ctr"/>
+            <a:r>
+              <a:rPr lang="en-US" altLang="ja-JP" sz="1200" dirty="0">
+                <a:latin typeface="Meiryo UI" panose="020B0604030504040204" pitchFamily="34" charset="-128"/>
+                <a:ea typeface="Meiryo UI" panose="020B0604030504040204" pitchFamily="34" charset="-128"/>
+              </a:rPr>
+              <a:t>Yes</a:t>
+            </a:r>
+            <a:endParaRPr kumimoji="1" lang="ja-JP" altLang="en-US" sz="1200">
+              <a:latin typeface="Meiryo UI" panose="020B0604030504040204" pitchFamily="34" charset="-128"/>
+              <a:ea typeface="Meiryo UI" panose="020B0604030504040204" pitchFamily="34" charset="-128"/>
+            </a:endParaRPr>
+          </a:p>
+        </p:txBody>
+      </p:sp>
+      <p:grpSp>
+        <p:nvGrpSpPr>
+          <p:cNvPr id="38" name="グループ化 37">
+            <a:extLst>
+              <a:ext uri="{FF2B5EF4-FFF2-40B4-BE49-F238E27FC236}">
+                <a16:creationId xmlns:a16="http://schemas.microsoft.com/office/drawing/2014/main" id="{D9FAB5F1-FA78-F049-9434-DEB7CBF6E04A}"/>
+              </a:ext>
+            </a:extLst>
+          </p:cNvPr>
+          <p:cNvGrpSpPr/>
+          <p:nvPr/>
+        </p:nvGrpSpPr>
+        <p:grpSpPr>
+          <a:xfrm>
+            <a:off x="6438218" y="1660412"/>
+            <a:ext cx="3359282" cy="769040"/>
+            <a:chOff x="1777261" y="2692955"/>
+            <a:chExt cx="3359282" cy="769040"/>
+          </a:xfrm>
+        </p:grpSpPr>
+        <p:sp>
+          <p:nvSpPr>
+            <p:cNvPr id="39" name="テキスト ボックス 38">
+              <a:extLst>
+                <a:ext uri="{FF2B5EF4-FFF2-40B4-BE49-F238E27FC236}">
+                  <a16:creationId xmlns:a16="http://schemas.microsoft.com/office/drawing/2014/main" id="{77BE98AA-5B56-5747-B64D-869734F26592}"/>
+                </a:ext>
+              </a:extLst>
+            </p:cNvPr>
+            <p:cNvSpPr txBox="1"/>
+            <p:nvPr/>
+          </p:nvSpPr>
+          <p:spPr>
+            <a:xfrm>
+              <a:off x="2572126" y="2890032"/>
+              <a:ext cx="1769552" cy="307777"/>
+            </a:xfrm>
+            <a:prstGeom prst="rect">
+              <a:avLst/>
+            </a:prstGeom>
+            <a:noFill/>
+            <a:ln>
+              <a:noFill/>
+            </a:ln>
+          </p:spPr>
+          <p:txBody>
+            <a:bodyPr wrap="square" rtlCol="0">
+              <a:spAutoFit/>
+            </a:bodyPr>
+            <a:lstStyle/>
+            <a:p>
+              <a:pPr algn="ctr"/>
+              <a:r>
+                <a:rPr lang="en-US" altLang="ja-JP" sz="1400" dirty="0">
+                  <a:latin typeface="Meiryo UI" panose="020B0604030504040204" pitchFamily="34" charset="-128"/>
+                  <a:ea typeface="Meiryo UI" panose="020B0604030504040204" pitchFamily="34" charset="-128"/>
+                </a:rPr>
+                <a:t>read() &gt; 0 ?</a:t>
+              </a:r>
+              <a:endParaRPr kumimoji="1" lang="ja-JP" altLang="en-US" sz="1400">
+                <a:latin typeface="Meiryo UI" panose="020B0604030504040204" pitchFamily="34" charset="-128"/>
+                <a:ea typeface="Meiryo UI" panose="020B0604030504040204" pitchFamily="34" charset="-128"/>
+              </a:endParaRPr>
+            </a:p>
+          </p:txBody>
+        </p:sp>
+        <p:sp>
+          <p:nvSpPr>
+            <p:cNvPr id="40" name="ひし形 39">
+              <a:extLst>
+                <a:ext uri="{FF2B5EF4-FFF2-40B4-BE49-F238E27FC236}">
+                  <a16:creationId xmlns:a16="http://schemas.microsoft.com/office/drawing/2014/main" id="{17D15BE3-A52E-4248-A3F2-15DB6588E332}"/>
+                </a:ext>
+              </a:extLst>
+            </p:cNvPr>
+            <p:cNvSpPr/>
+            <p:nvPr/>
+          </p:nvSpPr>
+          <p:spPr>
+            <a:xfrm>
+              <a:off x="1777261" y="2692955"/>
+              <a:ext cx="3359282" cy="769040"/>
+            </a:xfrm>
+            <a:prstGeom prst="diamond">
+              <a:avLst/>
+            </a:prstGeom>
+            <a:noFill/>
+            <a:ln>
+              <a:solidFill>
+                <a:schemeClr val="bg1">
+                  <a:lumMod val="50000"/>
+                </a:schemeClr>
+              </a:solidFill>
+            </a:ln>
+          </p:spPr>
+          <p:style>
+            <a:lnRef idx="2">
+              <a:schemeClr val="accent1">
+                <a:shade val="50000"/>
+              </a:schemeClr>
+            </a:lnRef>
+            <a:fillRef idx="1">
+              <a:schemeClr val="accent1"/>
+            </a:fillRef>
+            <a:effectRef idx="0">
+              <a:schemeClr val="accent1"/>
+            </a:effectRef>
+            <a:fontRef idx="minor">
+              <a:schemeClr val="lt1"/>
+            </a:fontRef>
+          </p:style>
+          <p:txBody>
+            <a:bodyPr rtlCol="0" anchor="ctr"/>
+            <a:lstStyle/>
+            <a:p>
+              <a:pPr algn="ctr"/>
+              <a:endParaRPr kumimoji="1" lang="ja-JP" altLang="en-US" sz="1600"/>
+            </a:p>
+          </p:txBody>
+        </p:sp>
+      </p:grpSp>
+      <p:sp>
+        <p:nvSpPr>
+          <p:cNvPr id="41" name="テキスト ボックス 40">
+            <a:extLst>
+              <a:ext uri="{FF2B5EF4-FFF2-40B4-BE49-F238E27FC236}">
+                <a16:creationId xmlns:a16="http://schemas.microsoft.com/office/drawing/2014/main" id="{ACDA9B2F-31D7-E149-A6BA-91F96B983FDA}"/>
+              </a:ext>
+            </a:extLst>
+          </p:cNvPr>
+          <p:cNvSpPr txBox="1"/>
+          <p:nvPr/>
+        </p:nvSpPr>
+        <p:spPr>
+          <a:xfrm>
+            <a:off x="9723952" y="1742968"/>
+            <a:ext cx="737014" cy="276999"/>
+          </a:xfrm>
+          <a:prstGeom prst="rect">
+            <a:avLst/>
+          </a:prstGeom>
+          <a:noFill/>
+          <a:ln>
+            <a:noFill/>
+          </a:ln>
+        </p:spPr>
+        <p:txBody>
+          <a:bodyPr wrap="square" rtlCol="0">
+            <a:spAutoFit/>
+          </a:bodyPr>
+          <a:lstStyle/>
+          <a:p>
+            <a:pPr algn="ctr"/>
+            <a:r>
+              <a:rPr lang="en-US" altLang="ja-JP" sz="1200" dirty="0">
+                <a:latin typeface="Meiryo UI" panose="020B0604030504040204" pitchFamily="34" charset="-128"/>
+                <a:ea typeface="Meiryo UI" panose="020B0604030504040204" pitchFamily="34" charset="-128"/>
+              </a:rPr>
+              <a:t>Yes</a:t>
+            </a:r>
+            <a:endParaRPr kumimoji="1" lang="ja-JP" altLang="en-US" sz="1200">
+              <a:latin typeface="Meiryo UI" panose="020B0604030504040204" pitchFamily="34" charset="-128"/>
+              <a:ea typeface="Meiryo UI" panose="020B0604030504040204" pitchFamily="34" charset="-128"/>
+            </a:endParaRPr>
+          </a:p>
+        </p:txBody>
+      </p:sp>
+      <p:cxnSp>
+        <p:nvCxnSpPr>
+          <p:cNvPr id="42" name="直線矢印コネクタ 41">
+            <a:extLst>
+              <a:ext uri="{FF2B5EF4-FFF2-40B4-BE49-F238E27FC236}">
+                <a16:creationId xmlns:a16="http://schemas.microsoft.com/office/drawing/2014/main" id="{6A92CD94-A9E3-BF46-AD89-CE00D17B39C1}"/>
+              </a:ext>
+            </a:extLst>
+          </p:cNvPr>
+          <p:cNvCxnSpPr>
+            <a:cxnSpLocks/>
+          </p:cNvCxnSpPr>
+          <p:nvPr/>
+        </p:nvCxnSpPr>
+        <p:spPr>
+          <a:xfrm>
+            <a:off x="9797500" y="2044932"/>
+            <a:ext cx="650514" cy="0"/>
+          </a:xfrm>
+          <a:prstGeom prst="straightConnector1">
+            <a:avLst/>
+          </a:prstGeom>
+          <a:ln>
+            <a:solidFill>
+              <a:schemeClr val="bg1">
+                <a:lumMod val="50000"/>
+              </a:schemeClr>
+            </a:solidFill>
+            <a:tailEnd type="triangle"/>
+          </a:ln>
+        </p:spPr>
+        <p:style>
+          <a:lnRef idx="1">
+            <a:schemeClr val="accent1"/>
+          </a:lnRef>
+          <a:fillRef idx="0">
+            <a:schemeClr val="accent1"/>
+          </a:fillRef>
+          <a:effectRef idx="0">
+            <a:schemeClr val="accent1"/>
+          </a:effectRef>
+          <a:fontRef idx="minor">
+            <a:schemeClr val="tx1"/>
+          </a:fontRef>
+        </p:style>
+      </p:cxnSp>
+      <p:sp>
+        <p:nvSpPr>
+          <p:cNvPr id="45" name="テキスト ボックス 44">
+            <a:extLst>
+              <a:ext uri="{FF2B5EF4-FFF2-40B4-BE49-F238E27FC236}">
+                <a16:creationId xmlns:a16="http://schemas.microsoft.com/office/drawing/2014/main" id="{AA184CB5-5F95-9840-BD5C-470C5163470C}"/>
+              </a:ext>
+            </a:extLst>
+          </p:cNvPr>
+          <p:cNvSpPr txBox="1"/>
+          <p:nvPr/>
+        </p:nvSpPr>
+        <p:spPr>
+          <a:xfrm>
+            <a:off x="10657254" y="1171221"/>
+            <a:ext cx="1416447" cy="307777"/>
+          </a:xfrm>
+          <a:prstGeom prst="rect">
+            <a:avLst/>
+          </a:prstGeom>
+          <a:noFill/>
+          <a:ln>
+            <a:solidFill>
+              <a:schemeClr val="bg1">
+                <a:lumMod val="50000"/>
+              </a:schemeClr>
+            </a:solidFill>
+          </a:ln>
+        </p:spPr>
+        <p:txBody>
+          <a:bodyPr wrap="square" rtlCol="0">
+            <a:spAutoFit/>
+          </a:bodyPr>
+          <a:lstStyle/>
+          <a:p>
+            <a:pPr algn="ctr"/>
+            <a:r>
+              <a:rPr lang="ja-JP" altLang="en-US" sz="1400">
+                <a:latin typeface="Meiryo UI" panose="020B0604030504040204" pitchFamily="34" charset="-128"/>
+                <a:ea typeface="Meiryo UI" panose="020B0604030504040204" pitchFamily="34" charset="-128"/>
+              </a:rPr>
+              <a:t>前のページへ</a:t>
+            </a:r>
+            <a:endParaRPr kumimoji="1" lang="ja-JP" altLang="en-US" sz="1400">
+              <a:latin typeface="Meiryo UI" panose="020B0604030504040204" pitchFamily="34" charset="-128"/>
+              <a:ea typeface="Meiryo UI" panose="020B0604030504040204" pitchFamily="34" charset="-128"/>
+            </a:endParaRPr>
+          </a:p>
+        </p:txBody>
+      </p:sp>
+      <p:cxnSp>
+        <p:nvCxnSpPr>
+          <p:cNvPr id="48" name="直線矢印コネクタ 47">
+            <a:extLst>
+              <a:ext uri="{FF2B5EF4-FFF2-40B4-BE49-F238E27FC236}">
+                <a16:creationId xmlns:a16="http://schemas.microsoft.com/office/drawing/2014/main" id="{AEED626D-3F15-2740-98F0-192953ED4853}"/>
+              </a:ext>
+            </a:extLst>
+          </p:cNvPr>
+          <p:cNvCxnSpPr>
+            <a:cxnSpLocks/>
+          </p:cNvCxnSpPr>
+          <p:nvPr/>
+        </p:nvCxnSpPr>
+        <p:spPr>
+          <a:xfrm>
+            <a:off x="8118353" y="2429452"/>
+            <a:ext cx="0" cy="255250"/>
+          </a:xfrm>
+          <a:prstGeom prst="straightConnector1">
+            <a:avLst/>
+          </a:prstGeom>
+          <a:ln>
+            <a:solidFill>
+              <a:schemeClr val="bg1">
+                <a:lumMod val="50000"/>
+              </a:schemeClr>
+            </a:solidFill>
+            <a:tailEnd type="triangle"/>
+          </a:ln>
+        </p:spPr>
+        <p:style>
+          <a:lnRef idx="1">
+            <a:schemeClr val="accent1"/>
+          </a:lnRef>
+          <a:fillRef idx="0">
+            <a:schemeClr val="accent1"/>
+          </a:fillRef>
+          <a:effectRef idx="0">
+            <a:schemeClr val="accent1"/>
+          </a:effectRef>
+          <a:fontRef idx="minor">
+            <a:schemeClr val="tx1"/>
+          </a:fontRef>
+        </p:style>
+      </p:cxnSp>
+      <p:sp>
+        <p:nvSpPr>
+          <p:cNvPr id="49" name="テキスト ボックス 48">
+            <a:extLst>
+              <a:ext uri="{FF2B5EF4-FFF2-40B4-BE49-F238E27FC236}">
+                <a16:creationId xmlns:a16="http://schemas.microsoft.com/office/drawing/2014/main" id="{B3DF6618-FE21-3B48-BEC2-700B55235D76}"/>
+              </a:ext>
+            </a:extLst>
+          </p:cNvPr>
+          <p:cNvSpPr txBox="1"/>
+          <p:nvPr/>
+        </p:nvSpPr>
+        <p:spPr>
+          <a:xfrm>
+            <a:off x="7364712" y="2684702"/>
+            <a:ext cx="1506294" cy="307777"/>
+          </a:xfrm>
+          <a:prstGeom prst="rect">
+            <a:avLst/>
+          </a:prstGeom>
+          <a:noFill/>
+          <a:ln>
+            <a:solidFill>
+              <a:schemeClr val="bg1">
+                <a:lumMod val="50000"/>
+              </a:schemeClr>
+            </a:solidFill>
+          </a:ln>
+        </p:spPr>
+        <p:txBody>
+          <a:bodyPr wrap="square" rtlCol="0">
+            <a:spAutoFit/>
+          </a:bodyPr>
+          <a:lstStyle/>
+          <a:p>
+            <a:pPr algn="ctr"/>
+            <a:r>
+              <a:rPr kumimoji="1" lang="ja-JP" altLang="en-US" sz="1400">
+                <a:latin typeface="Meiryo UI" panose="020B0604030504040204" pitchFamily="34" charset="-128"/>
+                <a:ea typeface="Meiryo UI" panose="020B0604030504040204" pitchFamily="34" charset="-128"/>
+              </a:rPr>
+              <a:t>接続用</a:t>
+            </a:r>
+            <a:r>
+              <a:rPr kumimoji="1" lang="en-US" altLang="ja-JP" sz="1400" dirty="0">
+                <a:latin typeface="Meiryo UI" panose="020B0604030504040204" pitchFamily="34" charset="-128"/>
+                <a:ea typeface="Meiryo UI" panose="020B0604030504040204" pitchFamily="34" charset="-128"/>
+              </a:rPr>
+              <a:t>FD</a:t>
+            </a:r>
+            <a:r>
+              <a:rPr kumimoji="1" lang="ja-JP" altLang="en-US" sz="1400">
+                <a:latin typeface="Meiryo UI" panose="020B0604030504040204" pitchFamily="34" charset="-128"/>
+                <a:ea typeface="Meiryo UI" panose="020B0604030504040204" pitchFamily="34" charset="-128"/>
+              </a:rPr>
+              <a:t>を破棄</a:t>
+            </a:r>
+          </a:p>
+        </p:txBody>
+      </p:sp>
+      <p:cxnSp>
+        <p:nvCxnSpPr>
+          <p:cNvPr id="50" name="直線矢印コネクタ 49">
+            <a:extLst>
+              <a:ext uri="{FF2B5EF4-FFF2-40B4-BE49-F238E27FC236}">
+                <a16:creationId xmlns:a16="http://schemas.microsoft.com/office/drawing/2014/main" id="{D7527267-9761-574D-A6E3-04425C78E102}"/>
+              </a:ext>
+            </a:extLst>
+          </p:cNvPr>
+          <p:cNvCxnSpPr>
+            <a:cxnSpLocks/>
+            <a:stCxn id="49" idx="3"/>
+          </p:cNvCxnSpPr>
+          <p:nvPr/>
+        </p:nvCxnSpPr>
+        <p:spPr>
+          <a:xfrm>
+            <a:off x="8871006" y="2838591"/>
+            <a:ext cx="2888973" cy="0"/>
+          </a:xfrm>
+          <a:prstGeom prst="straightConnector1">
+            <a:avLst/>
+          </a:prstGeom>
+          <a:ln>
+            <a:solidFill>
+              <a:schemeClr val="bg1">
+                <a:lumMod val="50000"/>
+              </a:schemeClr>
+            </a:solidFill>
+            <a:tailEnd type="triangle"/>
+          </a:ln>
+        </p:spPr>
+        <p:style>
+          <a:lnRef idx="1">
+            <a:schemeClr val="accent1"/>
+          </a:lnRef>
+          <a:fillRef idx="0">
+            <a:schemeClr val="accent1"/>
+          </a:fillRef>
+          <a:effectRef idx="0">
+            <a:schemeClr val="accent1"/>
+          </a:effectRef>
+          <a:fontRef idx="minor">
+            <a:schemeClr val="tx1"/>
+          </a:fontRef>
+        </p:style>
+      </p:cxnSp>
+      <p:grpSp>
+        <p:nvGrpSpPr>
+          <p:cNvPr id="52" name="グループ化 51">
+            <a:extLst>
+              <a:ext uri="{FF2B5EF4-FFF2-40B4-BE49-F238E27FC236}">
+                <a16:creationId xmlns:a16="http://schemas.microsoft.com/office/drawing/2014/main" id="{B41E3C1B-B285-3345-BF01-E63C7676F58A}"/>
+              </a:ext>
+            </a:extLst>
+          </p:cNvPr>
+          <p:cNvGrpSpPr/>
+          <p:nvPr/>
+        </p:nvGrpSpPr>
+        <p:grpSpPr>
+          <a:xfrm>
+            <a:off x="2407401" y="3532688"/>
+            <a:ext cx="3359282" cy="769040"/>
+            <a:chOff x="1777261" y="2692955"/>
+            <a:chExt cx="3359282" cy="769040"/>
+          </a:xfrm>
+        </p:grpSpPr>
+        <p:sp>
+          <p:nvSpPr>
+            <p:cNvPr id="53" name="テキスト ボックス 52">
+              <a:extLst>
+                <a:ext uri="{FF2B5EF4-FFF2-40B4-BE49-F238E27FC236}">
+                  <a16:creationId xmlns:a16="http://schemas.microsoft.com/office/drawing/2014/main" id="{0AA89226-8624-0543-A60D-BF7470C50040}"/>
+                </a:ext>
+              </a:extLst>
+            </p:cNvPr>
+            <p:cNvSpPr txBox="1"/>
+            <p:nvPr/>
+          </p:nvSpPr>
+          <p:spPr>
+            <a:xfrm>
+              <a:off x="2572126" y="2841197"/>
+              <a:ext cx="1769552" cy="523220"/>
+            </a:xfrm>
+            <a:prstGeom prst="rect">
+              <a:avLst/>
+            </a:prstGeom>
+            <a:noFill/>
+            <a:ln>
+              <a:noFill/>
+            </a:ln>
+          </p:spPr>
+          <p:txBody>
+            <a:bodyPr wrap="square" rtlCol="0">
+              <a:spAutoFit/>
+            </a:bodyPr>
+            <a:lstStyle/>
+            <a:p>
+              <a:pPr algn="ctr"/>
+              <a:r>
+                <a:rPr lang="ja-JP" altLang="en-US" sz="1400">
+                  <a:latin typeface="Meiryo UI" panose="020B0604030504040204" pitchFamily="34" charset="-128"/>
+                  <a:ea typeface="Meiryo UI" panose="020B0604030504040204" pitchFamily="34" charset="-128"/>
+                </a:rPr>
+                <a:t>接続用</a:t>
+              </a:r>
+              <a:r>
+                <a:rPr lang="en-US" altLang="ja-JP" sz="1400" dirty="0">
+                  <a:latin typeface="Meiryo UI" panose="020B0604030504040204" pitchFamily="34" charset="-128"/>
+                  <a:ea typeface="Meiryo UI" panose="020B0604030504040204" pitchFamily="34" charset="-128"/>
+                </a:rPr>
+                <a:t>FD</a:t>
+              </a:r>
+              <a:r>
+                <a:rPr lang="ja-JP" altLang="en-US" sz="1400">
+                  <a:latin typeface="Meiryo UI" panose="020B0604030504040204" pitchFamily="34" charset="-128"/>
+                  <a:ea typeface="Meiryo UI" panose="020B0604030504040204" pitchFamily="34" charset="-128"/>
+                </a:rPr>
+                <a:t>の書き込みは可能</a:t>
+              </a:r>
+              <a:r>
+                <a:rPr lang="en-US" altLang="ja-JP" sz="1400" dirty="0">
+                  <a:latin typeface="Meiryo UI" panose="020B0604030504040204" pitchFamily="34" charset="-128"/>
+                  <a:ea typeface="Meiryo UI" panose="020B0604030504040204" pitchFamily="34" charset="-128"/>
+                </a:rPr>
+                <a:t>?</a:t>
+              </a:r>
+              <a:endParaRPr kumimoji="1" lang="ja-JP" altLang="en-US" sz="1400">
+                <a:latin typeface="Meiryo UI" panose="020B0604030504040204" pitchFamily="34" charset="-128"/>
+                <a:ea typeface="Meiryo UI" panose="020B0604030504040204" pitchFamily="34" charset="-128"/>
+              </a:endParaRPr>
+            </a:p>
+          </p:txBody>
+        </p:sp>
+        <p:sp>
+          <p:nvSpPr>
+            <p:cNvPr id="54" name="ひし形 53">
+              <a:extLst>
+                <a:ext uri="{FF2B5EF4-FFF2-40B4-BE49-F238E27FC236}">
+                  <a16:creationId xmlns:a16="http://schemas.microsoft.com/office/drawing/2014/main" id="{393F1148-7929-8F4D-B87B-23ADEBB9D7FD}"/>
+                </a:ext>
+              </a:extLst>
+            </p:cNvPr>
+            <p:cNvSpPr/>
+            <p:nvPr/>
+          </p:nvSpPr>
+          <p:spPr>
+            <a:xfrm>
+              <a:off x="1777261" y="2692955"/>
+              <a:ext cx="3359282" cy="769040"/>
+            </a:xfrm>
+            <a:prstGeom prst="diamond">
+              <a:avLst/>
+            </a:prstGeom>
+            <a:noFill/>
+            <a:ln>
+              <a:solidFill>
+                <a:schemeClr val="bg1">
+                  <a:lumMod val="50000"/>
+                </a:schemeClr>
+              </a:solidFill>
+            </a:ln>
+          </p:spPr>
+          <p:style>
+            <a:lnRef idx="2">
+              <a:schemeClr val="accent1">
+                <a:shade val="50000"/>
+              </a:schemeClr>
+            </a:lnRef>
+            <a:fillRef idx="1">
+              <a:schemeClr val="accent1"/>
+            </a:fillRef>
+            <a:effectRef idx="0">
+              <a:schemeClr val="accent1"/>
+            </a:effectRef>
+            <a:fontRef idx="minor">
+              <a:schemeClr val="lt1"/>
+            </a:fontRef>
+          </p:style>
+          <p:txBody>
+            <a:bodyPr rtlCol="0" anchor="ctr"/>
+            <a:lstStyle/>
+            <a:p>
+              <a:pPr algn="ctr"/>
+              <a:endParaRPr kumimoji="1" lang="ja-JP" altLang="en-US" sz="1600"/>
+            </a:p>
+          </p:txBody>
+        </p:sp>
+      </p:grpSp>
+      <p:cxnSp>
+        <p:nvCxnSpPr>
+          <p:cNvPr id="56" name="直線矢印コネクタ 55">
+            <a:extLst>
+              <a:ext uri="{FF2B5EF4-FFF2-40B4-BE49-F238E27FC236}">
+                <a16:creationId xmlns:a16="http://schemas.microsoft.com/office/drawing/2014/main" id="{E40CF20C-44F4-F64F-B304-D7806A3580C7}"/>
+              </a:ext>
+            </a:extLst>
+          </p:cNvPr>
+          <p:cNvCxnSpPr>
+            <a:cxnSpLocks/>
+          </p:cNvCxnSpPr>
+          <p:nvPr/>
+        </p:nvCxnSpPr>
+        <p:spPr>
+          <a:xfrm>
+            <a:off x="10075111" y="4301728"/>
+            <a:ext cx="0" cy="255250"/>
+          </a:xfrm>
+          <a:prstGeom prst="straightConnector1">
+            <a:avLst/>
+          </a:prstGeom>
+          <a:ln>
+            <a:solidFill>
+              <a:schemeClr val="bg1">
+                <a:lumMod val="50000"/>
+              </a:schemeClr>
+            </a:solidFill>
+            <a:tailEnd type="triangle"/>
           </a:ln>
         </p:spPr>
         <p:style>
@@ -6903,23 +8620,23 @@
       </p:cxnSp>
       <p:cxnSp>
         <p:nvCxnSpPr>
-          <p:cNvPr id="69" name="直線矢印コネクタ 68">
-            <a:extLst>
-              <a:ext uri="{FF2B5EF4-FFF2-40B4-BE49-F238E27FC236}">
-                <a16:creationId xmlns:a16="http://schemas.microsoft.com/office/drawing/2014/main" id="{2B2E1FF0-A625-1A41-A8AC-E4635677981D}"/>
+          <p:cNvPr id="57" name="直線矢印コネクタ 56">
+            <a:extLst>
+              <a:ext uri="{FF2B5EF4-FFF2-40B4-BE49-F238E27FC236}">
+                <a16:creationId xmlns:a16="http://schemas.microsoft.com/office/drawing/2014/main" id="{FF26C3F6-3438-9648-ACE3-2DA3817C7638}"/>
               </a:ext>
             </a:extLst>
           </p:cNvPr>
           <p:cNvCxnSpPr>
             <a:cxnSpLocks/>
-            <a:stCxn id="10" idx="3"/>
+            <a:stCxn id="54" idx="3"/>
           </p:cNvCxnSpPr>
           <p:nvPr/>
         </p:nvCxnSpPr>
         <p:spPr>
           <a:xfrm>
-            <a:off x="6639338" y="1797078"/>
-            <a:ext cx="5120641" cy="717"/>
+            <a:off x="5766683" y="3917208"/>
+            <a:ext cx="658636" cy="0"/>
           </a:xfrm>
           <a:prstGeom prst="straightConnector1">
             <a:avLst/>
@@ -6930,8 +8647,383 @@
                 <a:lumMod val="50000"/>
               </a:schemeClr>
             </a:solidFill>
-            <a:headEnd type="triangle"/>
+            <a:tailEnd type="triangle"/>
+          </a:ln>
+        </p:spPr>
+        <p:style>
+          <a:lnRef idx="1">
+            <a:schemeClr val="accent1"/>
+          </a:lnRef>
+          <a:fillRef idx="0">
+            <a:schemeClr val="accent1"/>
+          </a:fillRef>
+          <a:effectRef idx="0">
+            <a:schemeClr val="accent1"/>
+          </a:effectRef>
+          <a:fontRef idx="minor">
+            <a:schemeClr val="tx1"/>
+          </a:fontRef>
+        </p:style>
+      </p:cxnSp>
+      <p:sp>
+        <p:nvSpPr>
+          <p:cNvPr id="58" name="テキスト ボックス 57">
+            <a:extLst>
+              <a:ext uri="{FF2B5EF4-FFF2-40B4-BE49-F238E27FC236}">
+                <a16:creationId xmlns:a16="http://schemas.microsoft.com/office/drawing/2014/main" id="{26138D65-6575-3045-AB4A-E07C6D2BAD36}"/>
+              </a:ext>
+            </a:extLst>
+          </p:cNvPr>
+          <p:cNvSpPr txBox="1"/>
+          <p:nvPr/>
+        </p:nvSpPr>
+        <p:spPr>
+          <a:xfrm>
+            <a:off x="5701204" y="3606655"/>
+            <a:ext cx="737014" cy="276999"/>
+          </a:xfrm>
+          <a:prstGeom prst="rect">
+            <a:avLst/>
+          </a:prstGeom>
+          <a:noFill/>
+          <a:ln>
+            <a:noFill/>
+          </a:ln>
+        </p:spPr>
+        <p:txBody>
+          <a:bodyPr wrap="square" rtlCol="0">
+            <a:spAutoFit/>
+          </a:bodyPr>
+          <a:lstStyle/>
+          <a:p>
+            <a:pPr algn="ctr"/>
+            <a:r>
+              <a:rPr lang="en-US" altLang="ja-JP" sz="1200" dirty="0">
+                <a:latin typeface="Meiryo UI" panose="020B0604030504040204" pitchFamily="34" charset="-128"/>
+                <a:ea typeface="Meiryo UI" panose="020B0604030504040204" pitchFamily="34" charset="-128"/>
+              </a:rPr>
+              <a:t>Yes</a:t>
+            </a:r>
+            <a:endParaRPr kumimoji="1" lang="ja-JP" altLang="en-US" sz="1200">
+              <a:latin typeface="Meiryo UI" panose="020B0604030504040204" pitchFamily="34" charset="-128"/>
+              <a:ea typeface="Meiryo UI" panose="020B0604030504040204" pitchFamily="34" charset="-128"/>
+            </a:endParaRPr>
+          </a:p>
+        </p:txBody>
+      </p:sp>
+      <p:grpSp>
+        <p:nvGrpSpPr>
+          <p:cNvPr id="59" name="グループ化 58">
+            <a:extLst>
+              <a:ext uri="{FF2B5EF4-FFF2-40B4-BE49-F238E27FC236}">
+                <a16:creationId xmlns:a16="http://schemas.microsoft.com/office/drawing/2014/main" id="{F8A98962-887E-3241-B1AD-08DC3A85BF53}"/>
+              </a:ext>
+            </a:extLst>
+          </p:cNvPr>
+          <p:cNvGrpSpPr/>
+          <p:nvPr/>
+        </p:nvGrpSpPr>
+        <p:grpSpPr>
+          <a:xfrm>
+            <a:off x="6438218" y="3532688"/>
+            <a:ext cx="2474015" cy="769040"/>
+            <a:chOff x="1777261" y="2692955"/>
+            <a:chExt cx="3359282" cy="769040"/>
+          </a:xfrm>
+        </p:grpSpPr>
+        <p:sp>
+          <p:nvSpPr>
+            <p:cNvPr id="60" name="テキスト ボックス 59">
+              <a:extLst>
+                <a:ext uri="{FF2B5EF4-FFF2-40B4-BE49-F238E27FC236}">
+                  <a16:creationId xmlns:a16="http://schemas.microsoft.com/office/drawing/2014/main" id="{8EF05318-E8B5-9247-812A-35CCC5B6D14E}"/>
+                </a:ext>
+              </a:extLst>
+            </p:cNvPr>
+            <p:cNvSpPr txBox="1"/>
+            <p:nvPr/>
+          </p:nvSpPr>
+          <p:spPr>
+            <a:xfrm>
+              <a:off x="2572126" y="2890032"/>
+              <a:ext cx="1769552" cy="307777"/>
+            </a:xfrm>
+            <a:prstGeom prst="rect">
+              <a:avLst/>
+            </a:prstGeom>
+            <a:noFill/>
+            <a:ln>
+              <a:noFill/>
+            </a:ln>
+          </p:spPr>
+          <p:txBody>
+            <a:bodyPr wrap="square" rtlCol="0">
+              <a:spAutoFit/>
+            </a:bodyPr>
+            <a:lstStyle/>
+            <a:p>
+              <a:pPr algn="ctr"/>
+              <a:r>
+                <a:rPr lang="en-US" altLang="ja-JP" sz="1400" dirty="0">
+                  <a:latin typeface="Meiryo UI" panose="020B0604030504040204" pitchFamily="34" charset="-128"/>
+                  <a:ea typeface="Meiryo UI" panose="020B0604030504040204" pitchFamily="34" charset="-128"/>
+                </a:rPr>
+                <a:t>write() &gt; 0 ?</a:t>
+              </a:r>
+              <a:endParaRPr kumimoji="1" lang="ja-JP" altLang="en-US" sz="1400">
+                <a:latin typeface="Meiryo UI" panose="020B0604030504040204" pitchFamily="34" charset="-128"/>
+                <a:ea typeface="Meiryo UI" panose="020B0604030504040204" pitchFamily="34" charset="-128"/>
+              </a:endParaRPr>
+            </a:p>
+          </p:txBody>
+        </p:sp>
+        <p:sp>
+          <p:nvSpPr>
+            <p:cNvPr id="61" name="ひし形 60">
+              <a:extLst>
+                <a:ext uri="{FF2B5EF4-FFF2-40B4-BE49-F238E27FC236}">
+                  <a16:creationId xmlns:a16="http://schemas.microsoft.com/office/drawing/2014/main" id="{1F4137DB-A160-0E45-90E2-B591CF3BDCF5}"/>
+                </a:ext>
+              </a:extLst>
+            </p:cNvPr>
+            <p:cNvSpPr/>
+            <p:nvPr/>
+          </p:nvSpPr>
+          <p:spPr>
+            <a:xfrm>
+              <a:off x="1777261" y="2692955"/>
+              <a:ext cx="3359282" cy="769040"/>
+            </a:xfrm>
+            <a:prstGeom prst="diamond">
+              <a:avLst/>
+            </a:prstGeom>
+            <a:noFill/>
+            <a:ln>
+              <a:solidFill>
+                <a:schemeClr val="bg1">
+                  <a:lumMod val="50000"/>
+                </a:schemeClr>
+              </a:solidFill>
+            </a:ln>
+          </p:spPr>
+          <p:style>
+            <a:lnRef idx="2">
+              <a:schemeClr val="accent1">
+                <a:shade val="50000"/>
+              </a:schemeClr>
+            </a:lnRef>
+            <a:fillRef idx="1">
+              <a:schemeClr val="accent1"/>
+            </a:fillRef>
+            <a:effectRef idx="0">
+              <a:schemeClr val="accent1"/>
+            </a:effectRef>
+            <a:fontRef idx="minor">
+              <a:schemeClr val="lt1"/>
+            </a:fontRef>
+          </p:style>
+          <p:txBody>
+            <a:bodyPr rtlCol="0" anchor="ctr"/>
+            <a:lstStyle/>
+            <a:p>
+              <a:pPr algn="ctr"/>
+              <a:endParaRPr kumimoji="1" lang="ja-JP" altLang="en-US" sz="1600"/>
+            </a:p>
+          </p:txBody>
+        </p:sp>
+      </p:grpSp>
+      <p:sp>
+        <p:nvSpPr>
+          <p:cNvPr id="62" name="テキスト ボックス 61">
+            <a:extLst>
+              <a:ext uri="{FF2B5EF4-FFF2-40B4-BE49-F238E27FC236}">
+                <a16:creationId xmlns:a16="http://schemas.microsoft.com/office/drawing/2014/main" id="{1D780996-2710-A84F-8772-B557C0DA9BF9}"/>
+              </a:ext>
+            </a:extLst>
+          </p:cNvPr>
+          <p:cNvSpPr txBox="1"/>
+          <p:nvPr/>
+        </p:nvSpPr>
+        <p:spPr>
+          <a:xfrm>
+            <a:off x="8912232" y="3606655"/>
+            <a:ext cx="737014" cy="276999"/>
+          </a:xfrm>
+          <a:prstGeom prst="rect">
+            <a:avLst/>
+          </a:prstGeom>
+          <a:noFill/>
+          <a:ln>
+            <a:noFill/>
+          </a:ln>
+        </p:spPr>
+        <p:txBody>
+          <a:bodyPr wrap="square" rtlCol="0">
+            <a:spAutoFit/>
+          </a:bodyPr>
+          <a:lstStyle/>
+          <a:p>
+            <a:pPr algn="ctr"/>
+            <a:r>
+              <a:rPr lang="en-US" altLang="ja-JP" sz="1200" dirty="0">
+                <a:latin typeface="Meiryo UI" panose="020B0604030504040204" pitchFamily="34" charset="-128"/>
+                <a:ea typeface="Meiryo UI" panose="020B0604030504040204" pitchFamily="34" charset="-128"/>
+              </a:rPr>
+              <a:t>Yes</a:t>
+            </a:r>
+            <a:endParaRPr kumimoji="1" lang="ja-JP" altLang="en-US" sz="1200">
+              <a:latin typeface="Meiryo UI" panose="020B0604030504040204" pitchFamily="34" charset="-128"/>
+              <a:ea typeface="Meiryo UI" panose="020B0604030504040204" pitchFamily="34" charset="-128"/>
+            </a:endParaRPr>
+          </a:p>
+        </p:txBody>
+      </p:sp>
+      <p:cxnSp>
+        <p:nvCxnSpPr>
+          <p:cNvPr id="63" name="直線矢印コネクタ 62">
+            <a:extLst>
+              <a:ext uri="{FF2B5EF4-FFF2-40B4-BE49-F238E27FC236}">
+                <a16:creationId xmlns:a16="http://schemas.microsoft.com/office/drawing/2014/main" id="{D9B8D07B-9ACD-4C42-BE73-F0012DC6006B}"/>
+              </a:ext>
+            </a:extLst>
+          </p:cNvPr>
+          <p:cNvCxnSpPr>
+            <a:cxnSpLocks/>
+          </p:cNvCxnSpPr>
+          <p:nvPr/>
+        </p:nvCxnSpPr>
+        <p:spPr>
+          <a:xfrm flipH="1">
+            <a:off x="7675225" y="4301728"/>
+            <a:ext cx="13758" cy="1387065"/>
+          </a:xfrm>
+          <a:prstGeom prst="straightConnector1">
+            <a:avLst/>
+          </a:prstGeom>
+          <a:ln>
+            <a:solidFill>
+              <a:schemeClr val="bg1">
+                <a:lumMod val="50000"/>
+              </a:schemeClr>
+            </a:solidFill>
             <a:tailEnd type="none"/>
+          </a:ln>
+        </p:spPr>
+        <p:style>
+          <a:lnRef idx="1">
+            <a:schemeClr val="accent1"/>
+          </a:lnRef>
+          <a:fillRef idx="0">
+            <a:schemeClr val="accent1"/>
+          </a:fillRef>
+          <a:effectRef idx="0">
+            <a:schemeClr val="accent1"/>
+          </a:effectRef>
+          <a:fontRef idx="minor">
+            <a:schemeClr val="tx1"/>
+          </a:fontRef>
+        </p:style>
+      </p:cxnSp>
+      <p:sp>
+        <p:nvSpPr>
+          <p:cNvPr id="70" name="テキスト ボックス 69">
+            <a:extLst>
+              <a:ext uri="{FF2B5EF4-FFF2-40B4-BE49-F238E27FC236}">
+                <a16:creationId xmlns:a16="http://schemas.microsoft.com/office/drawing/2014/main" id="{2313C644-5818-E148-BAA3-8D1B262D8D0A}"/>
+              </a:ext>
+            </a:extLst>
+          </p:cNvPr>
+          <p:cNvSpPr txBox="1"/>
+          <p:nvPr/>
+        </p:nvSpPr>
+        <p:spPr>
+          <a:xfrm>
+            <a:off x="10460966" y="1675600"/>
+            <a:ext cx="935748" cy="738664"/>
+          </a:xfrm>
+          <a:prstGeom prst="rect">
+            <a:avLst/>
+          </a:prstGeom>
+          <a:noFill/>
+          <a:ln>
+            <a:solidFill>
+              <a:schemeClr val="bg1">
+                <a:lumMod val="50000"/>
+              </a:schemeClr>
+            </a:solidFill>
+          </a:ln>
+        </p:spPr>
+        <p:txBody>
+          <a:bodyPr wrap="square" rtlCol="0">
+            <a:spAutoFit/>
+          </a:bodyPr>
+          <a:lstStyle/>
+          <a:p>
+            <a:pPr algn="ctr"/>
+            <a:r>
+              <a:rPr lang="en-US" altLang="ja-JP" sz="1400" dirty="0">
+                <a:latin typeface="Meiryo UI" panose="020B0604030504040204" pitchFamily="34" charset="-128"/>
+                <a:ea typeface="Meiryo UI" panose="020B0604030504040204" pitchFamily="34" charset="-128"/>
+              </a:rPr>
+              <a:t>Request</a:t>
+            </a:r>
+            <a:r>
+              <a:rPr lang="ja-JP" altLang="en-US" sz="1400">
+                <a:latin typeface="Meiryo UI" panose="020B0604030504040204" pitchFamily="34" charset="-128"/>
+                <a:ea typeface="Meiryo UI" panose="020B0604030504040204" pitchFamily="34" charset="-128"/>
+              </a:rPr>
+              <a:t>情報</a:t>
+            </a:r>
+            <a:br>
+              <a:rPr lang="en-US" altLang="ja-JP" sz="1400" dirty="0">
+                <a:latin typeface="Meiryo UI" panose="020B0604030504040204" pitchFamily="34" charset="-128"/>
+                <a:ea typeface="Meiryo UI" panose="020B0604030504040204" pitchFamily="34" charset="-128"/>
+              </a:rPr>
+            </a:br>
+            <a:r>
+              <a:rPr lang="ja-JP" altLang="en-US" sz="1400">
+                <a:latin typeface="Meiryo UI" panose="020B0604030504040204" pitchFamily="34" charset="-128"/>
+                <a:ea typeface="Meiryo UI" panose="020B0604030504040204" pitchFamily="34" charset="-128"/>
+              </a:rPr>
+              <a:t>読み取り</a:t>
+            </a:r>
+            <a:endParaRPr kumimoji="1" lang="ja-JP" altLang="en-US" sz="1400">
+              <a:latin typeface="Meiryo UI" panose="020B0604030504040204" pitchFamily="34" charset="-128"/>
+              <a:ea typeface="Meiryo UI" panose="020B0604030504040204" pitchFamily="34" charset="-128"/>
+            </a:endParaRPr>
+          </a:p>
+        </p:txBody>
+      </p:sp>
+      <p:cxnSp>
+        <p:nvCxnSpPr>
+          <p:cNvPr id="71" name="直線矢印コネクタ 70">
+            <a:extLst>
+              <a:ext uri="{FF2B5EF4-FFF2-40B4-BE49-F238E27FC236}">
+                <a16:creationId xmlns:a16="http://schemas.microsoft.com/office/drawing/2014/main" id="{5C08537A-A6D8-D84A-BB64-A559F52636FD}"/>
+              </a:ext>
+            </a:extLst>
+          </p:cNvPr>
+          <p:cNvCxnSpPr>
+            <a:cxnSpLocks/>
+            <a:stCxn id="70" idx="3"/>
+          </p:cNvCxnSpPr>
+          <p:nvPr/>
+        </p:nvCxnSpPr>
+        <p:spPr>
+          <a:xfrm>
+            <a:off x="11396714" y="2044932"/>
+            <a:ext cx="363265" cy="0"/>
+          </a:xfrm>
+          <a:prstGeom prst="straightConnector1">
+            <a:avLst/>
+          </a:prstGeom>
+          <a:ln>
+            <a:solidFill>
+              <a:schemeClr val="bg1">
+                <a:lumMod val="50000"/>
+              </a:schemeClr>
+            </a:solidFill>
+            <a:tailEnd type="triangle"/>
           </a:ln>
         </p:spPr>
         <p:style>
@@ -6951,10 +9043,10 @@
       </p:cxnSp>
       <p:cxnSp>
         <p:nvCxnSpPr>
-          <p:cNvPr id="75" name="直線矢印コネクタ 74">
-            <a:extLst>
-              <a:ext uri="{FF2B5EF4-FFF2-40B4-BE49-F238E27FC236}">
-                <a16:creationId xmlns:a16="http://schemas.microsoft.com/office/drawing/2014/main" id="{5E4E0E61-D94A-0848-8108-40B41354B59A}"/>
+          <p:cNvPr id="74" name="直線矢印コネクタ 73">
+            <a:extLst>
+              <a:ext uri="{FF2B5EF4-FFF2-40B4-BE49-F238E27FC236}">
+                <a16:creationId xmlns:a16="http://schemas.microsoft.com/office/drawing/2014/main" id="{59880AB2-C155-2C41-AAA4-C701EF5245F0}"/>
               </a:ext>
             </a:extLst>
           </p:cNvPr>
@@ -6965,8 +9057,8 @@
         </p:nvCxnSpPr>
         <p:spPr>
           <a:xfrm>
-            <a:off x="11194304" y="4718825"/>
-            <a:ext cx="565675" cy="0"/>
+            <a:off x="8912233" y="3932396"/>
+            <a:ext cx="650514" cy="0"/>
           </a:xfrm>
           <a:prstGeom prst="straightConnector1">
             <a:avLst/>
@@ -6977,7 +9069,6 @@
                 <a:lumMod val="50000"/>
               </a:schemeClr>
             </a:solidFill>
-            <a:headEnd type="none"/>
             <a:tailEnd type="triangle"/>
           </a:ln>
         </p:spPr>
@@ -6998,10 +9089,10 @@
       </p:cxnSp>
       <p:sp>
         <p:nvSpPr>
-          <p:cNvPr id="77" name="テキスト ボックス 76">
-            <a:extLst>
-              <a:ext uri="{FF2B5EF4-FFF2-40B4-BE49-F238E27FC236}">
-                <a16:creationId xmlns:a16="http://schemas.microsoft.com/office/drawing/2014/main" id="{57212AFB-732C-B34B-B318-70B33AE4E248}"/>
+          <p:cNvPr id="76" name="テキスト ボックス 75">
+            <a:extLst>
+              <a:ext uri="{FF2B5EF4-FFF2-40B4-BE49-F238E27FC236}">
+                <a16:creationId xmlns:a16="http://schemas.microsoft.com/office/drawing/2014/main" id="{9CED56A9-423F-E244-9291-70D3F917C62D}"/>
               </a:ext>
             </a:extLst>
           </p:cNvPr>
@@ -7010,299 +9101,333 @@
         </p:nvSpPr>
         <p:spPr>
           <a:xfrm>
-            <a:off x="6193041" y="2824189"/>
-            <a:ext cx="737014" cy="276999"/>
+            <a:off x="9554841" y="3563064"/>
+            <a:ext cx="1008593" cy="738664"/>
           </a:xfrm>
           <a:prstGeom prst="rect">
             <a:avLst/>
           </a:prstGeom>
           <a:noFill/>
-          <a:ln>
-            <a:noFill/>
-          </a:ln>
-        </p:spPr>
-        <p:txBody>
-          <a:bodyPr wrap="square" rtlCol="0">
-            <a:spAutoFit/>
-          </a:bodyPr>
-          <a:lstStyle/>
-          <a:p>
-            <a:pPr algn="ctr"/>
-            <a:r>
-              <a:rPr lang="en-US" altLang="ja-JP" sz="1200" dirty="0">
-                <a:latin typeface="Meiryo UI" panose="020B0604030504040204" pitchFamily="34" charset="-128"/>
-                <a:ea typeface="Meiryo UI" panose="020B0604030504040204" pitchFamily="34" charset="-128"/>
-              </a:rPr>
-              <a:t>Yes</a:t>
-            </a:r>
-            <a:endParaRPr kumimoji="1" lang="ja-JP" altLang="en-US" sz="1200">
-              <a:latin typeface="Meiryo UI" panose="020B0604030504040204" pitchFamily="34" charset="-128"/>
-              <a:ea typeface="Meiryo UI" panose="020B0604030504040204" pitchFamily="34" charset="-128"/>
-            </a:endParaRPr>
-          </a:p>
-        </p:txBody>
-      </p:sp>
-      <p:sp>
-        <p:nvSpPr>
-          <p:cNvPr id="78" name="テキスト ボックス 77">
-            <a:extLst>
-              <a:ext uri="{FF2B5EF4-FFF2-40B4-BE49-F238E27FC236}">
-                <a16:creationId xmlns:a16="http://schemas.microsoft.com/office/drawing/2014/main" id="{80E81EE4-66FC-FE40-85B4-3297808E0670}"/>
-              </a:ext>
-            </a:extLst>
-          </p:cNvPr>
-          <p:cNvSpPr txBox="1"/>
-          <p:nvPr/>
-        </p:nvSpPr>
-        <p:spPr>
-          <a:xfrm>
-            <a:off x="4006432" y="3460320"/>
-            <a:ext cx="737014" cy="276999"/>
-          </a:xfrm>
-          <a:prstGeom prst="rect">
-            <a:avLst/>
-          </a:prstGeom>
-          <a:noFill/>
-          <a:ln>
-            <a:noFill/>
-          </a:ln>
-        </p:spPr>
-        <p:txBody>
-          <a:bodyPr wrap="square" rtlCol="0">
-            <a:spAutoFit/>
-          </a:bodyPr>
-          <a:lstStyle/>
-          <a:p>
-            <a:pPr algn="ctr"/>
-            <a:r>
-              <a:rPr lang="en-US" altLang="ja-JP" sz="1200" dirty="0">
-                <a:latin typeface="Meiryo UI" panose="020B0604030504040204" pitchFamily="34" charset="-128"/>
-                <a:ea typeface="Meiryo UI" panose="020B0604030504040204" pitchFamily="34" charset="-128"/>
-              </a:rPr>
-              <a:t>No</a:t>
-            </a:r>
-            <a:endParaRPr kumimoji="1" lang="ja-JP" altLang="en-US" sz="1200">
-              <a:latin typeface="Meiryo UI" panose="020B0604030504040204" pitchFamily="34" charset="-128"/>
-              <a:ea typeface="Meiryo UI" panose="020B0604030504040204" pitchFamily="34" charset="-128"/>
-            </a:endParaRPr>
-          </a:p>
-        </p:txBody>
-      </p:sp>
-      <p:sp>
-        <p:nvSpPr>
-          <p:cNvPr id="79" name="テキスト ボックス 78">
-            <a:extLst>
-              <a:ext uri="{FF2B5EF4-FFF2-40B4-BE49-F238E27FC236}">
-                <a16:creationId xmlns:a16="http://schemas.microsoft.com/office/drawing/2014/main" id="{B70F14C5-AC84-4A4A-88C3-AC1F7B7CD3D4}"/>
-              </a:ext>
-            </a:extLst>
-          </p:cNvPr>
-          <p:cNvSpPr txBox="1"/>
-          <p:nvPr/>
-        </p:nvSpPr>
-        <p:spPr>
-          <a:xfrm>
-            <a:off x="6193041" y="4398928"/>
-            <a:ext cx="737014" cy="276999"/>
-          </a:xfrm>
-          <a:prstGeom prst="rect">
-            <a:avLst/>
-          </a:prstGeom>
-          <a:noFill/>
-          <a:ln>
-            <a:noFill/>
-          </a:ln>
-        </p:spPr>
-        <p:txBody>
-          <a:bodyPr wrap="square" rtlCol="0">
-            <a:spAutoFit/>
-          </a:bodyPr>
-          <a:lstStyle/>
-          <a:p>
-            <a:pPr algn="ctr"/>
-            <a:r>
-              <a:rPr lang="en-US" altLang="ja-JP" sz="1200" dirty="0">
-                <a:latin typeface="Meiryo UI" panose="020B0604030504040204" pitchFamily="34" charset="-128"/>
-                <a:ea typeface="Meiryo UI" panose="020B0604030504040204" pitchFamily="34" charset="-128"/>
-              </a:rPr>
-              <a:t>Yes</a:t>
-            </a:r>
-            <a:endParaRPr kumimoji="1" lang="ja-JP" altLang="en-US" sz="1200">
-              <a:latin typeface="Meiryo UI" panose="020B0604030504040204" pitchFamily="34" charset="-128"/>
-              <a:ea typeface="Meiryo UI" panose="020B0604030504040204" pitchFamily="34" charset="-128"/>
-            </a:endParaRPr>
-          </a:p>
-        </p:txBody>
-      </p:sp>
-      <p:sp>
-        <p:nvSpPr>
-          <p:cNvPr id="80" name="テキスト ボックス 79">
-            <a:extLst>
-              <a:ext uri="{FF2B5EF4-FFF2-40B4-BE49-F238E27FC236}">
-                <a16:creationId xmlns:a16="http://schemas.microsoft.com/office/drawing/2014/main" id="{9DCB1AFB-75FA-0847-AF9E-33351907DD17}"/>
-              </a:ext>
-            </a:extLst>
-          </p:cNvPr>
-          <p:cNvSpPr txBox="1"/>
-          <p:nvPr/>
-        </p:nvSpPr>
-        <p:spPr>
-          <a:xfrm>
-            <a:off x="4006432" y="5074247"/>
-            <a:ext cx="737014" cy="276999"/>
-          </a:xfrm>
-          <a:prstGeom prst="rect">
-            <a:avLst/>
-          </a:prstGeom>
-          <a:noFill/>
-          <a:ln>
-            <a:noFill/>
-          </a:ln>
-        </p:spPr>
-        <p:txBody>
-          <a:bodyPr wrap="square" rtlCol="0">
-            <a:spAutoFit/>
-          </a:bodyPr>
-          <a:lstStyle/>
-          <a:p>
-            <a:pPr algn="ctr"/>
-            <a:r>
-              <a:rPr lang="en-US" altLang="ja-JP" sz="1200" dirty="0">
-                <a:latin typeface="Meiryo UI" panose="020B0604030504040204" pitchFamily="34" charset="-128"/>
-                <a:ea typeface="Meiryo UI" panose="020B0604030504040204" pitchFamily="34" charset="-128"/>
-              </a:rPr>
-              <a:t>No</a:t>
-            </a:r>
-            <a:endParaRPr kumimoji="1" lang="ja-JP" altLang="en-US" sz="1200">
-              <a:latin typeface="Meiryo UI" panose="020B0604030504040204" pitchFamily="34" charset="-128"/>
-              <a:ea typeface="Meiryo UI" panose="020B0604030504040204" pitchFamily="34" charset="-128"/>
-            </a:endParaRPr>
-          </a:p>
-        </p:txBody>
-      </p:sp>
-      <p:sp>
-        <p:nvSpPr>
-          <p:cNvPr id="81" name="テキスト ボックス 80">
-            <a:extLst>
-              <a:ext uri="{FF2B5EF4-FFF2-40B4-BE49-F238E27FC236}">
-                <a16:creationId xmlns:a16="http://schemas.microsoft.com/office/drawing/2014/main" id="{5E56948A-2AA1-B847-8AEA-265F5637C131}"/>
-              </a:ext>
-            </a:extLst>
-          </p:cNvPr>
-          <p:cNvSpPr txBox="1"/>
-          <p:nvPr/>
-        </p:nvSpPr>
-        <p:spPr>
-          <a:xfrm>
-            <a:off x="4006432" y="6084203"/>
-            <a:ext cx="737014" cy="276999"/>
-          </a:xfrm>
-          <a:prstGeom prst="rect">
-            <a:avLst/>
-          </a:prstGeom>
-          <a:noFill/>
-          <a:ln>
-            <a:noFill/>
-          </a:ln>
-        </p:spPr>
-        <p:txBody>
-          <a:bodyPr wrap="square" rtlCol="0">
-            <a:spAutoFit/>
-          </a:bodyPr>
-          <a:lstStyle/>
-          <a:p>
-            <a:pPr algn="ctr"/>
-            <a:r>
-              <a:rPr lang="en-US" altLang="ja-JP" sz="1200" dirty="0">
-                <a:latin typeface="Meiryo UI" panose="020B0604030504040204" pitchFamily="34" charset="-128"/>
-                <a:ea typeface="Meiryo UI" panose="020B0604030504040204" pitchFamily="34" charset="-128"/>
-              </a:rPr>
-              <a:t>YES</a:t>
-            </a:r>
-            <a:endParaRPr kumimoji="1" lang="ja-JP" altLang="en-US" sz="1200">
-              <a:latin typeface="Meiryo UI" panose="020B0604030504040204" pitchFamily="34" charset="-128"/>
-              <a:ea typeface="Meiryo UI" panose="020B0604030504040204" pitchFamily="34" charset="-128"/>
-            </a:endParaRPr>
-          </a:p>
-        </p:txBody>
-      </p:sp>
-      <p:sp>
-        <p:nvSpPr>
-          <p:cNvPr id="82" name="テキスト ボックス 81">
-            <a:extLst>
-              <a:ext uri="{FF2B5EF4-FFF2-40B4-BE49-F238E27FC236}">
-                <a16:creationId xmlns:a16="http://schemas.microsoft.com/office/drawing/2014/main" id="{E511C12B-7592-734B-BCE9-E204FA8533BE}"/>
-              </a:ext>
-            </a:extLst>
-          </p:cNvPr>
-          <p:cNvSpPr txBox="1"/>
-          <p:nvPr/>
-        </p:nvSpPr>
-        <p:spPr>
-          <a:xfrm>
-            <a:off x="6193041" y="5409780"/>
-            <a:ext cx="737014" cy="276999"/>
-          </a:xfrm>
-          <a:prstGeom prst="rect">
-            <a:avLst/>
-          </a:prstGeom>
-          <a:noFill/>
-          <a:ln>
-            <a:noFill/>
-          </a:ln>
-        </p:spPr>
-        <p:txBody>
-          <a:bodyPr wrap="square" rtlCol="0">
-            <a:spAutoFit/>
-          </a:bodyPr>
-          <a:lstStyle/>
-          <a:p>
-            <a:pPr algn="ctr"/>
-            <a:r>
-              <a:rPr lang="en-US" altLang="ja-JP" sz="1200" dirty="0">
-                <a:latin typeface="Meiryo UI" panose="020B0604030504040204" pitchFamily="34" charset="-128"/>
-                <a:ea typeface="Meiryo UI" panose="020B0604030504040204" pitchFamily="34" charset="-128"/>
-              </a:rPr>
-              <a:t>No</a:t>
-            </a:r>
-            <a:endParaRPr kumimoji="1" lang="ja-JP" altLang="en-US" sz="1200">
-              <a:latin typeface="Meiryo UI" panose="020B0604030504040204" pitchFamily="34" charset="-128"/>
-              <a:ea typeface="Meiryo UI" panose="020B0604030504040204" pitchFamily="34" charset="-128"/>
-            </a:endParaRPr>
-          </a:p>
-        </p:txBody>
-      </p:sp>
-      <p:cxnSp>
-        <p:nvCxnSpPr>
-          <p:cNvPr id="83" name="直線矢印コネクタ 82">
-            <a:extLst>
-              <a:ext uri="{FF2B5EF4-FFF2-40B4-BE49-F238E27FC236}">
-                <a16:creationId xmlns:a16="http://schemas.microsoft.com/office/drawing/2014/main" id="{A44D610D-B1CB-D343-AD00-FF72A0F09B61}"/>
-              </a:ext>
-            </a:extLst>
-          </p:cNvPr>
-          <p:cNvCxnSpPr>
-            <a:cxnSpLocks/>
-            <a:stCxn id="16" idx="3"/>
-          </p:cNvCxnSpPr>
-          <p:nvPr/>
-        </p:nvCxnSpPr>
-        <p:spPr>
-          <a:xfrm>
-            <a:off x="6639338" y="3920002"/>
-            <a:ext cx="2616641" cy="10510"/>
-          </a:xfrm>
-          <a:prstGeom prst="straightConnector1">
-            <a:avLst/>
-          </a:prstGeom>
           <a:ln>
             <a:solidFill>
               <a:schemeClr val="bg1">
                 <a:lumMod val="50000"/>
               </a:schemeClr>
             </a:solidFill>
-            <a:headEnd type="triangle"/>
-            <a:tailEnd type="none"/>
+          </a:ln>
+        </p:spPr>
+        <p:txBody>
+          <a:bodyPr wrap="square" rtlCol="0">
+            <a:spAutoFit/>
+          </a:bodyPr>
+          <a:lstStyle/>
+          <a:p>
+            <a:pPr algn="ctr"/>
+            <a:r>
+              <a:rPr lang="en-US" altLang="ja-JP" sz="1400" dirty="0">
+                <a:latin typeface="Meiryo UI" panose="020B0604030504040204" pitchFamily="34" charset="-128"/>
+                <a:ea typeface="Meiryo UI" panose="020B0604030504040204" pitchFamily="34" charset="-128"/>
+              </a:rPr>
+              <a:t>Response</a:t>
+            </a:r>
+            <a:r>
+              <a:rPr lang="ja-JP" altLang="en-US" sz="1400">
+                <a:latin typeface="Meiryo UI" panose="020B0604030504040204" pitchFamily="34" charset="-128"/>
+                <a:ea typeface="Meiryo UI" panose="020B0604030504040204" pitchFamily="34" charset="-128"/>
+              </a:rPr>
+              <a:t>情報</a:t>
+            </a:r>
+            <a:br>
+              <a:rPr lang="en-US" altLang="ja-JP" sz="1400" dirty="0">
+                <a:latin typeface="Meiryo UI" panose="020B0604030504040204" pitchFamily="34" charset="-128"/>
+                <a:ea typeface="Meiryo UI" panose="020B0604030504040204" pitchFamily="34" charset="-128"/>
+              </a:rPr>
+            </a:br>
+            <a:r>
+              <a:rPr lang="ja-JP" altLang="en-US" sz="1400">
+                <a:latin typeface="Meiryo UI" panose="020B0604030504040204" pitchFamily="34" charset="-128"/>
+                <a:ea typeface="Meiryo UI" panose="020B0604030504040204" pitchFamily="34" charset="-128"/>
+              </a:rPr>
+              <a:t>書き込み</a:t>
+            </a:r>
+            <a:endParaRPr kumimoji="1" lang="ja-JP" altLang="en-US" sz="1400">
+              <a:latin typeface="Meiryo UI" panose="020B0604030504040204" pitchFamily="34" charset="-128"/>
+              <a:ea typeface="Meiryo UI" panose="020B0604030504040204" pitchFamily="34" charset="-128"/>
+            </a:endParaRPr>
+          </a:p>
+        </p:txBody>
+      </p:sp>
+      <p:grpSp>
+        <p:nvGrpSpPr>
+          <p:cNvPr id="84" name="グループ化 83">
+            <a:extLst>
+              <a:ext uri="{FF2B5EF4-FFF2-40B4-BE49-F238E27FC236}">
+                <a16:creationId xmlns:a16="http://schemas.microsoft.com/office/drawing/2014/main" id="{082AFDDA-7D6D-1241-A870-573CE066A1A8}"/>
+              </a:ext>
+            </a:extLst>
+          </p:cNvPr>
+          <p:cNvGrpSpPr/>
+          <p:nvPr/>
+        </p:nvGrpSpPr>
+        <p:grpSpPr>
+          <a:xfrm>
+            <a:off x="8855451" y="4528322"/>
+            <a:ext cx="2474015" cy="769040"/>
+            <a:chOff x="1777261" y="2692955"/>
+            <a:chExt cx="3359282" cy="769040"/>
+          </a:xfrm>
+        </p:grpSpPr>
+        <p:sp>
+          <p:nvSpPr>
+            <p:cNvPr id="85" name="テキスト ボックス 84">
+              <a:extLst>
+                <a:ext uri="{FF2B5EF4-FFF2-40B4-BE49-F238E27FC236}">
+                  <a16:creationId xmlns:a16="http://schemas.microsoft.com/office/drawing/2014/main" id="{BBB23D37-6172-0546-824D-6045192FBD74}"/>
+                </a:ext>
+              </a:extLst>
+            </p:cNvPr>
+            <p:cNvSpPr txBox="1"/>
+            <p:nvPr/>
+          </p:nvSpPr>
+          <p:spPr>
+            <a:xfrm>
+              <a:off x="2325042" y="2817209"/>
+              <a:ext cx="2263719" cy="523220"/>
+            </a:xfrm>
+            <a:prstGeom prst="rect">
+              <a:avLst/>
+            </a:prstGeom>
+            <a:noFill/>
+            <a:ln>
+              <a:noFill/>
+            </a:ln>
+          </p:spPr>
+          <p:txBody>
+            <a:bodyPr wrap="square" rtlCol="0">
+              <a:spAutoFit/>
+            </a:bodyPr>
+            <a:lstStyle/>
+            <a:p>
+              <a:pPr algn="ctr"/>
+              <a:r>
+                <a:rPr lang="en-US" altLang="ja-JP" sz="1400" dirty="0">
+                  <a:latin typeface="Meiryo UI" panose="020B0604030504040204" pitchFamily="34" charset="-128"/>
+                  <a:ea typeface="Meiryo UI" panose="020B0604030504040204" pitchFamily="34" charset="-128"/>
+                </a:rPr>
+                <a:t>Response</a:t>
+              </a:r>
+              <a:r>
+                <a:rPr lang="ja-JP" altLang="en-US" sz="1400">
+                  <a:latin typeface="Meiryo UI" panose="020B0604030504040204" pitchFamily="34" charset="-128"/>
+                  <a:ea typeface="Meiryo UI" panose="020B0604030504040204" pitchFamily="34" charset="-128"/>
+                </a:rPr>
+                <a:t>情報は全て読み切った</a:t>
+              </a:r>
+              <a:r>
+                <a:rPr lang="en-US" altLang="ja-JP" sz="1400" dirty="0">
+                  <a:latin typeface="Meiryo UI" panose="020B0604030504040204" pitchFamily="34" charset="-128"/>
+                  <a:ea typeface="Meiryo UI" panose="020B0604030504040204" pitchFamily="34" charset="-128"/>
+                </a:rPr>
+                <a:t> ?</a:t>
+              </a:r>
+              <a:endParaRPr kumimoji="1" lang="ja-JP" altLang="en-US" sz="1400">
+                <a:latin typeface="Meiryo UI" panose="020B0604030504040204" pitchFamily="34" charset="-128"/>
+                <a:ea typeface="Meiryo UI" panose="020B0604030504040204" pitchFamily="34" charset="-128"/>
+              </a:endParaRPr>
+            </a:p>
+          </p:txBody>
+        </p:sp>
+        <p:sp>
+          <p:nvSpPr>
+            <p:cNvPr id="87" name="ひし形 86">
+              <a:extLst>
+                <a:ext uri="{FF2B5EF4-FFF2-40B4-BE49-F238E27FC236}">
+                  <a16:creationId xmlns:a16="http://schemas.microsoft.com/office/drawing/2014/main" id="{D88489FF-51DC-8243-BB07-6AE01AD9B296}"/>
+                </a:ext>
+              </a:extLst>
+            </p:cNvPr>
+            <p:cNvSpPr/>
+            <p:nvPr/>
+          </p:nvSpPr>
+          <p:spPr>
+            <a:xfrm>
+              <a:off x="1777261" y="2692955"/>
+              <a:ext cx="3359282" cy="769040"/>
+            </a:xfrm>
+            <a:prstGeom prst="diamond">
+              <a:avLst/>
+            </a:prstGeom>
+            <a:noFill/>
+            <a:ln>
+              <a:solidFill>
+                <a:schemeClr val="bg1">
+                  <a:lumMod val="50000"/>
+                </a:schemeClr>
+              </a:solidFill>
+            </a:ln>
+          </p:spPr>
+          <p:style>
+            <a:lnRef idx="2">
+              <a:schemeClr val="accent1">
+                <a:shade val="50000"/>
+              </a:schemeClr>
+            </a:lnRef>
+            <a:fillRef idx="1">
+              <a:schemeClr val="accent1"/>
+            </a:fillRef>
+            <a:effectRef idx="0">
+              <a:schemeClr val="accent1"/>
+            </a:effectRef>
+            <a:fontRef idx="minor">
+              <a:schemeClr val="lt1"/>
+            </a:fontRef>
+          </p:style>
+          <p:txBody>
+            <a:bodyPr rtlCol="0" anchor="ctr"/>
+            <a:lstStyle/>
+            <a:p>
+              <a:pPr algn="ctr"/>
+              <a:endParaRPr kumimoji="1" lang="ja-JP" altLang="en-US" sz="1600"/>
+            </a:p>
+          </p:txBody>
+        </p:sp>
+      </p:grpSp>
+      <p:cxnSp>
+        <p:nvCxnSpPr>
+          <p:cNvPr id="88" name="直線矢印コネクタ 87">
+            <a:extLst>
+              <a:ext uri="{FF2B5EF4-FFF2-40B4-BE49-F238E27FC236}">
+                <a16:creationId xmlns:a16="http://schemas.microsoft.com/office/drawing/2014/main" id="{7FDB9FE4-4E47-AA40-9806-803E075E6062}"/>
+              </a:ext>
+            </a:extLst>
+          </p:cNvPr>
+          <p:cNvCxnSpPr>
+            <a:cxnSpLocks/>
+            <a:stCxn id="89" idx="3"/>
+          </p:cNvCxnSpPr>
+          <p:nvPr/>
+        </p:nvCxnSpPr>
+        <p:spPr>
+          <a:xfrm flipV="1">
+            <a:off x="10900667" y="5680818"/>
+            <a:ext cx="859312" cy="7976"/>
+          </a:xfrm>
+          <a:prstGeom prst="straightConnector1">
+            <a:avLst/>
+          </a:prstGeom>
+          <a:ln>
+            <a:solidFill>
+              <a:schemeClr val="bg1">
+                <a:lumMod val="50000"/>
+              </a:schemeClr>
+            </a:solidFill>
+            <a:tailEnd type="triangle"/>
+          </a:ln>
+        </p:spPr>
+        <p:style>
+          <a:lnRef idx="1">
+            <a:schemeClr val="accent1"/>
+          </a:lnRef>
+          <a:fillRef idx="0">
+            <a:schemeClr val="accent1"/>
+          </a:fillRef>
+          <a:effectRef idx="0">
+            <a:schemeClr val="accent1"/>
+          </a:effectRef>
+          <a:fontRef idx="minor">
+            <a:schemeClr val="tx1"/>
+          </a:fontRef>
+        </p:style>
+      </p:cxnSp>
+      <p:sp>
+        <p:nvSpPr>
+          <p:cNvPr id="89" name="テキスト ボックス 88">
+            <a:extLst>
+              <a:ext uri="{FF2B5EF4-FFF2-40B4-BE49-F238E27FC236}">
+                <a16:creationId xmlns:a16="http://schemas.microsoft.com/office/drawing/2014/main" id="{85D24B93-7D1E-8F4A-B0F1-605964F9D051}"/>
+              </a:ext>
+            </a:extLst>
+          </p:cNvPr>
+          <p:cNvSpPr txBox="1"/>
+          <p:nvPr/>
+        </p:nvSpPr>
+        <p:spPr>
+          <a:xfrm>
+            <a:off x="9394373" y="5534905"/>
+            <a:ext cx="1506294" cy="307777"/>
+          </a:xfrm>
+          <a:prstGeom prst="rect">
+            <a:avLst/>
+          </a:prstGeom>
+          <a:noFill/>
+          <a:ln>
+            <a:solidFill>
+              <a:schemeClr val="bg1">
+                <a:lumMod val="50000"/>
+              </a:schemeClr>
+            </a:solidFill>
+          </a:ln>
+        </p:spPr>
+        <p:txBody>
+          <a:bodyPr wrap="square" rtlCol="0">
+            <a:spAutoFit/>
+          </a:bodyPr>
+          <a:lstStyle/>
+          <a:p>
+            <a:pPr algn="ctr"/>
+            <a:r>
+              <a:rPr kumimoji="1" lang="ja-JP" altLang="en-US" sz="1400">
+                <a:latin typeface="Meiryo UI" panose="020B0604030504040204" pitchFamily="34" charset="-128"/>
+                <a:ea typeface="Meiryo UI" panose="020B0604030504040204" pitchFamily="34" charset="-128"/>
+              </a:rPr>
+              <a:t>接続用</a:t>
+            </a:r>
+            <a:r>
+              <a:rPr kumimoji="1" lang="en-US" altLang="ja-JP" sz="1400" dirty="0">
+                <a:latin typeface="Meiryo UI" panose="020B0604030504040204" pitchFamily="34" charset="-128"/>
+                <a:ea typeface="Meiryo UI" panose="020B0604030504040204" pitchFamily="34" charset="-128"/>
+              </a:rPr>
+              <a:t>FD</a:t>
+            </a:r>
+            <a:r>
+              <a:rPr kumimoji="1" lang="ja-JP" altLang="en-US" sz="1400">
+                <a:latin typeface="Meiryo UI" panose="020B0604030504040204" pitchFamily="34" charset="-128"/>
+                <a:ea typeface="Meiryo UI" panose="020B0604030504040204" pitchFamily="34" charset="-128"/>
+              </a:rPr>
+              <a:t>を破棄</a:t>
+            </a:r>
+          </a:p>
+        </p:txBody>
+      </p:sp>
+      <p:cxnSp>
+        <p:nvCxnSpPr>
+          <p:cNvPr id="90" name="直線矢印コネクタ 89">
+            <a:extLst>
+              <a:ext uri="{FF2B5EF4-FFF2-40B4-BE49-F238E27FC236}">
+                <a16:creationId xmlns:a16="http://schemas.microsoft.com/office/drawing/2014/main" id="{347CD1D9-B884-9241-96B0-716B79A9D3A1}"/>
+              </a:ext>
+            </a:extLst>
+          </p:cNvPr>
+          <p:cNvCxnSpPr>
+            <a:cxnSpLocks/>
+          </p:cNvCxnSpPr>
+          <p:nvPr/>
+        </p:nvCxnSpPr>
+        <p:spPr>
+          <a:xfrm>
+            <a:off x="7675225" y="5688793"/>
+            <a:ext cx="1719148" cy="0"/>
+          </a:xfrm>
+          <a:prstGeom prst="straightConnector1">
+            <a:avLst/>
+          </a:prstGeom>
+          <a:ln>
+            <a:solidFill>
+              <a:schemeClr val="bg1">
+                <a:lumMod val="50000"/>
+              </a:schemeClr>
+            </a:solidFill>
+            <a:tailEnd type="triangle"/>
           </a:ln>
         </p:spPr>
         <p:style>
@@ -7322,23 +9447,22 @@
       </p:cxnSp>
       <p:cxnSp>
         <p:nvCxnSpPr>
-          <p:cNvPr id="86" name="直線矢印コネクタ 85">
-            <a:extLst>
-              <a:ext uri="{FF2B5EF4-FFF2-40B4-BE49-F238E27FC236}">
-                <a16:creationId xmlns:a16="http://schemas.microsoft.com/office/drawing/2014/main" id="{86773B5A-0DC1-0643-96BD-D5B9DE984680}"/>
+          <p:cNvPr id="92" name="直線矢印コネクタ 91">
+            <a:extLst>
+              <a:ext uri="{FF2B5EF4-FFF2-40B4-BE49-F238E27FC236}">
+                <a16:creationId xmlns:a16="http://schemas.microsoft.com/office/drawing/2014/main" id="{1753A3F1-B1C7-454B-9AD0-FB263AC9D2A8}"/>
               </a:ext>
             </a:extLst>
           </p:cNvPr>
           <p:cNvCxnSpPr>
             <a:cxnSpLocks/>
-            <a:endCxn id="14" idx="2"/>
           </p:cNvCxnSpPr>
           <p:nvPr/>
         </p:nvCxnSpPr>
         <p:spPr>
-          <a:xfrm flipV="1">
-            <a:off x="9255979" y="3282407"/>
-            <a:ext cx="2" cy="648105"/>
+          <a:xfrm>
+            <a:off x="10075111" y="5279655"/>
+            <a:ext cx="0" cy="255250"/>
           </a:xfrm>
           <a:prstGeom prst="straightConnector1">
             <a:avLst/>
@@ -7349,8 +9473,7 @@
                 <a:lumMod val="50000"/>
               </a:schemeClr>
             </a:solidFill>
-            <a:headEnd type="none"/>
-            <a:tailEnd type="none"/>
+            <a:tailEnd type="triangle"/>
           </a:ln>
         </p:spPr>
         <p:style>
@@ -7368,10 +9491,339 @@
           </a:fontRef>
         </p:style>
       </p:cxnSp>
+      <p:cxnSp>
+        <p:nvCxnSpPr>
+          <p:cNvPr id="93" name="直線矢印コネクタ 92">
+            <a:extLst>
+              <a:ext uri="{FF2B5EF4-FFF2-40B4-BE49-F238E27FC236}">
+                <a16:creationId xmlns:a16="http://schemas.microsoft.com/office/drawing/2014/main" id="{616D92B6-FDBB-9641-A783-7EB2A7693D6E}"/>
+              </a:ext>
+            </a:extLst>
+          </p:cNvPr>
+          <p:cNvCxnSpPr>
+            <a:cxnSpLocks/>
+          </p:cNvCxnSpPr>
+          <p:nvPr/>
+        </p:nvCxnSpPr>
+        <p:spPr>
+          <a:xfrm>
+            <a:off x="11329466" y="4912842"/>
+            <a:ext cx="430513" cy="0"/>
+          </a:xfrm>
+          <a:prstGeom prst="straightConnector1">
+            <a:avLst/>
+          </a:prstGeom>
+          <a:ln>
+            <a:solidFill>
+              <a:schemeClr val="bg1">
+                <a:lumMod val="50000"/>
+              </a:schemeClr>
+            </a:solidFill>
+            <a:tailEnd type="triangle"/>
+          </a:ln>
+        </p:spPr>
+        <p:style>
+          <a:lnRef idx="1">
+            <a:schemeClr val="accent1"/>
+          </a:lnRef>
+          <a:fillRef idx="0">
+            <a:schemeClr val="accent1"/>
+          </a:fillRef>
+          <a:effectRef idx="0">
+            <a:schemeClr val="accent1"/>
+          </a:effectRef>
+          <a:fontRef idx="minor">
+            <a:schemeClr val="tx1"/>
+          </a:fontRef>
+        </p:style>
+      </p:cxnSp>
+      <p:sp>
+        <p:nvSpPr>
+          <p:cNvPr id="96" name="テキスト ボックス 95">
+            <a:extLst>
+              <a:ext uri="{FF2B5EF4-FFF2-40B4-BE49-F238E27FC236}">
+                <a16:creationId xmlns:a16="http://schemas.microsoft.com/office/drawing/2014/main" id="{02E5DBCE-013C-B346-AAAB-F5E99C73DB77}"/>
+              </a:ext>
+            </a:extLst>
+          </p:cNvPr>
+          <p:cNvSpPr txBox="1"/>
+          <p:nvPr/>
+        </p:nvSpPr>
+        <p:spPr>
+          <a:xfrm>
+            <a:off x="3929017" y="2746425"/>
+            <a:ext cx="737014" cy="276999"/>
+          </a:xfrm>
+          <a:prstGeom prst="rect">
+            <a:avLst/>
+          </a:prstGeom>
+          <a:noFill/>
+          <a:ln>
+            <a:noFill/>
+          </a:ln>
+        </p:spPr>
+        <p:txBody>
+          <a:bodyPr wrap="square" rtlCol="0">
+            <a:spAutoFit/>
+          </a:bodyPr>
+          <a:lstStyle/>
+          <a:p>
+            <a:pPr algn="ctr"/>
+            <a:r>
+              <a:rPr lang="en-US" altLang="ja-JP" sz="1200" dirty="0">
+                <a:latin typeface="Meiryo UI" panose="020B0604030504040204" pitchFamily="34" charset="-128"/>
+                <a:ea typeface="Meiryo UI" panose="020B0604030504040204" pitchFamily="34" charset="-128"/>
+              </a:rPr>
+              <a:t>No</a:t>
+            </a:r>
+            <a:endParaRPr kumimoji="1" lang="ja-JP" altLang="en-US" sz="1200">
+              <a:latin typeface="Meiryo UI" panose="020B0604030504040204" pitchFamily="34" charset="-128"/>
+              <a:ea typeface="Meiryo UI" panose="020B0604030504040204" pitchFamily="34" charset="-128"/>
+            </a:endParaRPr>
+          </a:p>
+        </p:txBody>
+      </p:sp>
+      <p:sp>
+        <p:nvSpPr>
+          <p:cNvPr id="97" name="テキスト ボックス 96">
+            <a:extLst>
+              <a:ext uri="{FF2B5EF4-FFF2-40B4-BE49-F238E27FC236}">
+                <a16:creationId xmlns:a16="http://schemas.microsoft.com/office/drawing/2014/main" id="{0E9EE8E2-908A-3F4F-B39D-934DA3F60D29}"/>
+              </a:ext>
+            </a:extLst>
+          </p:cNvPr>
+          <p:cNvSpPr txBox="1"/>
+          <p:nvPr/>
+        </p:nvSpPr>
+        <p:spPr>
+          <a:xfrm>
+            <a:off x="11157371" y="4635843"/>
+            <a:ext cx="737014" cy="276999"/>
+          </a:xfrm>
+          <a:prstGeom prst="rect">
+            <a:avLst/>
+          </a:prstGeom>
+          <a:noFill/>
+          <a:ln>
+            <a:noFill/>
+          </a:ln>
+        </p:spPr>
+        <p:txBody>
+          <a:bodyPr wrap="square" rtlCol="0">
+            <a:spAutoFit/>
+          </a:bodyPr>
+          <a:lstStyle/>
+          <a:p>
+            <a:pPr algn="ctr"/>
+            <a:r>
+              <a:rPr lang="en-US" altLang="ja-JP" sz="1200" dirty="0">
+                <a:latin typeface="Meiryo UI" panose="020B0604030504040204" pitchFamily="34" charset="-128"/>
+                <a:ea typeface="Meiryo UI" panose="020B0604030504040204" pitchFamily="34" charset="-128"/>
+              </a:rPr>
+              <a:t>No</a:t>
+            </a:r>
+            <a:endParaRPr kumimoji="1" lang="ja-JP" altLang="en-US" sz="1200">
+              <a:latin typeface="Meiryo UI" panose="020B0604030504040204" pitchFamily="34" charset="-128"/>
+              <a:ea typeface="Meiryo UI" panose="020B0604030504040204" pitchFamily="34" charset="-128"/>
+            </a:endParaRPr>
+          </a:p>
+        </p:txBody>
+      </p:sp>
+      <p:sp>
+        <p:nvSpPr>
+          <p:cNvPr id="98" name="テキスト ボックス 97">
+            <a:extLst>
+              <a:ext uri="{FF2B5EF4-FFF2-40B4-BE49-F238E27FC236}">
+                <a16:creationId xmlns:a16="http://schemas.microsoft.com/office/drawing/2014/main" id="{70D0B3F2-86FB-1B41-89EB-91F8AEDC2477}"/>
+              </a:ext>
+            </a:extLst>
+          </p:cNvPr>
+          <p:cNvSpPr txBox="1"/>
+          <p:nvPr/>
+        </p:nvSpPr>
+        <p:spPr>
+          <a:xfrm>
+            <a:off x="9946985" y="5234903"/>
+            <a:ext cx="737014" cy="276999"/>
+          </a:xfrm>
+          <a:prstGeom prst="rect">
+            <a:avLst/>
+          </a:prstGeom>
+          <a:noFill/>
+          <a:ln>
+            <a:noFill/>
+          </a:ln>
+        </p:spPr>
+        <p:txBody>
+          <a:bodyPr wrap="square" rtlCol="0">
+            <a:spAutoFit/>
+          </a:bodyPr>
+          <a:lstStyle/>
+          <a:p>
+            <a:pPr algn="ctr"/>
+            <a:r>
+              <a:rPr lang="en-US" altLang="ja-JP" sz="1200" dirty="0">
+                <a:latin typeface="Meiryo UI" panose="020B0604030504040204" pitchFamily="34" charset="-128"/>
+                <a:ea typeface="Meiryo UI" panose="020B0604030504040204" pitchFamily="34" charset="-128"/>
+              </a:rPr>
+              <a:t>Yes</a:t>
+            </a:r>
+            <a:endParaRPr kumimoji="1" lang="ja-JP" altLang="en-US" sz="1200">
+              <a:latin typeface="Meiryo UI" panose="020B0604030504040204" pitchFamily="34" charset="-128"/>
+              <a:ea typeface="Meiryo UI" panose="020B0604030504040204" pitchFamily="34" charset="-128"/>
+            </a:endParaRPr>
+          </a:p>
+        </p:txBody>
+      </p:sp>
+      <p:sp>
+        <p:nvSpPr>
+          <p:cNvPr id="99" name="テキスト ボックス 98">
+            <a:extLst>
+              <a:ext uri="{FF2B5EF4-FFF2-40B4-BE49-F238E27FC236}">
+                <a16:creationId xmlns:a16="http://schemas.microsoft.com/office/drawing/2014/main" id="{4F2B9641-ED51-7F48-B8CF-64F8B9A49B0E}"/>
+              </a:ext>
+            </a:extLst>
+          </p:cNvPr>
+          <p:cNvSpPr txBox="1"/>
+          <p:nvPr/>
+        </p:nvSpPr>
+        <p:spPr>
+          <a:xfrm>
+            <a:off x="7491530" y="4582132"/>
+            <a:ext cx="737014" cy="276999"/>
+          </a:xfrm>
+          <a:prstGeom prst="rect">
+            <a:avLst/>
+          </a:prstGeom>
+          <a:noFill/>
+          <a:ln>
+            <a:noFill/>
+          </a:ln>
+        </p:spPr>
+        <p:txBody>
+          <a:bodyPr wrap="square" rtlCol="0">
+            <a:spAutoFit/>
+          </a:bodyPr>
+          <a:lstStyle/>
+          <a:p>
+            <a:pPr algn="ctr"/>
+            <a:r>
+              <a:rPr lang="en-US" altLang="ja-JP" sz="1200" dirty="0">
+                <a:latin typeface="Meiryo UI" panose="020B0604030504040204" pitchFamily="34" charset="-128"/>
+                <a:ea typeface="Meiryo UI" panose="020B0604030504040204" pitchFamily="34" charset="-128"/>
+              </a:rPr>
+              <a:t>No</a:t>
+            </a:r>
+            <a:endParaRPr kumimoji="1" lang="ja-JP" altLang="en-US" sz="1200">
+              <a:latin typeface="Meiryo UI" panose="020B0604030504040204" pitchFamily="34" charset="-128"/>
+              <a:ea typeface="Meiryo UI" panose="020B0604030504040204" pitchFamily="34" charset="-128"/>
+            </a:endParaRPr>
+          </a:p>
+        </p:txBody>
+      </p:sp>
+      <p:sp>
+        <p:nvSpPr>
+          <p:cNvPr id="100" name="テキスト ボックス 99">
+            <a:extLst>
+              <a:ext uri="{FF2B5EF4-FFF2-40B4-BE49-F238E27FC236}">
+                <a16:creationId xmlns:a16="http://schemas.microsoft.com/office/drawing/2014/main" id="{350CD5D0-6C20-9D4B-AC84-02D5DB52C6BF}"/>
+              </a:ext>
+            </a:extLst>
+          </p:cNvPr>
+          <p:cNvSpPr txBox="1"/>
+          <p:nvPr/>
+        </p:nvSpPr>
+        <p:spPr>
+          <a:xfrm>
+            <a:off x="7958330" y="2401297"/>
+            <a:ext cx="737014" cy="276999"/>
+          </a:xfrm>
+          <a:prstGeom prst="rect">
+            <a:avLst/>
+          </a:prstGeom>
+          <a:noFill/>
+          <a:ln>
+            <a:noFill/>
+          </a:ln>
+        </p:spPr>
+        <p:txBody>
+          <a:bodyPr wrap="square" rtlCol="0">
+            <a:spAutoFit/>
+          </a:bodyPr>
+          <a:lstStyle/>
+          <a:p>
+            <a:pPr algn="ctr"/>
+            <a:r>
+              <a:rPr lang="en-US" altLang="ja-JP" sz="1200" dirty="0">
+                <a:latin typeface="Meiryo UI" panose="020B0604030504040204" pitchFamily="34" charset="-128"/>
+                <a:ea typeface="Meiryo UI" panose="020B0604030504040204" pitchFamily="34" charset="-128"/>
+              </a:rPr>
+              <a:t>No</a:t>
+            </a:r>
+            <a:endParaRPr kumimoji="1" lang="ja-JP" altLang="en-US" sz="1200">
+              <a:latin typeface="Meiryo UI" panose="020B0604030504040204" pitchFamily="34" charset="-128"/>
+              <a:ea typeface="Meiryo UI" panose="020B0604030504040204" pitchFamily="34" charset="-128"/>
+            </a:endParaRPr>
+          </a:p>
+        </p:txBody>
+      </p:sp>
+      <p:sp>
+        <p:nvSpPr>
+          <p:cNvPr id="101" name="テキスト ボックス 100">
+            <a:extLst>
+              <a:ext uri="{FF2B5EF4-FFF2-40B4-BE49-F238E27FC236}">
+                <a16:creationId xmlns:a16="http://schemas.microsoft.com/office/drawing/2014/main" id="{021EDD7F-5D52-8849-91C1-BB07C73EE188}"/>
+              </a:ext>
+            </a:extLst>
+          </p:cNvPr>
+          <p:cNvSpPr txBox="1"/>
+          <p:nvPr/>
+        </p:nvSpPr>
+        <p:spPr>
+          <a:xfrm>
+            <a:off x="4365060" y="2752628"/>
+            <a:ext cx="2007096" cy="461665"/>
+          </a:xfrm>
+          <a:prstGeom prst="rect">
+            <a:avLst/>
+          </a:prstGeom>
+          <a:noFill/>
+          <a:ln>
+            <a:noFill/>
+          </a:ln>
+        </p:spPr>
+        <p:txBody>
+          <a:bodyPr wrap="square" rtlCol="0">
+            <a:spAutoFit/>
+          </a:bodyPr>
+          <a:lstStyle/>
+          <a:p>
+            <a:pPr algn="ctr"/>
+            <a:r>
+              <a:rPr lang="en-US" altLang="ja-JP" sz="1200" dirty="0">
+                <a:latin typeface="Meiryo UI" panose="020B0604030504040204" pitchFamily="34" charset="-128"/>
+                <a:ea typeface="Meiryo UI" panose="020B0604030504040204" pitchFamily="34" charset="-128"/>
+              </a:rPr>
+              <a:t>※Request</a:t>
+            </a:r>
+            <a:r>
+              <a:rPr lang="ja-JP" altLang="en-US" sz="1200">
+                <a:latin typeface="Meiryo UI" panose="020B0604030504040204" pitchFamily="34" charset="-128"/>
+                <a:ea typeface="Meiryo UI" panose="020B0604030504040204" pitchFamily="34" charset="-128"/>
+              </a:rPr>
+              <a:t>情報を読み込み完了時も、このフロー</a:t>
+            </a:r>
+            <a:endParaRPr kumimoji="1" lang="ja-JP" altLang="en-US" sz="1200">
+              <a:latin typeface="Meiryo UI" panose="020B0604030504040204" pitchFamily="34" charset="-128"/>
+              <a:ea typeface="Meiryo UI" panose="020B0604030504040204" pitchFamily="34" charset="-128"/>
+            </a:endParaRPr>
+          </a:p>
+        </p:txBody>
+      </p:sp>
     </p:spTree>
     <p:extLst>
       <p:ext uri="{BB962C8B-B14F-4D97-AF65-F5344CB8AC3E}">
-        <p14:creationId xmlns:p14="http://schemas.microsoft.com/office/powerpoint/2010/main" val="3446519594"/>
+        <p14:creationId xmlns:p14="http://schemas.microsoft.com/office/powerpoint/2010/main" val="4231860677"/>
       </p:ext>
     </p:extLst>
   </p:cSld>
@@ -10425,7 +12877,7 @@
         </p:nvSpPr>
         <p:spPr>
           <a:xfrm>
-            <a:off x="8154815" y="6188096"/>
+            <a:off x="8154815" y="6400999"/>
             <a:ext cx="3938193" cy="276999"/>
           </a:xfrm>
           <a:prstGeom prst="rect">
@@ -10501,6 +12953,143 @@
               </a:solidFill>
               <a:effectLst/>
               <a:latin typeface="Open Sans" panose="020F0502020204030204" pitchFamily="34" charset="0"/>
+            </a:endParaRPr>
+          </a:p>
+        </p:txBody>
+      </p:sp>
+      <p:sp>
+        <p:nvSpPr>
+          <p:cNvPr id="2" name="正方形/長方形 1">
+            <a:extLst>
+              <a:ext uri="{FF2B5EF4-FFF2-40B4-BE49-F238E27FC236}">
+                <a16:creationId xmlns:a16="http://schemas.microsoft.com/office/drawing/2014/main" id="{D36A73D4-66B1-0847-9864-B2391967657E}"/>
+              </a:ext>
+            </a:extLst>
+          </p:cNvPr>
+          <p:cNvSpPr/>
+          <p:nvPr/>
+        </p:nvSpPr>
+        <p:spPr>
+          <a:xfrm>
+            <a:off x="8154814" y="3578087"/>
+            <a:ext cx="440545" cy="174929"/>
+          </a:xfrm>
+          <a:prstGeom prst="rect">
+            <a:avLst/>
+          </a:prstGeom>
+          <a:noFill/>
+          <a:ln w="15875">
+            <a:solidFill>
+              <a:srgbClr val="FF0000"/>
+            </a:solidFill>
+          </a:ln>
+        </p:spPr>
+        <p:style>
+          <a:lnRef idx="2">
+            <a:schemeClr val="accent1">
+              <a:shade val="50000"/>
+            </a:schemeClr>
+          </a:lnRef>
+          <a:fillRef idx="1">
+            <a:schemeClr val="accent1"/>
+          </a:fillRef>
+          <a:effectRef idx="0">
+            <a:schemeClr val="accent1"/>
+          </a:effectRef>
+          <a:fontRef idx="minor">
+            <a:schemeClr val="lt1"/>
+          </a:fontRef>
+        </p:style>
+        <p:txBody>
+          <a:bodyPr rtlCol="0" anchor="ctr"/>
+          <a:lstStyle/>
+          <a:p>
+            <a:pPr algn="ctr"/>
+            <a:endParaRPr kumimoji="1" lang="ja-JP" altLang="en-US"/>
+          </a:p>
+        </p:txBody>
+      </p:sp>
+      <p:sp>
+        <p:nvSpPr>
+          <p:cNvPr id="10" name="テキスト ボックス 9">
+            <a:extLst>
+              <a:ext uri="{FF2B5EF4-FFF2-40B4-BE49-F238E27FC236}">
+                <a16:creationId xmlns:a16="http://schemas.microsoft.com/office/drawing/2014/main" id="{3F7ADAC8-3009-EF48-B119-1CD95245D004}"/>
+              </a:ext>
+            </a:extLst>
+          </p:cNvPr>
+          <p:cNvSpPr txBox="1"/>
+          <p:nvPr/>
+        </p:nvSpPr>
+        <p:spPr>
+          <a:xfrm>
+            <a:off x="7156173" y="6007028"/>
+            <a:ext cx="4142629" cy="307777"/>
+          </a:xfrm>
+          <a:prstGeom prst="rect">
+            <a:avLst/>
+          </a:prstGeom>
+          <a:noFill/>
+        </p:spPr>
+        <p:txBody>
+          <a:bodyPr wrap="square" rtlCol="0">
+            <a:spAutoFit/>
+          </a:bodyPr>
+          <a:lstStyle/>
+          <a:p>
+            <a:pPr algn="ctr"/>
+            <a:r>
+              <a:rPr lang="en-US" altLang="ja-JP" sz="1400" dirty="0">
+                <a:latin typeface="Meiryo UI" panose="020B0604030504040204" pitchFamily="34" charset="-128"/>
+                <a:ea typeface="Meiryo UI" panose="020B0604030504040204" pitchFamily="34" charset="-128"/>
+              </a:rPr>
+              <a:t>※r</a:t>
+            </a:r>
+            <a:r>
+              <a:rPr kumimoji="1" lang="en-US" altLang="ja-JP" sz="1400" dirty="0">
+                <a:latin typeface="Meiryo UI" panose="020B0604030504040204" pitchFamily="34" charset="-128"/>
+                <a:ea typeface="Meiryo UI" panose="020B0604030504040204" pitchFamily="34" charset="-128"/>
+              </a:rPr>
+              <a:t>ead/write</a:t>
+            </a:r>
+            <a:r>
+              <a:rPr lang="ja-JP" altLang="en-US" sz="1400">
+                <a:latin typeface="Meiryo UI" panose="020B0604030504040204" pitchFamily="34" charset="-128"/>
+                <a:ea typeface="Meiryo UI" panose="020B0604030504040204" pitchFamily="34" charset="-128"/>
+              </a:rPr>
+              <a:t>の</a:t>
+            </a:r>
+            <a:r>
+              <a:rPr lang="en-US" altLang="ja-JP" sz="1400" dirty="0">
+                <a:latin typeface="Meiryo UI" panose="020B0604030504040204" pitchFamily="34" charset="-128"/>
+                <a:ea typeface="Meiryo UI" panose="020B0604030504040204" pitchFamily="34" charset="-128"/>
+              </a:rPr>
+              <a:t>return</a:t>
+            </a:r>
+            <a:r>
+              <a:rPr lang="ja-JP" altLang="en-US" sz="1400">
+                <a:latin typeface="Meiryo UI" panose="020B0604030504040204" pitchFamily="34" charset="-128"/>
+                <a:ea typeface="Meiryo UI" panose="020B0604030504040204" pitchFamily="34" charset="-128"/>
+              </a:rPr>
+              <a:t>はエラーとして</a:t>
+            </a:r>
+            <a:r>
+              <a:rPr lang="en-US" altLang="ja-JP" sz="1400" dirty="0">
+                <a:latin typeface="Meiryo UI" panose="020B0604030504040204" pitchFamily="34" charset="-128"/>
+                <a:ea typeface="Meiryo UI" panose="020B0604030504040204" pitchFamily="34" charset="-128"/>
+              </a:rPr>
+              <a:t>-1</a:t>
+            </a:r>
+            <a:r>
+              <a:rPr lang="ja-JP" altLang="en-US" sz="1400">
+                <a:latin typeface="Meiryo UI" panose="020B0604030504040204" pitchFamily="34" charset="-128"/>
+                <a:ea typeface="Meiryo UI" panose="020B0604030504040204" pitchFamily="34" charset="-128"/>
+              </a:rPr>
+              <a:t>が返る</a:t>
+            </a:r>
+            <a:endParaRPr kumimoji="1" lang="ja-JP" altLang="en-US" sz="1400">
+              <a:latin typeface="Meiryo UI" panose="020B0604030504040204" pitchFamily="34" charset="-128"/>
+              <a:ea typeface="Meiryo UI" panose="020B0604030504040204" pitchFamily="34" charset="-128"/>
             </a:endParaRPr>
           </a:p>
         </p:txBody>

</xml_diff>